<commit_message>
New documentation on Tasks and Expressions
</commit_message>
<xml_diff>
--- a/custom-picture-sources/various pictures.pptx
+++ b/custom-picture-sources/various pictures.pptx
@@ -5,7 +5,7 @@
     <p:sldMasterId id="2147483648" r:id="rId1"/>
   </p:sldMasterIdLst>
   <p:notesMasterIdLst>
-    <p:notesMasterId r:id="rId11"/>
+    <p:notesMasterId r:id="rId17"/>
   </p:notesMasterIdLst>
   <p:sldIdLst>
     <p:sldId id="256" r:id="rId2"/>
@@ -17,6 +17,12 @@
     <p:sldId id="263" r:id="rId8"/>
     <p:sldId id="262" r:id="rId9"/>
     <p:sldId id="264" r:id="rId10"/>
+    <p:sldId id="265" r:id="rId11"/>
+    <p:sldId id="266" r:id="rId12"/>
+    <p:sldId id="267" r:id="rId13"/>
+    <p:sldId id="268" r:id="rId14"/>
+    <p:sldId id="269" r:id="rId15"/>
+    <p:sldId id="270" r:id="rId16"/>
   </p:sldIdLst>
   <p:sldSz cx="12192000" cy="6858000"/>
   <p:notesSz cx="6858000" cy="9144000"/>
@@ -205,7 +211,7 @@
           <a:p>
             <a:fld id="{8AF5FB7F-563E-4AC8-B4DA-B6C429390E53}" type="datetimeFigureOut">
               <a:rPr lang="en-US" smtClean="0"/>
-              <a:t>10/12/2020</a:t>
+              <a:t>4/2/2021</a:t>
             </a:fld>
             <a:endParaRPr lang="en-US"/>
           </a:p>
@@ -688,7 +694,7 @@
           <a:p>
             <a:fld id="{B84B12B9-0A16-483D-BFD5-41DF0EA1BEC4}" type="datetimeFigureOut">
               <a:rPr lang="en-US" smtClean="0"/>
-              <a:t>10/12/2020</a:t>
+              <a:t>4/2/2021</a:t>
             </a:fld>
             <a:endParaRPr lang="en-US"/>
           </a:p>
@@ -858,7 +864,7 @@
           <a:p>
             <a:fld id="{B84B12B9-0A16-483D-BFD5-41DF0EA1BEC4}" type="datetimeFigureOut">
               <a:rPr lang="en-US" smtClean="0"/>
-              <a:t>10/12/2020</a:t>
+              <a:t>4/2/2021</a:t>
             </a:fld>
             <a:endParaRPr lang="en-US"/>
           </a:p>
@@ -1038,7 +1044,7 @@
           <a:p>
             <a:fld id="{B84B12B9-0A16-483D-BFD5-41DF0EA1BEC4}" type="datetimeFigureOut">
               <a:rPr lang="en-US" smtClean="0"/>
-              <a:t>10/12/2020</a:t>
+              <a:t>4/2/2021</a:t>
             </a:fld>
             <a:endParaRPr lang="en-US"/>
           </a:p>
@@ -1208,7 +1214,7 @@
           <a:p>
             <a:fld id="{B84B12B9-0A16-483D-BFD5-41DF0EA1BEC4}" type="datetimeFigureOut">
               <a:rPr lang="en-US" smtClean="0"/>
-              <a:t>10/12/2020</a:t>
+              <a:t>4/2/2021</a:t>
             </a:fld>
             <a:endParaRPr lang="en-US"/>
           </a:p>
@@ -1454,7 +1460,7 @@
           <a:p>
             <a:fld id="{B84B12B9-0A16-483D-BFD5-41DF0EA1BEC4}" type="datetimeFigureOut">
               <a:rPr lang="en-US" smtClean="0"/>
-              <a:t>10/12/2020</a:t>
+              <a:t>4/2/2021</a:t>
             </a:fld>
             <a:endParaRPr lang="en-US"/>
           </a:p>
@@ -1686,7 +1692,7 @@
           <a:p>
             <a:fld id="{B84B12B9-0A16-483D-BFD5-41DF0EA1BEC4}" type="datetimeFigureOut">
               <a:rPr lang="en-US" smtClean="0"/>
-              <a:t>10/12/2020</a:t>
+              <a:t>4/2/2021</a:t>
             </a:fld>
             <a:endParaRPr lang="en-US"/>
           </a:p>
@@ -2053,7 +2059,7 @@
           <a:p>
             <a:fld id="{B84B12B9-0A16-483D-BFD5-41DF0EA1BEC4}" type="datetimeFigureOut">
               <a:rPr lang="en-US" smtClean="0"/>
-              <a:t>10/12/2020</a:t>
+              <a:t>4/2/2021</a:t>
             </a:fld>
             <a:endParaRPr lang="en-US"/>
           </a:p>
@@ -2171,7 +2177,7 @@
           <a:p>
             <a:fld id="{B84B12B9-0A16-483D-BFD5-41DF0EA1BEC4}" type="datetimeFigureOut">
               <a:rPr lang="en-US" smtClean="0"/>
-              <a:t>10/12/2020</a:t>
+              <a:t>4/2/2021</a:t>
             </a:fld>
             <a:endParaRPr lang="en-US"/>
           </a:p>
@@ -2266,7 +2272,7 @@
           <a:p>
             <a:fld id="{B84B12B9-0A16-483D-BFD5-41DF0EA1BEC4}" type="datetimeFigureOut">
               <a:rPr lang="en-US" smtClean="0"/>
-              <a:t>10/12/2020</a:t>
+              <a:t>4/2/2021</a:t>
             </a:fld>
             <a:endParaRPr lang="en-US"/>
           </a:p>
@@ -2543,7 +2549,7 @@
           <a:p>
             <a:fld id="{B84B12B9-0A16-483D-BFD5-41DF0EA1BEC4}" type="datetimeFigureOut">
               <a:rPr lang="en-US" smtClean="0"/>
-              <a:t>10/12/2020</a:t>
+              <a:t>4/2/2021</a:t>
             </a:fld>
             <a:endParaRPr lang="en-US"/>
           </a:p>
@@ -2796,7 +2802,7 @@
           <a:p>
             <a:fld id="{B84B12B9-0A16-483D-BFD5-41DF0EA1BEC4}" type="datetimeFigureOut">
               <a:rPr lang="en-US" smtClean="0"/>
-              <a:t>10/12/2020</a:t>
+              <a:t>4/2/2021</a:t>
             </a:fld>
             <a:endParaRPr lang="en-US"/>
           </a:p>
@@ -3009,7 +3015,7 @@
           <a:p>
             <a:fld id="{B84B12B9-0A16-483D-BFD5-41DF0EA1BEC4}" type="datetimeFigureOut">
               <a:rPr lang="en-US" smtClean="0"/>
-              <a:t>10/12/2020</a:t>
+              <a:t>4/2/2021</a:t>
             </a:fld>
             <a:endParaRPr lang="en-US"/>
           </a:p>
@@ -3456,6 +3462,1433 @@
     <p:extLst>
       <p:ext uri="{BB962C8B-B14F-4D97-AF65-F5344CB8AC3E}">
         <p14:creationId xmlns:p14="http://schemas.microsoft.com/office/powerpoint/2010/main" val="2111753392"/>
+      </p:ext>
+    </p:extLst>
+  </p:cSld>
+  <p:clrMapOvr>
+    <a:masterClrMapping/>
+  </p:clrMapOvr>
+  <p:timing>
+    <p:tnLst>
+      <p:par>
+        <p:cTn id="1" dur="indefinite" restart="never" nodeType="tmRoot"/>
+      </p:par>
+    </p:tnLst>
+  </p:timing>
+</p:sld>
+</file>
+
+<file path=ppt/slides/slide10.xml><?xml version="1.0" encoding="utf-8"?>
+<p:sld xmlns:a="http://schemas.openxmlformats.org/drawingml/2006/main" xmlns:r="http://schemas.openxmlformats.org/officeDocument/2006/relationships" xmlns:p="http://schemas.openxmlformats.org/presentationml/2006/main">
+  <p:cSld>
+    <p:spTree>
+      <p:nvGrpSpPr>
+        <p:cNvPr id="1" name=""/>
+        <p:cNvGrpSpPr/>
+        <p:nvPr/>
+      </p:nvGrpSpPr>
+      <p:grpSpPr>
+        <a:xfrm>
+          <a:off x="0" y="0"/>
+          <a:ext cx="0" cy="0"/>
+          <a:chOff x="0" y="0"/>
+          <a:chExt cx="0" cy="0"/>
+        </a:xfrm>
+      </p:grpSpPr>
+      <p:sp>
+        <p:nvSpPr>
+          <p:cNvPr id="2" name="Title 1"/>
+          <p:cNvSpPr>
+            <a:spLocks noGrp="1"/>
+          </p:cNvSpPr>
+          <p:nvPr>
+            <p:ph type="title"/>
+          </p:nvPr>
+        </p:nvSpPr>
+        <p:spPr/>
+        <p:txBody>
+          <a:bodyPr/>
+          <a:lstStyle/>
+          <a:p>
+            <a:endParaRPr lang="en-US" dirty="0"/>
+          </a:p>
+        </p:txBody>
+      </p:sp>
+      <p:pic>
+        <p:nvPicPr>
+          <p:cNvPr id="4" name="Picture 3"/>
+          <p:cNvPicPr>
+            <a:picLocks noChangeAspect="1"/>
+          </p:cNvPicPr>
+          <p:nvPr/>
+        </p:nvPicPr>
+        <p:blipFill>
+          <a:blip r:embed="rId2"/>
+          <a:stretch>
+            <a:fillRect/>
+          </a:stretch>
+        </p:blipFill>
+        <p:spPr>
+          <a:xfrm>
+            <a:off x="985917" y="1376376"/>
+            <a:ext cx="9685488" cy="4365084"/>
+          </a:xfrm>
+          <a:prstGeom prst="rect">
+            <a:avLst/>
+          </a:prstGeom>
+        </p:spPr>
+      </p:pic>
+      <p:sp>
+        <p:nvSpPr>
+          <p:cNvPr id="5" name="Rectangle 4"/>
+          <p:cNvSpPr/>
+          <p:nvPr/>
+        </p:nvSpPr>
+        <p:spPr>
+          <a:xfrm>
+            <a:off x="2580556" y="2874377"/>
+            <a:ext cx="280137" cy="282601"/>
+          </a:xfrm>
+          <a:prstGeom prst="rect">
+            <a:avLst/>
+          </a:prstGeom>
+          <a:noFill/>
+          <a:ln w="57150">
+            <a:solidFill>
+              <a:srgbClr val="FF0000"/>
+            </a:solidFill>
+          </a:ln>
+        </p:spPr>
+        <p:style>
+          <a:lnRef idx="2">
+            <a:schemeClr val="accent1">
+              <a:shade val="50000"/>
+            </a:schemeClr>
+          </a:lnRef>
+          <a:fillRef idx="1">
+            <a:schemeClr val="accent1"/>
+          </a:fillRef>
+          <a:effectRef idx="0">
+            <a:schemeClr val="accent1"/>
+          </a:effectRef>
+          <a:fontRef idx="minor">
+            <a:schemeClr val="lt1"/>
+          </a:fontRef>
+        </p:style>
+        <p:txBody>
+          <a:bodyPr rtlCol="0" anchor="ctr"/>
+          <a:lstStyle/>
+          <a:p>
+            <a:endParaRPr lang="en-US" dirty="0">
+              <a:solidFill>
+                <a:schemeClr val="tx1"/>
+              </a:solidFill>
+            </a:endParaRPr>
+          </a:p>
+        </p:txBody>
+      </p:sp>
+    </p:spTree>
+    <p:extLst>
+      <p:ext uri="{BB962C8B-B14F-4D97-AF65-F5344CB8AC3E}">
+        <p14:creationId xmlns:p14="http://schemas.microsoft.com/office/powerpoint/2010/main" val="572802433"/>
+      </p:ext>
+    </p:extLst>
+  </p:cSld>
+  <p:clrMapOvr>
+    <a:masterClrMapping/>
+  </p:clrMapOvr>
+  <p:timing>
+    <p:tnLst>
+      <p:par>
+        <p:cTn id="1" dur="indefinite" restart="never" nodeType="tmRoot"/>
+      </p:par>
+    </p:tnLst>
+  </p:timing>
+</p:sld>
+</file>
+
+<file path=ppt/slides/slide11.xml><?xml version="1.0" encoding="utf-8"?>
+<p:sld xmlns:a="http://schemas.openxmlformats.org/drawingml/2006/main" xmlns:r="http://schemas.openxmlformats.org/officeDocument/2006/relationships" xmlns:p="http://schemas.openxmlformats.org/presentationml/2006/main">
+  <p:cSld>
+    <p:spTree>
+      <p:nvGrpSpPr>
+        <p:cNvPr id="1" name=""/>
+        <p:cNvGrpSpPr/>
+        <p:nvPr/>
+      </p:nvGrpSpPr>
+      <p:grpSpPr>
+        <a:xfrm>
+          <a:off x="0" y="0"/>
+          <a:ext cx="0" cy="0"/>
+          <a:chOff x="0" y="0"/>
+          <a:chExt cx="0" cy="0"/>
+        </a:xfrm>
+      </p:grpSpPr>
+      <p:sp>
+        <p:nvSpPr>
+          <p:cNvPr id="2" name="Title 1"/>
+          <p:cNvSpPr>
+            <a:spLocks noGrp="1"/>
+          </p:cNvSpPr>
+          <p:nvPr>
+            <p:ph type="title"/>
+          </p:nvPr>
+        </p:nvSpPr>
+        <p:spPr/>
+        <p:txBody>
+          <a:bodyPr/>
+          <a:lstStyle/>
+          <a:p>
+            <a:endParaRPr lang="en-US" dirty="0"/>
+          </a:p>
+        </p:txBody>
+      </p:sp>
+      <p:pic>
+        <p:nvPicPr>
+          <p:cNvPr id="4" name="Picture 3"/>
+          <p:cNvPicPr>
+            <a:picLocks noChangeAspect="1"/>
+          </p:cNvPicPr>
+          <p:nvPr/>
+        </p:nvPicPr>
+        <p:blipFill>
+          <a:blip r:embed="rId2"/>
+          <a:stretch>
+            <a:fillRect/>
+          </a:stretch>
+        </p:blipFill>
+        <p:spPr>
+          <a:xfrm>
+            <a:off x="1052421" y="1690688"/>
+            <a:ext cx="8554644" cy="704948"/>
+          </a:xfrm>
+          <a:prstGeom prst="rect">
+            <a:avLst/>
+          </a:prstGeom>
+        </p:spPr>
+      </p:pic>
+      <p:sp>
+        <p:nvSpPr>
+          <p:cNvPr id="5" name="Oval 4"/>
+          <p:cNvSpPr/>
+          <p:nvPr/>
+        </p:nvSpPr>
+        <p:spPr>
+          <a:xfrm>
+            <a:off x="1006446" y="1604916"/>
+            <a:ext cx="2353261" cy="1064786"/>
+          </a:xfrm>
+          <a:prstGeom prst="ellipse">
+            <a:avLst/>
+          </a:prstGeom>
+          <a:noFill/>
+          <a:ln w="57150">
+            <a:solidFill>
+              <a:schemeClr val="accent1"/>
+            </a:solidFill>
+          </a:ln>
+        </p:spPr>
+        <p:style>
+          <a:lnRef idx="2">
+            <a:schemeClr val="accent1">
+              <a:shade val="50000"/>
+            </a:schemeClr>
+          </a:lnRef>
+          <a:fillRef idx="1">
+            <a:schemeClr val="accent1"/>
+          </a:fillRef>
+          <a:effectRef idx="0">
+            <a:schemeClr val="accent1"/>
+          </a:effectRef>
+          <a:fontRef idx="minor">
+            <a:schemeClr val="lt1"/>
+          </a:fontRef>
+        </p:style>
+        <p:txBody>
+          <a:bodyPr rtlCol="0" anchor="ctr"/>
+          <a:lstStyle/>
+          <a:p>
+            <a:pPr algn="ctr"/>
+            <a:endParaRPr lang="en-US"/>
+          </a:p>
+        </p:txBody>
+      </p:sp>
+      <p:sp>
+        <p:nvSpPr>
+          <p:cNvPr id="6" name="Oval 5"/>
+          <p:cNvSpPr/>
+          <p:nvPr/>
+        </p:nvSpPr>
+        <p:spPr>
+          <a:xfrm>
+            <a:off x="7315200" y="1604916"/>
+            <a:ext cx="2291865" cy="1064786"/>
+          </a:xfrm>
+          <a:prstGeom prst="ellipse">
+            <a:avLst/>
+          </a:prstGeom>
+          <a:noFill/>
+          <a:ln w="57150">
+            <a:solidFill>
+              <a:schemeClr val="accent1"/>
+            </a:solidFill>
+          </a:ln>
+        </p:spPr>
+        <p:style>
+          <a:lnRef idx="2">
+            <a:schemeClr val="accent1">
+              <a:shade val="50000"/>
+            </a:schemeClr>
+          </a:lnRef>
+          <a:fillRef idx="1">
+            <a:schemeClr val="accent1"/>
+          </a:fillRef>
+          <a:effectRef idx="0">
+            <a:schemeClr val="accent1"/>
+          </a:effectRef>
+          <a:fontRef idx="minor">
+            <a:schemeClr val="lt1"/>
+          </a:fontRef>
+        </p:style>
+        <p:txBody>
+          <a:bodyPr rtlCol="0" anchor="ctr"/>
+          <a:lstStyle/>
+          <a:p>
+            <a:pPr algn="ctr"/>
+            <a:endParaRPr lang="en-US"/>
+          </a:p>
+        </p:txBody>
+      </p:sp>
+      <p:cxnSp>
+        <p:nvCxnSpPr>
+          <p:cNvPr id="8" name="Straight Arrow Connector 7"/>
+          <p:cNvCxnSpPr/>
+          <p:nvPr/>
+        </p:nvCxnSpPr>
+        <p:spPr>
+          <a:xfrm>
+            <a:off x="3432832" y="2137309"/>
+            <a:ext cx="3810851" cy="0"/>
+          </a:xfrm>
+          <a:prstGeom prst="straightConnector1">
+            <a:avLst/>
+          </a:prstGeom>
+          <a:ln w="76200">
+            <a:tailEnd type="triangle"/>
+          </a:ln>
+        </p:spPr>
+        <p:style>
+          <a:lnRef idx="1">
+            <a:schemeClr val="accent1"/>
+          </a:lnRef>
+          <a:fillRef idx="0">
+            <a:schemeClr val="accent1"/>
+          </a:fillRef>
+          <a:effectRef idx="0">
+            <a:schemeClr val="accent1"/>
+          </a:effectRef>
+          <a:fontRef idx="minor">
+            <a:schemeClr val="tx1"/>
+          </a:fontRef>
+        </p:style>
+      </p:cxnSp>
+      <p:pic>
+        <p:nvPicPr>
+          <p:cNvPr id="19" name="Picture 18"/>
+          <p:cNvPicPr>
+            <a:picLocks noChangeAspect="1"/>
+          </p:cNvPicPr>
+          <p:nvPr/>
+        </p:nvPicPr>
+        <p:blipFill rotWithShape="1">
+          <a:blip r:embed="rId3"/>
+          <a:srcRect t="21901"/>
+          <a:stretch/>
+        </p:blipFill>
+        <p:spPr>
+          <a:xfrm>
+            <a:off x="6173264" y="2814737"/>
+            <a:ext cx="5509930" cy="2361055"/>
+          </a:xfrm>
+          <a:prstGeom prst="rect">
+            <a:avLst/>
+          </a:prstGeom>
+        </p:spPr>
+      </p:pic>
+      <p:pic>
+        <p:nvPicPr>
+          <p:cNvPr id="22" name="Picture 21"/>
+          <p:cNvPicPr>
+            <a:picLocks noChangeAspect="1"/>
+          </p:cNvPicPr>
+          <p:nvPr/>
+        </p:nvPicPr>
+        <p:blipFill rotWithShape="1">
+          <a:blip r:embed="rId4"/>
+          <a:srcRect l="12707" b="42295"/>
+          <a:stretch/>
+        </p:blipFill>
+        <p:spPr>
+          <a:xfrm>
+            <a:off x="704955" y="2878016"/>
+            <a:ext cx="4332545" cy="2138413"/>
+          </a:xfrm>
+          <a:prstGeom prst="rect">
+            <a:avLst/>
+          </a:prstGeom>
+        </p:spPr>
+      </p:pic>
+      <p:sp>
+        <p:nvSpPr>
+          <p:cNvPr id="23" name="Rectangle 22"/>
+          <p:cNvSpPr/>
+          <p:nvPr/>
+        </p:nvSpPr>
+        <p:spPr>
+          <a:xfrm>
+            <a:off x="1409156" y="3550836"/>
+            <a:ext cx="1547839" cy="419399"/>
+          </a:xfrm>
+          <a:prstGeom prst="rect">
+            <a:avLst/>
+          </a:prstGeom>
+          <a:noFill/>
+          <a:ln w="57150">
+            <a:solidFill>
+              <a:schemeClr val="accent1"/>
+            </a:solidFill>
+          </a:ln>
+        </p:spPr>
+        <p:style>
+          <a:lnRef idx="2">
+            <a:schemeClr val="accent1">
+              <a:shade val="50000"/>
+            </a:schemeClr>
+          </a:lnRef>
+          <a:fillRef idx="1">
+            <a:schemeClr val="accent1"/>
+          </a:fillRef>
+          <a:effectRef idx="0">
+            <a:schemeClr val="accent1"/>
+          </a:effectRef>
+          <a:fontRef idx="minor">
+            <a:schemeClr val="lt1"/>
+          </a:fontRef>
+        </p:style>
+        <p:txBody>
+          <a:bodyPr rtlCol="0" anchor="ctr"/>
+          <a:lstStyle/>
+          <a:p>
+            <a:pPr algn="ctr"/>
+            <a:endParaRPr lang="en-US"/>
+          </a:p>
+        </p:txBody>
+      </p:sp>
+      <p:cxnSp>
+        <p:nvCxnSpPr>
+          <p:cNvPr id="25" name="Straight Connector 24"/>
+          <p:cNvCxnSpPr>
+            <a:stCxn id="5" idx="4"/>
+            <a:endCxn id="23" idx="0"/>
+          </p:cNvCxnSpPr>
+          <p:nvPr/>
+        </p:nvCxnSpPr>
+        <p:spPr>
+          <a:xfrm flipH="1">
+            <a:off x="2183076" y="2669702"/>
+            <a:ext cx="1" cy="881134"/>
+          </a:xfrm>
+          <a:prstGeom prst="line">
+            <a:avLst/>
+          </a:prstGeom>
+          <a:ln w="76200"/>
+        </p:spPr>
+        <p:style>
+          <a:lnRef idx="1">
+            <a:schemeClr val="accent1"/>
+          </a:lnRef>
+          <a:fillRef idx="0">
+            <a:schemeClr val="accent1"/>
+          </a:fillRef>
+          <a:effectRef idx="0">
+            <a:schemeClr val="accent1"/>
+          </a:effectRef>
+          <a:fontRef idx="minor">
+            <a:schemeClr val="tx1"/>
+          </a:fontRef>
+        </p:style>
+      </p:cxnSp>
+      <p:sp>
+        <p:nvSpPr>
+          <p:cNvPr id="27" name="Rectangle 26"/>
+          <p:cNvSpPr/>
+          <p:nvPr/>
+        </p:nvSpPr>
+        <p:spPr>
+          <a:xfrm>
+            <a:off x="7691612" y="3550836"/>
+            <a:ext cx="1547839" cy="419399"/>
+          </a:xfrm>
+          <a:prstGeom prst="rect">
+            <a:avLst/>
+          </a:prstGeom>
+          <a:noFill/>
+          <a:ln w="57150">
+            <a:solidFill>
+              <a:schemeClr val="accent1"/>
+            </a:solidFill>
+          </a:ln>
+        </p:spPr>
+        <p:style>
+          <a:lnRef idx="2">
+            <a:schemeClr val="accent1">
+              <a:shade val="50000"/>
+            </a:schemeClr>
+          </a:lnRef>
+          <a:fillRef idx="1">
+            <a:schemeClr val="accent1"/>
+          </a:fillRef>
+          <a:effectRef idx="0">
+            <a:schemeClr val="accent1"/>
+          </a:effectRef>
+          <a:fontRef idx="minor">
+            <a:schemeClr val="lt1"/>
+          </a:fontRef>
+        </p:style>
+        <p:txBody>
+          <a:bodyPr rtlCol="0" anchor="ctr"/>
+          <a:lstStyle/>
+          <a:p>
+            <a:pPr algn="ctr"/>
+            <a:endParaRPr lang="en-US"/>
+          </a:p>
+        </p:txBody>
+      </p:sp>
+      <p:cxnSp>
+        <p:nvCxnSpPr>
+          <p:cNvPr id="28" name="Straight Connector 27"/>
+          <p:cNvCxnSpPr>
+            <a:stCxn id="6" idx="4"/>
+            <a:endCxn id="27" idx="0"/>
+          </p:cNvCxnSpPr>
+          <p:nvPr/>
+        </p:nvCxnSpPr>
+        <p:spPr>
+          <a:xfrm>
+            <a:off x="8461133" y="2669702"/>
+            <a:ext cx="4399" cy="881134"/>
+          </a:xfrm>
+          <a:prstGeom prst="line">
+            <a:avLst/>
+          </a:prstGeom>
+          <a:ln w="76200"/>
+        </p:spPr>
+        <p:style>
+          <a:lnRef idx="1">
+            <a:schemeClr val="accent1"/>
+          </a:lnRef>
+          <a:fillRef idx="0">
+            <a:schemeClr val="accent1"/>
+          </a:fillRef>
+          <a:effectRef idx="0">
+            <a:schemeClr val="accent1"/>
+          </a:effectRef>
+          <a:fontRef idx="minor">
+            <a:schemeClr val="tx1"/>
+          </a:fontRef>
+        </p:style>
+      </p:cxnSp>
+      <p:sp>
+        <p:nvSpPr>
+          <p:cNvPr id="32" name="Rectangle 31"/>
+          <p:cNvSpPr/>
+          <p:nvPr/>
+        </p:nvSpPr>
+        <p:spPr>
+          <a:xfrm>
+            <a:off x="6649407" y="4506490"/>
+            <a:ext cx="3623449" cy="814337"/>
+          </a:xfrm>
+          <a:prstGeom prst="rect">
+            <a:avLst/>
+          </a:prstGeom>
+          <a:solidFill>
+            <a:schemeClr val="bg1">
+              <a:lumMod val="95000"/>
+            </a:schemeClr>
+          </a:solidFill>
+          <a:ln w="57150">
+            <a:solidFill>
+              <a:schemeClr val="accent1"/>
+            </a:solidFill>
+          </a:ln>
+        </p:spPr>
+        <p:style>
+          <a:lnRef idx="2">
+            <a:schemeClr val="accent1">
+              <a:shade val="50000"/>
+            </a:schemeClr>
+          </a:lnRef>
+          <a:fillRef idx="1">
+            <a:schemeClr val="accent1"/>
+          </a:fillRef>
+          <a:effectRef idx="0">
+            <a:schemeClr val="accent1"/>
+          </a:effectRef>
+          <a:fontRef idx="minor">
+            <a:schemeClr val="lt1"/>
+          </a:fontRef>
+        </p:style>
+        <p:txBody>
+          <a:bodyPr rtlCol="0" anchor="ctr"/>
+          <a:lstStyle/>
+          <a:p>
+            <a:pPr algn="ctr"/>
+            <a:r>
+              <a:rPr lang="en-US" dirty="0">
+                <a:solidFill>
+                  <a:srgbClr val="0070C0"/>
+                </a:solidFill>
+              </a:rPr>
+              <a:t>The reusable </a:t>
+            </a:r>
+            <a:r>
+              <a:rPr lang="en-US" dirty="0" err="1">
+                <a:solidFill>
+                  <a:srgbClr val="0070C0"/>
+                </a:solidFill>
+              </a:rPr>
+              <a:t>HumanTask</a:t>
+            </a:r>
+            <a:r>
+              <a:rPr lang="en-US" dirty="0">
+                <a:solidFill>
+                  <a:srgbClr val="0070C0"/>
+                </a:solidFill>
+              </a:rPr>
+              <a:t> </a:t>
+            </a:r>
+            <a:br>
+              <a:rPr lang="en-US" dirty="0">
+                <a:solidFill>
+                  <a:srgbClr val="0070C0"/>
+                </a:solidFill>
+              </a:rPr>
+            </a:br>
+            <a:r>
+              <a:rPr lang="en-US" dirty="0">
+                <a:solidFill>
+                  <a:srgbClr val="0070C0"/>
+                </a:solidFill>
+              </a:rPr>
+              <a:t>from the Repository</a:t>
+            </a:r>
+          </a:p>
+        </p:txBody>
+      </p:sp>
+      <p:sp>
+        <p:nvSpPr>
+          <p:cNvPr id="34" name="Rectangle 33"/>
+          <p:cNvSpPr/>
+          <p:nvPr/>
+        </p:nvSpPr>
+        <p:spPr>
+          <a:xfrm>
+            <a:off x="1006446" y="4544352"/>
+            <a:ext cx="3339083" cy="814337"/>
+          </a:xfrm>
+          <a:prstGeom prst="rect">
+            <a:avLst/>
+          </a:prstGeom>
+          <a:solidFill>
+            <a:schemeClr val="bg1">
+              <a:lumMod val="95000"/>
+            </a:schemeClr>
+          </a:solidFill>
+          <a:ln w="57150">
+            <a:solidFill>
+              <a:schemeClr val="accent1"/>
+            </a:solidFill>
+          </a:ln>
+        </p:spPr>
+        <p:style>
+          <a:lnRef idx="2">
+            <a:schemeClr val="accent1">
+              <a:shade val="50000"/>
+            </a:schemeClr>
+          </a:lnRef>
+          <a:fillRef idx="1">
+            <a:schemeClr val="accent1"/>
+          </a:fillRef>
+          <a:effectRef idx="0">
+            <a:schemeClr val="accent1"/>
+          </a:effectRef>
+          <a:fontRef idx="minor">
+            <a:schemeClr val="lt1"/>
+          </a:fontRef>
+        </p:style>
+        <p:txBody>
+          <a:bodyPr rtlCol="0" anchor="ctr"/>
+          <a:lstStyle/>
+          <a:p>
+            <a:pPr algn="ctr"/>
+            <a:r>
+              <a:rPr lang="en-US" dirty="0" smtClean="0">
+                <a:solidFill>
+                  <a:srgbClr val="0070C0"/>
+                </a:solidFill>
+              </a:rPr>
+              <a:t>The Case File Item</a:t>
+            </a:r>
+          </a:p>
+          <a:p>
+            <a:pPr algn="ctr"/>
+            <a:r>
+              <a:rPr lang="en-US" dirty="0" smtClean="0">
+                <a:solidFill>
+                  <a:srgbClr val="0070C0"/>
+                </a:solidFill>
+              </a:rPr>
+              <a:t>inside HelloWorld</a:t>
+            </a:r>
+            <a:endParaRPr lang="en-US" dirty="0">
+              <a:solidFill>
+                <a:srgbClr val="0070C0"/>
+              </a:solidFill>
+            </a:endParaRPr>
+          </a:p>
+        </p:txBody>
+      </p:sp>
+      <p:pic>
+        <p:nvPicPr>
+          <p:cNvPr id="3" name="Picture 2"/>
+          <p:cNvPicPr>
+            <a:picLocks noChangeAspect="1"/>
+          </p:cNvPicPr>
+          <p:nvPr/>
+        </p:nvPicPr>
+        <p:blipFill>
+          <a:blip r:embed="rId5"/>
+          <a:stretch>
+            <a:fillRect/>
+          </a:stretch>
+        </p:blipFill>
+        <p:spPr>
+          <a:xfrm>
+            <a:off x="1280440" y="1480865"/>
+            <a:ext cx="9631119" cy="3896269"/>
+          </a:xfrm>
+          <a:prstGeom prst="rect">
+            <a:avLst/>
+          </a:prstGeom>
+        </p:spPr>
+      </p:pic>
+    </p:spTree>
+    <p:extLst>
+      <p:ext uri="{BB962C8B-B14F-4D97-AF65-F5344CB8AC3E}">
+        <p14:creationId xmlns:p14="http://schemas.microsoft.com/office/powerpoint/2010/main" val="2404676016"/>
+      </p:ext>
+    </p:extLst>
+  </p:cSld>
+  <p:clrMapOvr>
+    <a:masterClrMapping/>
+  </p:clrMapOvr>
+  <p:timing>
+    <p:tnLst>
+      <p:par>
+        <p:cTn id="1" dur="indefinite" restart="never" nodeType="tmRoot"/>
+      </p:par>
+    </p:tnLst>
+  </p:timing>
+</p:sld>
+</file>
+
+<file path=ppt/slides/slide12.xml><?xml version="1.0" encoding="utf-8"?>
+<p:sld xmlns:a="http://schemas.openxmlformats.org/drawingml/2006/main" xmlns:r="http://schemas.openxmlformats.org/officeDocument/2006/relationships" xmlns:p="http://schemas.openxmlformats.org/presentationml/2006/main">
+  <p:cSld>
+    <p:spTree>
+      <p:nvGrpSpPr>
+        <p:cNvPr id="1" name=""/>
+        <p:cNvGrpSpPr/>
+        <p:nvPr/>
+      </p:nvGrpSpPr>
+      <p:grpSpPr>
+        <a:xfrm>
+          <a:off x="0" y="0"/>
+          <a:ext cx="0" cy="0"/>
+          <a:chOff x="0" y="0"/>
+          <a:chExt cx="0" cy="0"/>
+        </a:xfrm>
+      </p:grpSpPr>
+      <p:sp>
+        <p:nvSpPr>
+          <p:cNvPr id="2" name="Title 1"/>
+          <p:cNvSpPr>
+            <a:spLocks noGrp="1"/>
+          </p:cNvSpPr>
+          <p:nvPr>
+            <p:ph type="title"/>
+          </p:nvPr>
+        </p:nvSpPr>
+        <p:spPr/>
+        <p:txBody>
+          <a:bodyPr/>
+          <a:lstStyle/>
+          <a:p>
+            <a:endParaRPr lang="en-US" dirty="0"/>
+          </a:p>
+        </p:txBody>
+      </p:sp>
+      <p:pic>
+        <p:nvPicPr>
+          <p:cNvPr id="3" name="Picture 2"/>
+          <p:cNvPicPr>
+            <a:picLocks noChangeAspect="1"/>
+          </p:cNvPicPr>
+          <p:nvPr/>
+        </p:nvPicPr>
+        <p:blipFill>
+          <a:blip r:embed="rId2"/>
+          <a:stretch>
+            <a:fillRect/>
+          </a:stretch>
+        </p:blipFill>
+        <p:spPr>
+          <a:xfrm>
+            <a:off x="1280440" y="1480865"/>
+            <a:ext cx="9631119" cy="3896269"/>
+          </a:xfrm>
+          <a:prstGeom prst="rect">
+            <a:avLst/>
+          </a:prstGeom>
+        </p:spPr>
+      </p:pic>
+      <p:sp>
+        <p:nvSpPr>
+          <p:cNvPr id="4" name="Rectangle 3"/>
+          <p:cNvSpPr/>
+          <p:nvPr/>
+        </p:nvSpPr>
+        <p:spPr>
+          <a:xfrm>
+            <a:off x="3745301" y="2381123"/>
+            <a:ext cx="955574" cy="503226"/>
+          </a:xfrm>
+          <a:prstGeom prst="rect">
+            <a:avLst/>
+          </a:prstGeom>
+          <a:noFill/>
+          <a:ln w="57150">
+            <a:solidFill>
+              <a:srgbClr val="FF0000"/>
+            </a:solidFill>
+          </a:ln>
+        </p:spPr>
+        <p:style>
+          <a:lnRef idx="2">
+            <a:schemeClr val="accent1">
+              <a:shade val="50000"/>
+            </a:schemeClr>
+          </a:lnRef>
+          <a:fillRef idx="1">
+            <a:schemeClr val="accent1"/>
+          </a:fillRef>
+          <a:effectRef idx="0">
+            <a:schemeClr val="accent1"/>
+          </a:effectRef>
+          <a:fontRef idx="minor">
+            <a:schemeClr val="lt1"/>
+          </a:fontRef>
+        </p:style>
+        <p:txBody>
+          <a:bodyPr rtlCol="0" anchor="ctr"/>
+          <a:lstStyle/>
+          <a:p>
+            <a:endParaRPr lang="en-US" dirty="0">
+              <a:solidFill>
+                <a:schemeClr val="tx1"/>
+              </a:solidFill>
+            </a:endParaRPr>
+          </a:p>
+        </p:txBody>
+      </p:sp>
+    </p:spTree>
+    <p:extLst>
+      <p:ext uri="{BB962C8B-B14F-4D97-AF65-F5344CB8AC3E}">
+        <p14:creationId xmlns:p14="http://schemas.microsoft.com/office/powerpoint/2010/main" val="2689687881"/>
+      </p:ext>
+    </p:extLst>
+  </p:cSld>
+  <p:clrMapOvr>
+    <a:masterClrMapping/>
+  </p:clrMapOvr>
+  <p:timing>
+    <p:tnLst>
+      <p:par>
+        <p:cTn id="1" dur="indefinite" restart="never" nodeType="tmRoot"/>
+      </p:par>
+    </p:tnLst>
+  </p:timing>
+</p:sld>
+</file>
+
+<file path=ppt/slides/slide13.xml><?xml version="1.0" encoding="utf-8"?>
+<p:sld xmlns:a="http://schemas.openxmlformats.org/drawingml/2006/main" xmlns:r="http://schemas.openxmlformats.org/officeDocument/2006/relationships" xmlns:p="http://schemas.openxmlformats.org/presentationml/2006/main">
+  <p:cSld>
+    <p:spTree>
+      <p:nvGrpSpPr>
+        <p:cNvPr id="1" name=""/>
+        <p:cNvGrpSpPr/>
+        <p:nvPr/>
+      </p:nvGrpSpPr>
+      <p:grpSpPr>
+        <a:xfrm>
+          <a:off x="0" y="0"/>
+          <a:ext cx="0" cy="0"/>
+          <a:chOff x="0" y="0"/>
+          <a:chExt cx="0" cy="0"/>
+        </a:xfrm>
+      </p:grpSpPr>
+      <p:sp>
+        <p:nvSpPr>
+          <p:cNvPr id="2" name="Title 1"/>
+          <p:cNvSpPr>
+            <a:spLocks noGrp="1"/>
+          </p:cNvSpPr>
+          <p:nvPr>
+            <p:ph type="title"/>
+          </p:nvPr>
+        </p:nvSpPr>
+        <p:spPr/>
+        <p:txBody>
+          <a:bodyPr/>
+          <a:lstStyle/>
+          <a:p>
+            <a:r>
+              <a:rPr lang="en-US" dirty="0" smtClean="0"/>
+              <a:t/>
+            </a:r>
+            <a:br>
+              <a:rPr lang="en-US" dirty="0" smtClean="0"/>
+            </a:br>
+            <a:endParaRPr lang="en-US" dirty="0"/>
+          </a:p>
+        </p:txBody>
+      </p:sp>
+      <p:pic>
+        <p:nvPicPr>
+          <p:cNvPr id="3" name="Picture 2"/>
+          <p:cNvPicPr>
+            <a:picLocks noChangeAspect="1"/>
+          </p:cNvPicPr>
+          <p:nvPr/>
+        </p:nvPicPr>
+        <p:blipFill>
+          <a:blip r:embed="rId2"/>
+          <a:stretch>
+            <a:fillRect/>
+          </a:stretch>
+        </p:blipFill>
+        <p:spPr>
+          <a:xfrm>
+            <a:off x="2804653" y="2033391"/>
+            <a:ext cx="6582694" cy="2876951"/>
+          </a:xfrm>
+          <a:prstGeom prst="rect">
+            <a:avLst/>
+          </a:prstGeom>
+        </p:spPr>
+      </p:pic>
+      <p:sp>
+        <p:nvSpPr>
+          <p:cNvPr id="4" name="Rectangle 3"/>
+          <p:cNvSpPr/>
+          <p:nvPr/>
+        </p:nvSpPr>
+        <p:spPr>
+          <a:xfrm>
+            <a:off x="2804653" y="1990524"/>
+            <a:ext cx="6682247" cy="2876951"/>
+          </a:xfrm>
+          <a:prstGeom prst="rect">
+            <a:avLst/>
+          </a:prstGeom>
+          <a:noFill/>
+          <a:ln>
+            <a:solidFill>
+              <a:schemeClr val="accent1"/>
+            </a:solidFill>
+          </a:ln>
+        </p:spPr>
+        <p:style>
+          <a:lnRef idx="2">
+            <a:schemeClr val="accent1">
+              <a:shade val="50000"/>
+            </a:schemeClr>
+          </a:lnRef>
+          <a:fillRef idx="1">
+            <a:schemeClr val="accent1"/>
+          </a:fillRef>
+          <a:effectRef idx="0">
+            <a:schemeClr val="accent1"/>
+          </a:effectRef>
+          <a:fontRef idx="minor">
+            <a:schemeClr val="lt1"/>
+          </a:fontRef>
+        </p:style>
+        <p:txBody>
+          <a:bodyPr rtlCol="0" anchor="ctr"/>
+          <a:lstStyle/>
+          <a:p>
+            <a:pPr algn="ctr"/>
+            <a:endParaRPr lang="en-US"/>
+          </a:p>
+        </p:txBody>
+      </p:sp>
+    </p:spTree>
+    <p:extLst>
+      <p:ext uri="{BB962C8B-B14F-4D97-AF65-F5344CB8AC3E}">
+        <p14:creationId xmlns:p14="http://schemas.microsoft.com/office/powerpoint/2010/main" val="2806717025"/>
+      </p:ext>
+    </p:extLst>
+  </p:cSld>
+  <p:clrMapOvr>
+    <a:masterClrMapping/>
+  </p:clrMapOvr>
+  <p:timing>
+    <p:tnLst>
+      <p:par>
+        <p:cTn id="1" dur="indefinite" restart="never" nodeType="tmRoot"/>
+      </p:par>
+    </p:tnLst>
+  </p:timing>
+</p:sld>
+</file>
+
+<file path=ppt/slides/slide14.xml><?xml version="1.0" encoding="utf-8"?>
+<p:sld xmlns:a="http://schemas.openxmlformats.org/drawingml/2006/main" xmlns:r="http://schemas.openxmlformats.org/officeDocument/2006/relationships" xmlns:p="http://schemas.openxmlformats.org/presentationml/2006/main">
+  <p:cSld>
+    <p:spTree>
+      <p:nvGrpSpPr>
+        <p:cNvPr id="1" name=""/>
+        <p:cNvGrpSpPr/>
+        <p:nvPr/>
+      </p:nvGrpSpPr>
+      <p:grpSpPr>
+        <a:xfrm>
+          <a:off x="0" y="0"/>
+          <a:ext cx="0" cy="0"/>
+          <a:chOff x="0" y="0"/>
+          <a:chExt cx="0" cy="0"/>
+        </a:xfrm>
+      </p:grpSpPr>
+      <p:pic>
+        <p:nvPicPr>
+          <p:cNvPr id="3" name="Picture 2"/>
+          <p:cNvPicPr>
+            <a:picLocks noChangeAspect="1"/>
+          </p:cNvPicPr>
+          <p:nvPr/>
+        </p:nvPicPr>
+        <p:blipFill>
+          <a:blip r:embed="rId2"/>
+          <a:stretch>
+            <a:fillRect/>
+          </a:stretch>
+        </p:blipFill>
+        <p:spPr>
+          <a:xfrm>
+            <a:off x="2641299" y="1690688"/>
+            <a:ext cx="5607352" cy="4760604"/>
+          </a:xfrm>
+          <a:prstGeom prst="rect">
+            <a:avLst/>
+          </a:prstGeom>
+        </p:spPr>
+      </p:pic>
+      <p:sp>
+        <p:nvSpPr>
+          <p:cNvPr id="2" name="Title 1"/>
+          <p:cNvSpPr>
+            <a:spLocks noGrp="1"/>
+          </p:cNvSpPr>
+          <p:nvPr>
+            <p:ph type="title"/>
+          </p:nvPr>
+        </p:nvSpPr>
+        <p:spPr/>
+        <p:txBody>
+          <a:bodyPr/>
+          <a:lstStyle/>
+          <a:p>
+            <a:endParaRPr lang="en-US" dirty="0"/>
+          </a:p>
+        </p:txBody>
+      </p:sp>
+      <p:sp>
+        <p:nvSpPr>
+          <p:cNvPr id="5" name="Rectangle 4"/>
+          <p:cNvSpPr/>
+          <p:nvPr/>
+        </p:nvSpPr>
+        <p:spPr>
+          <a:xfrm>
+            <a:off x="5243901" y="1873123"/>
+            <a:ext cx="236148" cy="260477"/>
+          </a:xfrm>
+          <a:prstGeom prst="rect">
+            <a:avLst/>
+          </a:prstGeom>
+          <a:noFill/>
+          <a:ln w="9525">
+            <a:solidFill>
+              <a:srgbClr val="FF0000"/>
+            </a:solidFill>
+          </a:ln>
+        </p:spPr>
+        <p:style>
+          <a:lnRef idx="2">
+            <a:schemeClr val="accent1">
+              <a:shade val="50000"/>
+            </a:schemeClr>
+          </a:lnRef>
+          <a:fillRef idx="1">
+            <a:schemeClr val="accent1"/>
+          </a:fillRef>
+          <a:effectRef idx="0">
+            <a:schemeClr val="accent1"/>
+          </a:effectRef>
+          <a:fontRef idx="minor">
+            <a:schemeClr val="lt1"/>
+          </a:fontRef>
+        </p:style>
+        <p:txBody>
+          <a:bodyPr rtlCol="0" anchor="ctr"/>
+          <a:lstStyle/>
+          <a:p>
+            <a:endParaRPr lang="en-US" dirty="0">
+              <a:solidFill>
+                <a:schemeClr val="tx1"/>
+              </a:solidFill>
+            </a:endParaRPr>
+          </a:p>
+        </p:txBody>
+      </p:sp>
+      <p:sp>
+        <p:nvSpPr>
+          <p:cNvPr id="10" name="Oval 9"/>
+          <p:cNvSpPr/>
+          <p:nvPr/>
+        </p:nvSpPr>
+        <p:spPr>
+          <a:xfrm>
+            <a:off x="3622525" y="5478996"/>
+            <a:ext cx="1898650" cy="667804"/>
+          </a:xfrm>
+          <a:prstGeom prst="ellipse">
+            <a:avLst/>
+          </a:prstGeom>
+          <a:noFill/>
+          <a:ln w="57150">
+            <a:solidFill>
+              <a:srgbClr val="FF0000"/>
+            </a:solidFill>
+          </a:ln>
+        </p:spPr>
+        <p:style>
+          <a:lnRef idx="2">
+            <a:schemeClr val="accent1">
+              <a:shade val="50000"/>
+            </a:schemeClr>
+          </a:lnRef>
+          <a:fillRef idx="1">
+            <a:schemeClr val="accent1"/>
+          </a:fillRef>
+          <a:effectRef idx="0">
+            <a:schemeClr val="accent1"/>
+          </a:effectRef>
+          <a:fontRef idx="minor">
+            <a:schemeClr val="lt1"/>
+          </a:fontRef>
+        </p:style>
+        <p:txBody>
+          <a:bodyPr rtlCol="0" anchor="ctr"/>
+          <a:lstStyle/>
+          <a:p>
+            <a:pPr algn="ctr"/>
+            <a:endParaRPr lang="en-US"/>
+          </a:p>
+        </p:txBody>
+      </p:sp>
+    </p:spTree>
+    <p:extLst>
+      <p:ext uri="{BB962C8B-B14F-4D97-AF65-F5344CB8AC3E}">
+        <p14:creationId xmlns:p14="http://schemas.microsoft.com/office/powerpoint/2010/main" val="48976695"/>
+      </p:ext>
+    </p:extLst>
+  </p:cSld>
+  <p:clrMapOvr>
+    <a:masterClrMapping/>
+  </p:clrMapOvr>
+  <p:timing>
+    <p:tnLst>
+      <p:par>
+        <p:cTn id="1" dur="indefinite" restart="never" nodeType="tmRoot"/>
+      </p:par>
+    </p:tnLst>
+  </p:timing>
+</p:sld>
+</file>
+
+<file path=ppt/slides/slide15.xml><?xml version="1.0" encoding="utf-8"?>
+<p:sld xmlns:a="http://schemas.openxmlformats.org/drawingml/2006/main" xmlns:r="http://schemas.openxmlformats.org/officeDocument/2006/relationships" xmlns:p="http://schemas.openxmlformats.org/presentationml/2006/main">
+  <p:cSld>
+    <p:spTree>
+      <p:nvGrpSpPr>
+        <p:cNvPr id="1" name=""/>
+        <p:cNvGrpSpPr/>
+        <p:nvPr/>
+      </p:nvGrpSpPr>
+      <p:grpSpPr>
+        <a:xfrm>
+          <a:off x="0" y="0"/>
+          <a:ext cx="0" cy="0"/>
+          <a:chOff x="0" y="0"/>
+          <a:chExt cx="0" cy="0"/>
+        </a:xfrm>
+      </p:grpSpPr>
+      <p:sp>
+        <p:nvSpPr>
+          <p:cNvPr id="2" name="Title 1"/>
+          <p:cNvSpPr>
+            <a:spLocks noGrp="1"/>
+          </p:cNvSpPr>
+          <p:nvPr>
+            <p:ph type="title"/>
+          </p:nvPr>
+        </p:nvSpPr>
+        <p:spPr/>
+        <p:txBody>
+          <a:bodyPr/>
+          <a:lstStyle/>
+          <a:p>
+            <a:endParaRPr lang="en-US"/>
+          </a:p>
+        </p:txBody>
+      </p:sp>
+      <p:pic>
+        <p:nvPicPr>
+          <p:cNvPr id="3" name="Picture 2"/>
+          <p:cNvPicPr>
+            <a:picLocks noChangeAspect="1"/>
+          </p:cNvPicPr>
+          <p:nvPr/>
+        </p:nvPicPr>
+        <p:blipFill>
+          <a:blip r:embed="rId2"/>
+          <a:stretch>
+            <a:fillRect/>
+          </a:stretch>
+        </p:blipFill>
+        <p:spPr>
+          <a:xfrm>
+            <a:off x="462170" y="67784"/>
+            <a:ext cx="4163006" cy="4324954"/>
+          </a:xfrm>
+          <a:prstGeom prst="rect">
+            <a:avLst/>
+          </a:prstGeom>
+          <a:ln>
+            <a:solidFill>
+              <a:schemeClr val="accent1"/>
+            </a:solidFill>
+          </a:ln>
+        </p:spPr>
+      </p:pic>
+      <p:pic>
+        <p:nvPicPr>
+          <p:cNvPr id="5" name="Picture 4"/>
+          <p:cNvPicPr>
+            <a:picLocks noChangeAspect="1"/>
+          </p:cNvPicPr>
+          <p:nvPr/>
+        </p:nvPicPr>
+        <p:blipFill>
+          <a:blip r:embed="rId3"/>
+          <a:stretch>
+            <a:fillRect/>
+          </a:stretch>
+        </p:blipFill>
+        <p:spPr>
+          <a:xfrm>
+            <a:off x="462170" y="4510205"/>
+            <a:ext cx="5725324" cy="1914792"/>
+          </a:xfrm>
+          <a:prstGeom prst="rect">
+            <a:avLst/>
+          </a:prstGeom>
+          <a:ln>
+            <a:solidFill>
+              <a:schemeClr val="accent1"/>
+            </a:solidFill>
+          </a:ln>
+        </p:spPr>
+      </p:pic>
+      <p:pic>
+        <p:nvPicPr>
+          <p:cNvPr id="6" name="Picture 5"/>
+          <p:cNvPicPr>
+            <a:picLocks noChangeAspect="1"/>
+          </p:cNvPicPr>
+          <p:nvPr/>
+        </p:nvPicPr>
+        <p:blipFill>
+          <a:blip r:embed="rId4"/>
+          <a:stretch>
+            <a:fillRect/>
+          </a:stretch>
+        </p:blipFill>
+        <p:spPr>
+          <a:xfrm>
+            <a:off x="4688722" y="67784"/>
+            <a:ext cx="4277322" cy="2715004"/>
+          </a:xfrm>
+          <a:prstGeom prst="rect">
+            <a:avLst/>
+          </a:prstGeom>
+          <a:ln>
+            <a:solidFill>
+              <a:schemeClr val="accent1"/>
+            </a:solidFill>
+          </a:ln>
+        </p:spPr>
+      </p:pic>
+      <p:pic>
+        <p:nvPicPr>
+          <p:cNvPr id="10" name="Picture 9"/>
+          <p:cNvPicPr>
+            <a:picLocks noChangeAspect="1"/>
+          </p:cNvPicPr>
+          <p:nvPr/>
+        </p:nvPicPr>
+        <p:blipFill>
+          <a:blip r:embed="rId5"/>
+          <a:stretch>
+            <a:fillRect/>
+          </a:stretch>
+        </p:blipFill>
+        <p:spPr>
+          <a:xfrm>
+            <a:off x="6354077" y="4157731"/>
+            <a:ext cx="4096322" cy="2267266"/>
+          </a:xfrm>
+          <a:prstGeom prst="rect">
+            <a:avLst/>
+          </a:prstGeom>
+          <a:ln>
+            <a:solidFill>
+              <a:schemeClr val="accent1"/>
+            </a:solidFill>
+          </a:ln>
+        </p:spPr>
+      </p:pic>
+      <p:pic>
+        <p:nvPicPr>
+          <p:cNvPr id="23" name="Picture 22"/>
+          <p:cNvPicPr>
+            <a:picLocks noChangeAspect="1"/>
+          </p:cNvPicPr>
+          <p:nvPr/>
+        </p:nvPicPr>
+        <p:blipFill>
+          <a:blip r:embed="rId6"/>
+          <a:stretch>
+            <a:fillRect/>
+          </a:stretch>
+        </p:blipFill>
+        <p:spPr>
+          <a:xfrm>
+            <a:off x="9107186" y="940292"/>
+            <a:ext cx="2686425" cy="2819794"/>
+          </a:xfrm>
+          <a:prstGeom prst="rect">
+            <a:avLst/>
+          </a:prstGeom>
+          <a:ln>
+            <a:solidFill>
+              <a:schemeClr val="accent1"/>
+            </a:solidFill>
+          </a:ln>
+        </p:spPr>
+      </p:pic>
+      <p:sp>
+        <p:nvSpPr>
+          <p:cNvPr id="24" name="Rectangle 23"/>
+          <p:cNvSpPr/>
+          <p:nvPr/>
+        </p:nvSpPr>
+        <p:spPr>
+          <a:xfrm>
+            <a:off x="7920111" y="6424997"/>
+            <a:ext cx="3873500" cy="392383"/>
+          </a:xfrm>
+          <a:prstGeom prst="rect">
+            <a:avLst/>
+          </a:prstGeom>
+          <a:noFill/>
+          <a:ln>
+            <a:noFill/>
+          </a:ln>
+        </p:spPr>
+        <p:style>
+          <a:lnRef idx="2">
+            <a:schemeClr val="accent1">
+              <a:shade val="50000"/>
+            </a:schemeClr>
+          </a:lnRef>
+          <a:fillRef idx="1">
+            <a:schemeClr val="accent1"/>
+          </a:fillRef>
+          <a:effectRef idx="0">
+            <a:schemeClr val="accent1"/>
+          </a:effectRef>
+          <a:fontRef idx="minor">
+            <a:schemeClr val="lt1"/>
+          </a:fontRef>
+        </p:style>
+        <p:txBody>
+          <a:bodyPr rtlCol="0" anchor="ctr"/>
+          <a:lstStyle/>
+          <a:p>
+            <a:pPr algn="ctr"/>
+            <a:r>
+              <a:rPr lang="en-US" b="1" dirty="0" smtClean="0">
+                <a:solidFill>
+                  <a:schemeClr val="tx1"/>
+                </a:solidFill>
+              </a:rPr>
+              <a:t>Various properties </a:t>
+            </a:r>
+            <a:r>
+              <a:rPr lang="en-US" b="1" smtClean="0">
+                <a:solidFill>
+                  <a:schemeClr val="tx1"/>
+                </a:solidFill>
+              </a:rPr>
+              <a:t>with expressions</a:t>
+            </a:r>
+            <a:endParaRPr lang="en-US" b="1" dirty="0">
+              <a:solidFill>
+                <a:schemeClr val="tx1"/>
+              </a:solidFill>
+            </a:endParaRPr>
+          </a:p>
+        </p:txBody>
+      </p:sp>
+    </p:spTree>
+    <p:extLst>
+      <p:ext uri="{BB962C8B-B14F-4D97-AF65-F5344CB8AC3E}">
+        <p14:creationId xmlns:p14="http://schemas.microsoft.com/office/powerpoint/2010/main" val="4136435964"/>
       </p:ext>
     </p:extLst>
   </p:cSld>

</xml_diff>

<commit_message>
Documentation on expressions and tasks (#31)
</commit_message>
<xml_diff>
--- a/custom-picture-sources/various pictures.pptx
+++ b/custom-picture-sources/various pictures.pptx
@@ -5,7 +5,7 @@
     <p:sldMasterId id="2147483648" r:id="rId1"/>
   </p:sldMasterIdLst>
   <p:notesMasterIdLst>
-    <p:notesMasterId r:id="rId11"/>
+    <p:notesMasterId r:id="rId17"/>
   </p:notesMasterIdLst>
   <p:sldIdLst>
     <p:sldId id="256" r:id="rId2"/>
@@ -17,6 +17,12 @@
     <p:sldId id="263" r:id="rId8"/>
     <p:sldId id="262" r:id="rId9"/>
     <p:sldId id="264" r:id="rId10"/>
+    <p:sldId id="265" r:id="rId11"/>
+    <p:sldId id="266" r:id="rId12"/>
+    <p:sldId id="267" r:id="rId13"/>
+    <p:sldId id="268" r:id="rId14"/>
+    <p:sldId id="269" r:id="rId15"/>
+    <p:sldId id="270" r:id="rId16"/>
   </p:sldIdLst>
   <p:sldSz cx="12192000" cy="6858000"/>
   <p:notesSz cx="6858000" cy="9144000"/>
@@ -205,7 +211,7 @@
           <a:p>
             <a:fld id="{8AF5FB7F-563E-4AC8-B4DA-B6C429390E53}" type="datetimeFigureOut">
               <a:rPr lang="en-US" smtClean="0"/>
-              <a:t>10/12/2020</a:t>
+              <a:t>4/2/2021</a:t>
             </a:fld>
             <a:endParaRPr lang="en-US"/>
           </a:p>
@@ -688,7 +694,7 @@
           <a:p>
             <a:fld id="{B84B12B9-0A16-483D-BFD5-41DF0EA1BEC4}" type="datetimeFigureOut">
               <a:rPr lang="en-US" smtClean="0"/>
-              <a:t>10/12/2020</a:t>
+              <a:t>4/2/2021</a:t>
             </a:fld>
             <a:endParaRPr lang="en-US"/>
           </a:p>
@@ -858,7 +864,7 @@
           <a:p>
             <a:fld id="{B84B12B9-0A16-483D-BFD5-41DF0EA1BEC4}" type="datetimeFigureOut">
               <a:rPr lang="en-US" smtClean="0"/>
-              <a:t>10/12/2020</a:t>
+              <a:t>4/2/2021</a:t>
             </a:fld>
             <a:endParaRPr lang="en-US"/>
           </a:p>
@@ -1038,7 +1044,7 @@
           <a:p>
             <a:fld id="{B84B12B9-0A16-483D-BFD5-41DF0EA1BEC4}" type="datetimeFigureOut">
               <a:rPr lang="en-US" smtClean="0"/>
-              <a:t>10/12/2020</a:t>
+              <a:t>4/2/2021</a:t>
             </a:fld>
             <a:endParaRPr lang="en-US"/>
           </a:p>
@@ -1208,7 +1214,7 @@
           <a:p>
             <a:fld id="{B84B12B9-0A16-483D-BFD5-41DF0EA1BEC4}" type="datetimeFigureOut">
               <a:rPr lang="en-US" smtClean="0"/>
-              <a:t>10/12/2020</a:t>
+              <a:t>4/2/2021</a:t>
             </a:fld>
             <a:endParaRPr lang="en-US"/>
           </a:p>
@@ -1454,7 +1460,7 @@
           <a:p>
             <a:fld id="{B84B12B9-0A16-483D-BFD5-41DF0EA1BEC4}" type="datetimeFigureOut">
               <a:rPr lang="en-US" smtClean="0"/>
-              <a:t>10/12/2020</a:t>
+              <a:t>4/2/2021</a:t>
             </a:fld>
             <a:endParaRPr lang="en-US"/>
           </a:p>
@@ -1686,7 +1692,7 @@
           <a:p>
             <a:fld id="{B84B12B9-0A16-483D-BFD5-41DF0EA1BEC4}" type="datetimeFigureOut">
               <a:rPr lang="en-US" smtClean="0"/>
-              <a:t>10/12/2020</a:t>
+              <a:t>4/2/2021</a:t>
             </a:fld>
             <a:endParaRPr lang="en-US"/>
           </a:p>
@@ -2053,7 +2059,7 @@
           <a:p>
             <a:fld id="{B84B12B9-0A16-483D-BFD5-41DF0EA1BEC4}" type="datetimeFigureOut">
               <a:rPr lang="en-US" smtClean="0"/>
-              <a:t>10/12/2020</a:t>
+              <a:t>4/2/2021</a:t>
             </a:fld>
             <a:endParaRPr lang="en-US"/>
           </a:p>
@@ -2171,7 +2177,7 @@
           <a:p>
             <a:fld id="{B84B12B9-0A16-483D-BFD5-41DF0EA1BEC4}" type="datetimeFigureOut">
               <a:rPr lang="en-US" smtClean="0"/>
-              <a:t>10/12/2020</a:t>
+              <a:t>4/2/2021</a:t>
             </a:fld>
             <a:endParaRPr lang="en-US"/>
           </a:p>
@@ -2266,7 +2272,7 @@
           <a:p>
             <a:fld id="{B84B12B9-0A16-483D-BFD5-41DF0EA1BEC4}" type="datetimeFigureOut">
               <a:rPr lang="en-US" smtClean="0"/>
-              <a:t>10/12/2020</a:t>
+              <a:t>4/2/2021</a:t>
             </a:fld>
             <a:endParaRPr lang="en-US"/>
           </a:p>
@@ -2543,7 +2549,7 @@
           <a:p>
             <a:fld id="{B84B12B9-0A16-483D-BFD5-41DF0EA1BEC4}" type="datetimeFigureOut">
               <a:rPr lang="en-US" smtClean="0"/>
-              <a:t>10/12/2020</a:t>
+              <a:t>4/2/2021</a:t>
             </a:fld>
             <a:endParaRPr lang="en-US"/>
           </a:p>
@@ -2796,7 +2802,7 @@
           <a:p>
             <a:fld id="{B84B12B9-0A16-483D-BFD5-41DF0EA1BEC4}" type="datetimeFigureOut">
               <a:rPr lang="en-US" smtClean="0"/>
-              <a:t>10/12/2020</a:t>
+              <a:t>4/2/2021</a:t>
             </a:fld>
             <a:endParaRPr lang="en-US"/>
           </a:p>
@@ -3009,7 +3015,7 @@
           <a:p>
             <a:fld id="{B84B12B9-0A16-483D-BFD5-41DF0EA1BEC4}" type="datetimeFigureOut">
               <a:rPr lang="en-US" smtClean="0"/>
-              <a:t>10/12/2020</a:t>
+              <a:t>4/2/2021</a:t>
             </a:fld>
             <a:endParaRPr lang="en-US"/>
           </a:p>
@@ -3456,6 +3462,1433 @@
     <p:extLst>
       <p:ext uri="{BB962C8B-B14F-4D97-AF65-F5344CB8AC3E}">
         <p14:creationId xmlns:p14="http://schemas.microsoft.com/office/powerpoint/2010/main" val="2111753392"/>
+      </p:ext>
+    </p:extLst>
+  </p:cSld>
+  <p:clrMapOvr>
+    <a:masterClrMapping/>
+  </p:clrMapOvr>
+  <p:timing>
+    <p:tnLst>
+      <p:par>
+        <p:cTn id="1" dur="indefinite" restart="never" nodeType="tmRoot"/>
+      </p:par>
+    </p:tnLst>
+  </p:timing>
+</p:sld>
+</file>
+
+<file path=ppt/slides/slide10.xml><?xml version="1.0" encoding="utf-8"?>
+<p:sld xmlns:a="http://schemas.openxmlformats.org/drawingml/2006/main" xmlns:r="http://schemas.openxmlformats.org/officeDocument/2006/relationships" xmlns:p="http://schemas.openxmlformats.org/presentationml/2006/main">
+  <p:cSld>
+    <p:spTree>
+      <p:nvGrpSpPr>
+        <p:cNvPr id="1" name=""/>
+        <p:cNvGrpSpPr/>
+        <p:nvPr/>
+      </p:nvGrpSpPr>
+      <p:grpSpPr>
+        <a:xfrm>
+          <a:off x="0" y="0"/>
+          <a:ext cx="0" cy="0"/>
+          <a:chOff x="0" y="0"/>
+          <a:chExt cx="0" cy="0"/>
+        </a:xfrm>
+      </p:grpSpPr>
+      <p:sp>
+        <p:nvSpPr>
+          <p:cNvPr id="2" name="Title 1"/>
+          <p:cNvSpPr>
+            <a:spLocks noGrp="1"/>
+          </p:cNvSpPr>
+          <p:nvPr>
+            <p:ph type="title"/>
+          </p:nvPr>
+        </p:nvSpPr>
+        <p:spPr/>
+        <p:txBody>
+          <a:bodyPr/>
+          <a:lstStyle/>
+          <a:p>
+            <a:endParaRPr lang="en-US" dirty="0"/>
+          </a:p>
+        </p:txBody>
+      </p:sp>
+      <p:pic>
+        <p:nvPicPr>
+          <p:cNvPr id="4" name="Picture 3"/>
+          <p:cNvPicPr>
+            <a:picLocks noChangeAspect="1"/>
+          </p:cNvPicPr>
+          <p:nvPr/>
+        </p:nvPicPr>
+        <p:blipFill>
+          <a:blip r:embed="rId2"/>
+          <a:stretch>
+            <a:fillRect/>
+          </a:stretch>
+        </p:blipFill>
+        <p:spPr>
+          <a:xfrm>
+            <a:off x="985917" y="1376376"/>
+            <a:ext cx="9685488" cy="4365084"/>
+          </a:xfrm>
+          <a:prstGeom prst="rect">
+            <a:avLst/>
+          </a:prstGeom>
+        </p:spPr>
+      </p:pic>
+      <p:sp>
+        <p:nvSpPr>
+          <p:cNvPr id="5" name="Rectangle 4"/>
+          <p:cNvSpPr/>
+          <p:nvPr/>
+        </p:nvSpPr>
+        <p:spPr>
+          <a:xfrm>
+            <a:off x="2580556" y="2874377"/>
+            <a:ext cx="280137" cy="282601"/>
+          </a:xfrm>
+          <a:prstGeom prst="rect">
+            <a:avLst/>
+          </a:prstGeom>
+          <a:noFill/>
+          <a:ln w="57150">
+            <a:solidFill>
+              <a:srgbClr val="FF0000"/>
+            </a:solidFill>
+          </a:ln>
+        </p:spPr>
+        <p:style>
+          <a:lnRef idx="2">
+            <a:schemeClr val="accent1">
+              <a:shade val="50000"/>
+            </a:schemeClr>
+          </a:lnRef>
+          <a:fillRef idx="1">
+            <a:schemeClr val="accent1"/>
+          </a:fillRef>
+          <a:effectRef idx="0">
+            <a:schemeClr val="accent1"/>
+          </a:effectRef>
+          <a:fontRef idx="minor">
+            <a:schemeClr val="lt1"/>
+          </a:fontRef>
+        </p:style>
+        <p:txBody>
+          <a:bodyPr rtlCol="0" anchor="ctr"/>
+          <a:lstStyle/>
+          <a:p>
+            <a:endParaRPr lang="en-US" dirty="0">
+              <a:solidFill>
+                <a:schemeClr val="tx1"/>
+              </a:solidFill>
+            </a:endParaRPr>
+          </a:p>
+        </p:txBody>
+      </p:sp>
+    </p:spTree>
+    <p:extLst>
+      <p:ext uri="{BB962C8B-B14F-4D97-AF65-F5344CB8AC3E}">
+        <p14:creationId xmlns:p14="http://schemas.microsoft.com/office/powerpoint/2010/main" val="572802433"/>
+      </p:ext>
+    </p:extLst>
+  </p:cSld>
+  <p:clrMapOvr>
+    <a:masterClrMapping/>
+  </p:clrMapOvr>
+  <p:timing>
+    <p:tnLst>
+      <p:par>
+        <p:cTn id="1" dur="indefinite" restart="never" nodeType="tmRoot"/>
+      </p:par>
+    </p:tnLst>
+  </p:timing>
+</p:sld>
+</file>
+
+<file path=ppt/slides/slide11.xml><?xml version="1.0" encoding="utf-8"?>
+<p:sld xmlns:a="http://schemas.openxmlformats.org/drawingml/2006/main" xmlns:r="http://schemas.openxmlformats.org/officeDocument/2006/relationships" xmlns:p="http://schemas.openxmlformats.org/presentationml/2006/main">
+  <p:cSld>
+    <p:spTree>
+      <p:nvGrpSpPr>
+        <p:cNvPr id="1" name=""/>
+        <p:cNvGrpSpPr/>
+        <p:nvPr/>
+      </p:nvGrpSpPr>
+      <p:grpSpPr>
+        <a:xfrm>
+          <a:off x="0" y="0"/>
+          <a:ext cx="0" cy="0"/>
+          <a:chOff x="0" y="0"/>
+          <a:chExt cx="0" cy="0"/>
+        </a:xfrm>
+      </p:grpSpPr>
+      <p:sp>
+        <p:nvSpPr>
+          <p:cNvPr id="2" name="Title 1"/>
+          <p:cNvSpPr>
+            <a:spLocks noGrp="1"/>
+          </p:cNvSpPr>
+          <p:nvPr>
+            <p:ph type="title"/>
+          </p:nvPr>
+        </p:nvSpPr>
+        <p:spPr/>
+        <p:txBody>
+          <a:bodyPr/>
+          <a:lstStyle/>
+          <a:p>
+            <a:endParaRPr lang="en-US" dirty="0"/>
+          </a:p>
+        </p:txBody>
+      </p:sp>
+      <p:pic>
+        <p:nvPicPr>
+          <p:cNvPr id="4" name="Picture 3"/>
+          <p:cNvPicPr>
+            <a:picLocks noChangeAspect="1"/>
+          </p:cNvPicPr>
+          <p:nvPr/>
+        </p:nvPicPr>
+        <p:blipFill>
+          <a:blip r:embed="rId2"/>
+          <a:stretch>
+            <a:fillRect/>
+          </a:stretch>
+        </p:blipFill>
+        <p:spPr>
+          <a:xfrm>
+            <a:off x="1052421" y="1690688"/>
+            <a:ext cx="8554644" cy="704948"/>
+          </a:xfrm>
+          <a:prstGeom prst="rect">
+            <a:avLst/>
+          </a:prstGeom>
+        </p:spPr>
+      </p:pic>
+      <p:sp>
+        <p:nvSpPr>
+          <p:cNvPr id="5" name="Oval 4"/>
+          <p:cNvSpPr/>
+          <p:nvPr/>
+        </p:nvSpPr>
+        <p:spPr>
+          <a:xfrm>
+            <a:off x="1006446" y="1604916"/>
+            <a:ext cx="2353261" cy="1064786"/>
+          </a:xfrm>
+          <a:prstGeom prst="ellipse">
+            <a:avLst/>
+          </a:prstGeom>
+          <a:noFill/>
+          <a:ln w="57150">
+            <a:solidFill>
+              <a:schemeClr val="accent1"/>
+            </a:solidFill>
+          </a:ln>
+        </p:spPr>
+        <p:style>
+          <a:lnRef idx="2">
+            <a:schemeClr val="accent1">
+              <a:shade val="50000"/>
+            </a:schemeClr>
+          </a:lnRef>
+          <a:fillRef idx="1">
+            <a:schemeClr val="accent1"/>
+          </a:fillRef>
+          <a:effectRef idx="0">
+            <a:schemeClr val="accent1"/>
+          </a:effectRef>
+          <a:fontRef idx="minor">
+            <a:schemeClr val="lt1"/>
+          </a:fontRef>
+        </p:style>
+        <p:txBody>
+          <a:bodyPr rtlCol="0" anchor="ctr"/>
+          <a:lstStyle/>
+          <a:p>
+            <a:pPr algn="ctr"/>
+            <a:endParaRPr lang="en-US"/>
+          </a:p>
+        </p:txBody>
+      </p:sp>
+      <p:sp>
+        <p:nvSpPr>
+          <p:cNvPr id="6" name="Oval 5"/>
+          <p:cNvSpPr/>
+          <p:nvPr/>
+        </p:nvSpPr>
+        <p:spPr>
+          <a:xfrm>
+            <a:off x="7315200" y="1604916"/>
+            <a:ext cx="2291865" cy="1064786"/>
+          </a:xfrm>
+          <a:prstGeom prst="ellipse">
+            <a:avLst/>
+          </a:prstGeom>
+          <a:noFill/>
+          <a:ln w="57150">
+            <a:solidFill>
+              <a:schemeClr val="accent1"/>
+            </a:solidFill>
+          </a:ln>
+        </p:spPr>
+        <p:style>
+          <a:lnRef idx="2">
+            <a:schemeClr val="accent1">
+              <a:shade val="50000"/>
+            </a:schemeClr>
+          </a:lnRef>
+          <a:fillRef idx="1">
+            <a:schemeClr val="accent1"/>
+          </a:fillRef>
+          <a:effectRef idx="0">
+            <a:schemeClr val="accent1"/>
+          </a:effectRef>
+          <a:fontRef idx="minor">
+            <a:schemeClr val="lt1"/>
+          </a:fontRef>
+        </p:style>
+        <p:txBody>
+          <a:bodyPr rtlCol="0" anchor="ctr"/>
+          <a:lstStyle/>
+          <a:p>
+            <a:pPr algn="ctr"/>
+            <a:endParaRPr lang="en-US"/>
+          </a:p>
+        </p:txBody>
+      </p:sp>
+      <p:cxnSp>
+        <p:nvCxnSpPr>
+          <p:cNvPr id="8" name="Straight Arrow Connector 7"/>
+          <p:cNvCxnSpPr/>
+          <p:nvPr/>
+        </p:nvCxnSpPr>
+        <p:spPr>
+          <a:xfrm>
+            <a:off x="3432832" y="2137309"/>
+            <a:ext cx="3810851" cy="0"/>
+          </a:xfrm>
+          <a:prstGeom prst="straightConnector1">
+            <a:avLst/>
+          </a:prstGeom>
+          <a:ln w="76200">
+            <a:tailEnd type="triangle"/>
+          </a:ln>
+        </p:spPr>
+        <p:style>
+          <a:lnRef idx="1">
+            <a:schemeClr val="accent1"/>
+          </a:lnRef>
+          <a:fillRef idx="0">
+            <a:schemeClr val="accent1"/>
+          </a:fillRef>
+          <a:effectRef idx="0">
+            <a:schemeClr val="accent1"/>
+          </a:effectRef>
+          <a:fontRef idx="minor">
+            <a:schemeClr val="tx1"/>
+          </a:fontRef>
+        </p:style>
+      </p:cxnSp>
+      <p:pic>
+        <p:nvPicPr>
+          <p:cNvPr id="19" name="Picture 18"/>
+          <p:cNvPicPr>
+            <a:picLocks noChangeAspect="1"/>
+          </p:cNvPicPr>
+          <p:nvPr/>
+        </p:nvPicPr>
+        <p:blipFill rotWithShape="1">
+          <a:blip r:embed="rId3"/>
+          <a:srcRect t="21901"/>
+          <a:stretch/>
+        </p:blipFill>
+        <p:spPr>
+          <a:xfrm>
+            <a:off x="6173264" y="2814737"/>
+            <a:ext cx="5509930" cy="2361055"/>
+          </a:xfrm>
+          <a:prstGeom prst="rect">
+            <a:avLst/>
+          </a:prstGeom>
+        </p:spPr>
+      </p:pic>
+      <p:pic>
+        <p:nvPicPr>
+          <p:cNvPr id="22" name="Picture 21"/>
+          <p:cNvPicPr>
+            <a:picLocks noChangeAspect="1"/>
+          </p:cNvPicPr>
+          <p:nvPr/>
+        </p:nvPicPr>
+        <p:blipFill rotWithShape="1">
+          <a:blip r:embed="rId4"/>
+          <a:srcRect l="12707" b="42295"/>
+          <a:stretch/>
+        </p:blipFill>
+        <p:spPr>
+          <a:xfrm>
+            <a:off x="704955" y="2878016"/>
+            <a:ext cx="4332545" cy="2138413"/>
+          </a:xfrm>
+          <a:prstGeom prst="rect">
+            <a:avLst/>
+          </a:prstGeom>
+        </p:spPr>
+      </p:pic>
+      <p:sp>
+        <p:nvSpPr>
+          <p:cNvPr id="23" name="Rectangle 22"/>
+          <p:cNvSpPr/>
+          <p:nvPr/>
+        </p:nvSpPr>
+        <p:spPr>
+          <a:xfrm>
+            <a:off x="1409156" y="3550836"/>
+            <a:ext cx="1547839" cy="419399"/>
+          </a:xfrm>
+          <a:prstGeom prst="rect">
+            <a:avLst/>
+          </a:prstGeom>
+          <a:noFill/>
+          <a:ln w="57150">
+            <a:solidFill>
+              <a:schemeClr val="accent1"/>
+            </a:solidFill>
+          </a:ln>
+        </p:spPr>
+        <p:style>
+          <a:lnRef idx="2">
+            <a:schemeClr val="accent1">
+              <a:shade val="50000"/>
+            </a:schemeClr>
+          </a:lnRef>
+          <a:fillRef idx="1">
+            <a:schemeClr val="accent1"/>
+          </a:fillRef>
+          <a:effectRef idx="0">
+            <a:schemeClr val="accent1"/>
+          </a:effectRef>
+          <a:fontRef idx="minor">
+            <a:schemeClr val="lt1"/>
+          </a:fontRef>
+        </p:style>
+        <p:txBody>
+          <a:bodyPr rtlCol="0" anchor="ctr"/>
+          <a:lstStyle/>
+          <a:p>
+            <a:pPr algn="ctr"/>
+            <a:endParaRPr lang="en-US"/>
+          </a:p>
+        </p:txBody>
+      </p:sp>
+      <p:cxnSp>
+        <p:nvCxnSpPr>
+          <p:cNvPr id="25" name="Straight Connector 24"/>
+          <p:cNvCxnSpPr>
+            <a:stCxn id="5" idx="4"/>
+            <a:endCxn id="23" idx="0"/>
+          </p:cNvCxnSpPr>
+          <p:nvPr/>
+        </p:nvCxnSpPr>
+        <p:spPr>
+          <a:xfrm flipH="1">
+            <a:off x="2183076" y="2669702"/>
+            <a:ext cx="1" cy="881134"/>
+          </a:xfrm>
+          <a:prstGeom prst="line">
+            <a:avLst/>
+          </a:prstGeom>
+          <a:ln w="76200"/>
+        </p:spPr>
+        <p:style>
+          <a:lnRef idx="1">
+            <a:schemeClr val="accent1"/>
+          </a:lnRef>
+          <a:fillRef idx="0">
+            <a:schemeClr val="accent1"/>
+          </a:fillRef>
+          <a:effectRef idx="0">
+            <a:schemeClr val="accent1"/>
+          </a:effectRef>
+          <a:fontRef idx="minor">
+            <a:schemeClr val="tx1"/>
+          </a:fontRef>
+        </p:style>
+      </p:cxnSp>
+      <p:sp>
+        <p:nvSpPr>
+          <p:cNvPr id="27" name="Rectangle 26"/>
+          <p:cNvSpPr/>
+          <p:nvPr/>
+        </p:nvSpPr>
+        <p:spPr>
+          <a:xfrm>
+            <a:off x="7691612" y="3550836"/>
+            <a:ext cx="1547839" cy="419399"/>
+          </a:xfrm>
+          <a:prstGeom prst="rect">
+            <a:avLst/>
+          </a:prstGeom>
+          <a:noFill/>
+          <a:ln w="57150">
+            <a:solidFill>
+              <a:schemeClr val="accent1"/>
+            </a:solidFill>
+          </a:ln>
+        </p:spPr>
+        <p:style>
+          <a:lnRef idx="2">
+            <a:schemeClr val="accent1">
+              <a:shade val="50000"/>
+            </a:schemeClr>
+          </a:lnRef>
+          <a:fillRef idx="1">
+            <a:schemeClr val="accent1"/>
+          </a:fillRef>
+          <a:effectRef idx="0">
+            <a:schemeClr val="accent1"/>
+          </a:effectRef>
+          <a:fontRef idx="minor">
+            <a:schemeClr val="lt1"/>
+          </a:fontRef>
+        </p:style>
+        <p:txBody>
+          <a:bodyPr rtlCol="0" anchor="ctr"/>
+          <a:lstStyle/>
+          <a:p>
+            <a:pPr algn="ctr"/>
+            <a:endParaRPr lang="en-US"/>
+          </a:p>
+        </p:txBody>
+      </p:sp>
+      <p:cxnSp>
+        <p:nvCxnSpPr>
+          <p:cNvPr id="28" name="Straight Connector 27"/>
+          <p:cNvCxnSpPr>
+            <a:stCxn id="6" idx="4"/>
+            <a:endCxn id="27" idx="0"/>
+          </p:cNvCxnSpPr>
+          <p:nvPr/>
+        </p:nvCxnSpPr>
+        <p:spPr>
+          <a:xfrm>
+            <a:off x="8461133" y="2669702"/>
+            <a:ext cx="4399" cy="881134"/>
+          </a:xfrm>
+          <a:prstGeom prst="line">
+            <a:avLst/>
+          </a:prstGeom>
+          <a:ln w="76200"/>
+        </p:spPr>
+        <p:style>
+          <a:lnRef idx="1">
+            <a:schemeClr val="accent1"/>
+          </a:lnRef>
+          <a:fillRef idx="0">
+            <a:schemeClr val="accent1"/>
+          </a:fillRef>
+          <a:effectRef idx="0">
+            <a:schemeClr val="accent1"/>
+          </a:effectRef>
+          <a:fontRef idx="minor">
+            <a:schemeClr val="tx1"/>
+          </a:fontRef>
+        </p:style>
+      </p:cxnSp>
+      <p:sp>
+        <p:nvSpPr>
+          <p:cNvPr id="32" name="Rectangle 31"/>
+          <p:cNvSpPr/>
+          <p:nvPr/>
+        </p:nvSpPr>
+        <p:spPr>
+          <a:xfrm>
+            <a:off x="6649407" y="4506490"/>
+            <a:ext cx="3623449" cy="814337"/>
+          </a:xfrm>
+          <a:prstGeom prst="rect">
+            <a:avLst/>
+          </a:prstGeom>
+          <a:solidFill>
+            <a:schemeClr val="bg1">
+              <a:lumMod val="95000"/>
+            </a:schemeClr>
+          </a:solidFill>
+          <a:ln w="57150">
+            <a:solidFill>
+              <a:schemeClr val="accent1"/>
+            </a:solidFill>
+          </a:ln>
+        </p:spPr>
+        <p:style>
+          <a:lnRef idx="2">
+            <a:schemeClr val="accent1">
+              <a:shade val="50000"/>
+            </a:schemeClr>
+          </a:lnRef>
+          <a:fillRef idx="1">
+            <a:schemeClr val="accent1"/>
+          </a:fillRef>
+          <a:effectRef idx="0">
+            <a:schemeClr val="accent1"/>
+          </a:effectRef>
+          <a:fontRef idx="minor">
+            <a:schemeClr val="lt1"/>
+          </a:fontRef>
+        </p:style>
+        <p:txBody>
+          <a:bodyPr rtlCol="0" anchor="ctr"/>
+          <a:lstStyle/>
+          <a:p>
+            <a:pPr algn="ctr"/>
+            <a:r>
+              <a:rPr lang="en-US" dirty="0">
+                <a:solidFill>
+                  <a:srgbClr val="0070C0"/>
+                </a:solidFill>
+              </a:rPr>
+              <a:t>The reusable </a:t>
+            </a:r>
+            <a:r>
+              <a:rPr lang="en-US" dirty="0" err="1">
+                <a:solidFill>
+                  <a:srgbClr val="0070C0"/>
+                </a:solidFill>
+              </a:rPr>
+              <a:t>HumanTask</a:t>
+            </a:r>
+            <a:r>
+              <a:rPr lang="en-US" dirty="0">
+                <a:solidFill>
+                  <a:srgbClr val="0070C0"/>
+                </a:solidFill>
+              </a:rPr>
+              <a:t> </a:t>
+            </a:r>
+            <a:br>
+              <a:rPr lang="en-US" dirty="0">
+                <a:solidFill>
+                  <a:srgbClr val="0070C0"/>
+                </a:solidFill>
+              </a:rPr>
+            </a:br>
+            <a:r>
+              <a:rPr lang="en-US" dirty="0">
+                <a:solidFill>
+                  <a:srgbClr val="0070C0"/>
+                </a:solidFill>
+              </a:rPr>
+              <a:t>from the Repository</a:t>
+            </a:r>
+          </a:p>
+        </p:txBody>
+      </p:sp>
+      <p:sp>
+        <p:nvSpPr>
+          <p:cNvPr id="34" name="Rectangle 33"/>
+          <p:cNvSpPr/>
+          <p:nvPr/>
+        </p:nvSpPr>
+        <p:spPr>
+          <a:xfrm>
+            <a:off x="1006446" y="4544352"/>
+            <a:ext cx="3339083" cy="814337"/>
+          </a:xfrm>
+          <a:prstGeom prst="rect">
+            <a:avLst/>
+          </a:prstGeom>
+          <a:solidFill>
+            <a:schemeClr val="bg1">
+              <a:lumMod val="95000"/>
+            </a:schemeClr>
+          </a:solidFill>
+          <a:ln w="57150">
+            <a:solidFill>
+              <a:schemeClr val="accent1"/>
+            </a:solidFill>
+          </a:ln>
+        </p:spPr>
+        <p:style>
+          <a:lnRef idx="2">
+            <a:schemeClr val="accent1">
+              <a:shade val="50000"/>
+            </a:schemeClr>
+          </a:lnRef>
+          <a:fillRef idx="1">
+            <a:schemeClr val="accent1"/>
+          </a:fillRef>
+          <a:effectRef idx="0">
+            <a:schemeClr val="accent1"/>
+          </a:effectRef>
+          <a:fontRef idx="minor">
+            <a:schemeClr val="lt1"/>
+          </a:fontRef>
+        </p:style>
+        <p:txBody>
+          <a:bodyPr rtlCol="0" anchor="ctr"/>
+          <a:lstStyle/>
+          <a:p>
+            <a:pPr algn="ctr"/>
+            <a:r>
+              <a:rPr lang="en-US" dirty="0" smtClean="0">
+                <a:solidFill>
+                  <a:srgbClr val="0070C0"/>
+                </a:solidFill>
+              </a:rPr>
+              <a:t>The Case File Item</a:t>
+            </a:r>
+          </a:p>
+          <a:p>
+            <a:pPr algn="ctr"/>
+            <a:r>
+              <a:rPr lang="en-US" dirty="0" smtClean="0">
+                <a:solidFill>
+                  <a:srgbClr val="0070C0"/>
+                </a:solidFill>
+              </a:rPr>
+              <a:t>inside HelloWorld</a:t>
+            </a:r>
+            <a:endParaRPr lang="en-US" dirty="0">
+              <a:solidFill>
+                <a:srgbClr val="0070C0"/>
+              </a:solidFill>
+            </a:endParaRPr>
+          </a:p>
+        </p:txBody>
+      </p:sp>
+      <p:pic>
+        <p:nvPicPr>
+          <p:cNvPr id="3" name="Picture 2"/>
+          <p:cNvPicPr>
+            <a:picLocks noChangeAspect="1"/>
+          </p:cNvPicPr>
+          <p:nvPr/>
+        </p:nvPicPr>
+        <p:blipFill>
+          <a:blip r:embed="rId5"/>
+          <a:stretch>
+            <a:fillRect/>
+          </a:stretch>
+        </p:blipFill>
+        <p:spPr>
+          <a:xfrm>
+            <a:off x="1280440" y="1480865"/>
+            <a:ext cx="9631119" cy="3896269"/>
+          </a:xfrm>
+          <a:prstGeom prst="rect">
+            <a:avLst/>
+          </a:prstGeom>
+        </p:spPr>
+      </p:pic>
+    </p:spTree>
+    <p:extLst>
+      <p:ext uri="{BB962C8B-B14F-4D97-AF65-F5344CB8AC3E}">
+        <p14:creationId xmlns:p14="http://schemas.microsoft.com/office/powerpoint/2010/main" val="2404676016"/>
+      </p:ext>
+    </p:extLst>
+  </p:cSld>
+  <p:clrMapOvr>
+    <a:masterClrMapping/>
+  </p:clrMapOvr>
+  <p:timing>
+    <p:tnLst>
+      <p:par>
+        <p:cTn id="1" dur="indefinite" restart="never" nodeType="tmRoot"/>
+      </p:par>
+    </p:tnLst>
+  </p:timing>
+</p:sld>
+</file>
+
+<file path=ppt/slides/slide12.xml><?xml version="1.0" encoding="utf-8"?>
+<p:sld xmlns:a="http://schemas.openxmlformats.org/drawingml/2006/main" xmlns:r="http://schemas.openxmlformats.org/officeDocument/2006/relationships" xmlns:p="http://schemas.openxmlformats.org/presentationml/2006/main">
+  <p:cSld>
+    <p:spTree>
+      <p:nvGrpSpPr>
+        <p:cNvPr id="1" name=""/>
+        <p:cNvGrpSpPr/>
+        <p:nvPr/>
+      </p:nvGrpSpPr>
+      <p:grpSpPr>
+        <a:xfrm>
+          <a:off x="0" y="0"/>
+          <a:ext cx="0" cy="0"/>
+          <a:chOff x="0" y="0"/>
+          <a:chExt cx="0" cy="0"/>
+        </a:xfrm>
+      </p:grpSpPr>
+      <p:sp>
+        <p:nvSpPr>
+          <p:cNvPr id="2" name="Title 1"/>
+          <p:cNvSpPr>
+            <a:spLocks noGrp="1"/>
+          </p:cNvSpPr>
+          <p:nvPr>
+            <p:ph type="title"/>
+          </p:nvPr>
+        </p:nvSpPr>
+        <p:spPr/>
+        <p:txBody>
+          <a:bodyPr/>
+          <a:lstStyle/>
+          <a:p>
+            <a:endParaRPr lang="en-US" dirty="0"/>
+          </a:p>
+        </p:txBody>
+      </p:sp>
+      <p:pic>
+        <p:nvPicPr>
+          <p:cNvPr id="3" name="Picture 2"/>
+          <p:cNvPicPr>
+            <a:picLocks noChangeAspect="1"/>
+          </p:cNvPicPr>
+          <p:nvPr/>
+        </p:nvPicPr>
+        <p:blipFill>
+          <a:blip r:embed="rId2"/>
+          <a:stretch>
+            <a:fillRect/>
+          </a:stretch>
+        </p:blipFill>
+        <p:spPr>
+          <a:xfrm>
+            <a:off x="1280440" y="1480865"/>
+            <a:ext cx="9631119" cy="3896269"/>
+          </a:xfrm>
+          <a:prstGeom prst="rect">
+            <a:avLst/>
+          </a:prstGeom>
+        </p:spPr>
+      </p:pic>
+      <p:sp>
+        <p:nvSpPr>
+          <p:cNvPr id="4" name="Rectangle 3"/>
+          <p:cNvSpPr/>
+          <p:nvPr/>
+        </p:nvSpPr>
+        <p:spPr>
+          <a:xfrm>
+            <a:off x="3745301" y="2381123"/>
+            <a:ext cx="955574" cy="503226"/>
+          </a:xfrm>
+          <a:prstGeom prst="rect">
+            <a:avLst/>
+          </a:prstGeom>
+          <a:noFill/>
+          <a:ln w="57150">
+            <a:solidFill>
+              <a:srgbClr val="FF0000"/>
+            </a:solidFill>
+          </a:ln>
+        </p:spPr>
+        <p:style>
+          <a:lnRef idx="2">
+            <a:schemeClr val="accent1">
+              <a:shade val="50000"/>
+            </a:schemeClr>
+          </a:lnRef>
+          <a:fillRef idx="1">
+            <a:schemeClr val="accent1"/>
+          </a:fillRef>
+          <a:effectRef idx="0">
+            <a:schemeClr val="accent1"/>
+          </a:effectRef>
+          <a:fontRef idx="minor">
+            <a:schemeClr val="lt1"/>
+          </a:fontRef>
+        </p:style>
+        <p:txBody>
+          <a:bodyPr rtlCol="0" anchor="ctr"/>
+          <a:lstStyle/>
+          <a:p>
+            <a:endParaRPr lang="en-US" dirty="0">
+              <a:solidFill>
+                <a:schemeClr val="tx1"/>
+              </a:solidFill>
+            </a:endParaRPr>
+          </a:p>
+        </p:txBody>
+      </p:sp>
+    </p:spTree>
+    <p:extLst>
+      <p:ext uri="{BB962C8B-B14F-4D97-AF65-F5344CB8AC3E}">
+        <p14:creationId xmlns:p14="http://schemas.microsoft.com/office/powerpoint/2010/main" val="2689687881"/>
+      </p:ext>
+    </p:extLst>
+  </p:cSld>
+  <p:clrMapOvr>
+    <a:masterClrMapping/>
+  </p:clrMapOvr>
+  <p:timing>
+    <p:tnLst>
+      <p:par>
+        <p:cTn id="1" dur="indefinite" restart="never" nodeType="tmRoot"/>
+      </p:par>
+    </p:tnLst>
+  </p:timing>
+</p:sld>
+</file>
+
+<file path=ppt/slides/slide13.xml><?xml version="1.0" encoding="utf-8"?>
+<p:sld xmlns:a="http://schemas.openxmlformats.org/drawingml/2006/main" xmlns:r="http://schemas.openxmlformats.org/officeDocument/2006/relationships" xmlns:p="http://schemas.openxmlformats.org/presentationml/2006/main">
+  <p:cSld>
+    <p:spTree>
+      <p:nvGrpSpPr>
+        <p:cNvPr id="1" name=""/>
+        <p:cNvGrpSpPr/>
+        <p:nvPr/>
+      </p:nvGrpSpPr>
+      <p:grpSpPr>
+        <a:xfrm>
+          <a:off x="0" y="0"/>
+          <a:ext cx="0" cy="0"/>
+          <a:chOff x="0" y="0"/>
+          <a:chExt cx="0" cy="0"/>
+        </a:xfrm>
+      </p:grpSpPr>
+      <p:sp>
+        <p:nvSpPr>
+          <p:cNvPr id="2" name="Title 1"/>
+          <p:cNvSpPr>
+            <a:spLocks noGrp="1"/>
+          </p:cNvSpPr>
+          <p:nvPr>
+            <p:ph type="title"/>
+          </p:nvPr>
+        </p:nvSpPr>
+        <p:spPr/>
+        <p:txBody>
+          <a:bodyPr/>
+          <a:lstStyle/>
+          <a:p>
+            <a:r>
+              <a:rPr lang="en-US" dirty="0" smtClean="0"/>
+              <a:t/>
+            </a:r>
+            <a:br>
+              <a:rPr lang="en-US" dirty="0" smtClean="0"/>
+            </a:br>
+            <a:endParaRPr lang="en-US" dirty="0"/>
+          </a:p>
+        </p:txBody>
+      </p:sp>
+      <p:pic>
+        <p:nvPicPr>
+          <p:cNvPr id="3" name="Picture 2"/>
+          <p:cNvPicPr>
+            <a:picLocks noChangeAspect="1"/>
+          </p:cNvPicPr>
+          <p:nvPr/>
+        </p:nvPicPr>
+        <p:blipFill>
+          <a:blip r:embed="rId2"/>
+          <a:stretch>
+            <a:fillRect/>
+          </a:stretch>
+        </p:blipFill>
+        <p:spPr>
+          <a:xfrm>
+            <a:off x="2804653" y="2033391"/>
+            <a:ext cx="6582694" cy="2876951"/>
+          </a:xfrm>
+          <a:prstGeom prst="rect">
+            <a:avLst/>
+          </a:prstGeom>
+        </p:spPr>
+      </p:pic>
+      <p:sp>
+        <p:nvSpPr>
+          <p:cNvPr id="4" name="Rectangle 3"/>
+          <p:cNvSpPr/>
+          <p:nvPr/>
+        </p:nvSpPr>
+        <p:spPr>
+          <a:xfrm>
+            <a:off x="2804653" y="1990524"/>
+            <a:ext cx="6682247" cy="2876951"/>
+          </a:xfrm>
+          <a:prstGeom prst="rect">
+            <a:avLst/>
+          </a:prstGeom>
+          <a:noFill/>
+          <a:ln>
+            <a:solidFill>
+              <a:schemeClr val="accent1"/>
+            </a:solidFill>
+          </a:ln>
+        </p:spPr>
+        <p:style>
+          <a:lnRef idx="2">
+            <a:schemeClr val="accent1">
+              <a:shade val="50000"/>
+            </a:schemeClr>
+          </a:lnRef>
+          <a:fillRef idx="1">
+            <a:schemeClr val="accent1"/>
+          </a:fillRef>
+          <a:effectRef idx="0">
+            <a:schemeClr val="accent1"/>
+          </a:effectRef>
+          <a:fontRef idx="minor">
+            <a:schemeClr val="lt1"/>
+          </a:fontRef>
+        </p:style>
+        <p:txBody>
+          <a:bodyPr rtlCol="0" anchor="ctr"/>
+          <a:lstStyle/>
+          <a:p>
+            <a:pPr algn="ctr"/>
+            <a:endParaRPr lang="en-US"/>
+          </a:p>
+        </p:txBody>
+      </p:sp>
+    </p:spTree>
+    <p:extLst>
+      <p:ext uri="{BB962C8B-B14F-4D97-AF65-F5344CB8AC3E}">
+        <p14:creationId xmlns:p14="http://schemas.microsoft.com/office/powerpoint/2010/main" val="2806717025"/>
+      </p:ext>
+    </p:extLst>
+  </p:cSld>
+  <p:clrMapOvr>
+    <a:masterClrMapping/>
+  </p:clrMapOvr>
+  <p:timing>
+    <p:tnLst>
+      <p:par>
+        <p:cTn id="1" dur="indefinite" restart="never" nodeType="tmRoot"/>
+      </p:par>
+    </p:tnLst>
+  </p:timing>
+</p:sld>
+</file>
+
+<file path=ppt/slides/slide14.xml><?xml version="1.0" encoding="utf-8"?>
+<p:sld xmlns:a="http://schemas.openxmlformats.org/drawingml/2006/main" xmlns:r="http://schemas.openxmlformats.org/officeDocument/2006/relationships" xmlns:p="http://schemas.openxmlformats.org/presentationml/2006/main">
+  <p:cSld>
+    <p:spTree>
+      <p:nvGrpSpPr>
+        <p:cNvPr id="1" name=""/>
+        <p:cNvGrpSpPr/>
+        <p:nvPr/>
+      </p:nvGrpSpPr>
+      <p:grpSpPr>
+        <a:xfrm>
+          <a:off x="0" y="0"/>
+          <a:ext cx="0" cy="0"/>
+          <a:chOff x="0" y="0"/>
+          <a:chExt cx="0" cy="0"/>
+        </a:xfrm>
+      </p:grpSpPr>
+      <p:pic>
+        <p:nvPicPr>
+          <p:cNvPr id="3" name="Picture 2"/>
+          <p:cNvPicPr>
+            <a:picLocks noChangeAspect="1"/>
+          </p:cNvPicPr>
+          <p:nvPr/>
+        </p:nvPicPr>
+        <p:blipFill>
+          <a:blip r:embed="rId2"/>
+          <a:stretch>
+            <a:fillRect/>
+          </a:stretch>
+        </p:blipFill>
+        <p:spPr>
+          <a:xfrm>
+            <a:off x="2641299" y="1690688"/>
+            <a:ext cx="5607352" cy="4760604"/>
+          </a:xfrm>
+          <a:prstGeom prst="rect">
+            <a:avLst/>
+          </a:prstGeom>
+        </p:spPr>
+      </p:pic>
+      <p:sp>
+        <p:nvSpPr>
+          <p:cNvPr id="2" name="Title 1"/>
+          <p:cNvSpPr>
+            <a:spLocks noGrp="1"/>
+          </p:cNvSpPr>
+          <p:nvPr>
+            <p:ph type="title"/>
+          </p:nvPr>
+        </p:nvSpPr>
+        <p:spPr/>
+        <p:txBody>
+          <a:bodyPr/>
+          <a:lstStyle/>
+          <a:p>
+            <a:endParaRPr lang="en-US" dirty="0"/>
+          </a:p>
+        </p:txBody>
+      </p:sp>
+      <p:sp>
+        <p:nvSpPr>
+          <p:cNvPr id="5" name="Rectangle 4"/>
+          <p:cNvSpPr/>
+          <p:nvPr/>
+        </p:nvSpPr>
+        <p:spPr>
+          <a:xfrm>
+            <a:off x="5243901" y="1873123"/>
+            <a:ext cx="236148" cy="260477"/>
+          </a:xfrm>
+          <a:prstGeom prst="rect">
+            <a:avLst/>
+          </a:prstGeom>
+          <a:noFill/>
+          <a:ln w="9525">
+            <a:solidFill>
+              <a:srgbClr val="FF0000"/>
+            </a:solidFill>
+          </a:ln>
+        </p:spPr>
+        <p:style>
+          <a:lnRef idx="2">
+            <a:schemeClr val="accent1">
+              <a:shade val="50000"/>
+            </a:schemeClr>
+          </a:lnRef>
+          <a:fillRef idx="1">
+            <a:schemeClr val="accent1"/>
+          </a:fillRef>
+          <a:effectRef idx="0">
+            <a:schemeClr val="accent1"/>
+          </a:effectRef>
+          <a:fontRef idx="minor">
+            <a:schemeClr val="lt1"/>
+          </a:fontRef>
+        </p:style>
+        <p:txBody>
+          <a:bodyPr rtlCol="0" anchor="ctr"/>
+          <a:lstStyle/>
+          <a:p>
+            <a:endParaRPr lang="en-US" dirty="0">
+              <a:solidFill>
+                <a:schemeClr val="tx1"/>
+              </a:solidFill>
+            </a:endParaRPr>
+          </a:p>
+        </p:txBody>
+      </p:sp>
+      <p:sp>
+        <p:nvSpPr>
+          <p:cNvPr id="10" name="Oval 9"/>
+          <p:cNvSpPr/>
+          <p:nvPr/>
+        </p:nvSpPr>
+        <p:spPr>
+          <a:xfrm>
+            <a:off x="3622525" y="5478996"/>
+            <a:ext cx="1898650" cy="667804"/>
+          </a:xfrm>
+          <a:prstGeom prst="ellipse">
+            <a:avLst/>
+          </a:prstGeom>
+          <a:noFill/>
+          <a:ln w="57150">
+            <a:solidFill>
+              <a:srgbClr val="FF0000"/>
+            </a:solidFill>
+          </a:ln>
+        </p:spPr>
+        <p:style>
+          <a:lnRef idx="2">
+            <a:schemeClr val="accent1">
+              <a:shade val="50000"/>
+            </a:schemeClr>
+          </a:lnRef>
+          <a:fillRef idx="1">
+            <a:schemeClr val="accent1"/>
+          </a:fillRef>
+          <a:effectRef idx="0">
+            <a:schemeClr val="accent1"/>
+          </a:effectRef>
+          <a:fontRef idx="minor">
+            <a:schemeClr val="lt1"/>
+          </a:fontRef>
+        </p:style>
+        <p:txBody>
+          <a:bodyPr rtlCol="0" anchor="ctr"/>
+          <a:lstStyle/>
+          <a:p>
+            <a:pPr algn="ctr"/>
+            <a:endParaRPr lang="en-US"/>
+          </a:p>
+        </p:txBody>
+      </p:sp>
+    </p:spTree>
+    <p:extLst>
+      <p:ext uri="{BB962C8B-B14F-4D97-AF65-F5344CB8AC3E}">
+        <p14:creationId xmlns:p14="http://schemas.microsoft.com/office/powerpoint/2010/main" val="48976695"/>
+      </p:ext>
+    </p:extLst>
+  </p:cSld>
+  <p:clrMapOvr>
+    <a:masterClrMapping/>
+  </p:clrMapOvr>
+  <p:timing>
+    <p:tnLst>
+      <p:par>
+        <p:cTn id="1" dur="indefinite" restart="never" nodeType="tmRoot"/>
+      </p:par>
+    </p:tnLst>
+  </p:timing>
+</p:sld>
+</file>
+
+<file path=ppt/slides/slide15.xml><?xml version="1.0" encoding="utf-8"?>
+<p:sld xmlns:a="http://schemas.openxmlformats.org/drawingml/2006/main" xmlns:r="http://schemas.openxmlformats.org/officeDocument/2006/relationships" xmlns:p="http://schemas.openxmlformats.org/presentationml/2006/main">
+  <p:cSld>
+    <p:spTree>
+      <p:nvGrpSpPr>
+        <p:cNvPr id="1" name=""/>
+        <p:cNvGrpSpPr/>
+        <p:nvPr/>
+      </p:nvGrpSpPr>
+      <p:grpSpPr>
+        <a:xfrm>
+          <a:off x="0" y="0"/>
+          <a:ext cx="0" cy="0"/>
+          <a:chOff x="0" y="0"/>
+          <a:chExt cx="0" cy="0"/>
+        </a:xfrm>
+      </p:grpSpPr>
+      <p:sp>
+        <p:nvSpPr>
+          <p:cNvPr id="2" name="Title 1"/>
+          <p:cNvSpPr>
+            <a:spLocks noGrp="1"/>
+          </p:cNvSpPr>
+          <p:nvPr>
+            <p:ph type="title"/>
+          </p:nvPr>
+        </p:nvSpPr>
+        <p:spPr/>
+        <p:txBody>
+          <a:bodyPr/>
+          <a:lstStyle/>
+          <a:p>
+            <a:endParaRPr lang="en-US"/>
+          </a:p>
+        </p:txBody>
+      </p:sp>
+      <p:pic>
+        <p:nvPicPr>
+          <p:cNvPr id="3" name="Picture 2"/>
+          <p:cNvPicPr>
+            <a:picLocks noChangeAspect="1"/>
+          </p:cNvPicPr>
+          <p:nvPr/>
+        </p:nvPicPr>
+        <p:blipFill>
+          <a:blip r:embed="rId2"/>
+          <a:stretch>
+            <a:fillRect/>
+          </a:stretch>
+        </p:blipFill>
+        <p:spPr>
+          <a:xfrm>
+            <a:off x="462170" y="67784"/>
+            <a:ext cx="4163006" cy="4324954"/>
+          </a:xfrm>
+          <a:prstGeom prst="rect">
+            <a:avLst/>
+          </a:prstGeom>
+          <a:ln>
+            <a:solidFill>
+              <a:schemeClr val="accent1"/>
+            </a:solidFill>
+          </a:ln>
+        </p:spPr>
+      </p:pic>
+      <p:pic>
+        <p:nvPicPr>
+          <p:cNvPr id="5" name="Picture 4"/>
+          <p:cNvPicPr>
+            <a:picLocks noChangeAspect="1"/>
+          </p:cNvPicPr>
+          <p:nvPr/>
+        </p:nvPicPr>
+        <p:blipFill>
+          <a:blip r:embed="rId3"/>
+          <a:stretch>
+            <a:fillRect/>
+          </a:stretch>
+        </p:blipFill>
+        <p:spPr>
+          <a:xfrm>
+            <a:off x="462170" y="4510205"/>
+            <a:ext cx="5725324" cy="1914792"/>
+          </a:xfrm>
+          <a:prstGeom prst="rect">
+            <a:avLst/>
+          </a:prstGeom>
+          <a:ln>
+            <a:solidFill>
+              <a:schemeClr val="accent1"/>
+            </a:solidFill>
+          </a:ln>
+        </p:spPr>
+      </p:pic>
+      <p:pic>
+        <p:nvPicPr>
+          <p:cNvPr id="6" name="Picture 5"/>
+          <p:cNvPicPr>
+            <a:picLocks noChangeAspect="1"/>
+          </p:cNvPicPr>
+          <p:nvPr/>
+        </p:nvPicPr>
+        <p:blipFill>
+          <a:blip r:embed="rId4"/>
+          <a:stretch>
+            <a:fillRect/>
+          </a:stretch>
+        </p:blipFill>
+        <p:spPr>
+          <a:xfrm>
+            <a:off x="4688722" y="67784"/>
+            <a:ext cx="4277322" cy="2715004"/>
+          </a:xfrm>
+          <a:prstGeom prst="rect">
+            <a:avLst/>
+          </a:prstGeom>
+          <a:ln>
+            <a:solidFill>
+              <a:schemeClr val="accent1"/>
+            </a:solidFill>
+          </a:ln>
+        </p:spPr>
+      </p:pic>
+      <p:pic>
+        <p:nvPicPr>
+          <p:cNvPr id="10" name="Picture 9"/>
+          <p:cNvPicPr>
+            <a:picLocks noChangeAspect="1"/>
+          </p:cNvPicPr>
+          <p:nvPr/>
+        </p:nvPicPr>
+        <p:blipFill>
+          <a:blip r:embed="rId5"/>
+          <a:stretch>
+            <a:fillRect/>
+          </a:stretch>
+        </p:blipFill>
+        <p:spPr>
+          <a:xfrm>
+            <a:off x="6354077" y="4157731"/>
+            <a:ext cx="4096322" cy="2267266"/>
+          </a:xfrm>
+          <a:prstGeom prst="rect">
+            <a:avLst/>
+          </a:prstGeom>
+          <a:ln>
+            <a:solidFill>
+              <a:schemeClr val="accent1"/>
+            </a:solidFill>
+          </a:ln>
+        </p:spPr>
+      </p:pic>
+      <p:pic>
+        <p:nvPicPr>
+          <p:cNvPr id="23" name="Picture 22"/>
+          <p:cNvPicPr>
+            <a:picLocks noChangeAspect="1"/>
+          </p:cNvPicPr>
+          <p:nvPr/>
+        </p:nvPicPr>
+        <p:blipFill>
+          <a:blip r:embed="rId6"/>
+          <a:stretch>
+            <a:fillRect/>
+          </a:stretch>
+        </p:blipFill>
+        <p:spPr>
+          <a:xfrm>
+            <a:off x="9107186" y="940292"/>
+            <a:ext cx="2686425" cy="2819794"/>
+          </a:xfrm>
+          <a:prstGeom prst="rect">
+            <a:avLst/>
+          </a:prstGeom>
+          <a:ln>
+            <a:solidFill>
+              <a:schemeClr val="accent1"/>
+            </a:solidFill>
+          </a:ln>
+        </p:spPr>
+      </p:pic>
+      <p:sp>
+        <p:nvSpPr>
+          <p:cNvPr id="24" name="Rectangle 23"/>
+          <p:cNvSpPr/>
+          <p:nvPr/>
+        </p:nvSpPr>
+        <p:spPr>
+          <a:xfrm>
+            <a:off x="7920111" y="6424997"/>
+            <a:ext cx="3873500" cy="392383"/>
+          </a:xfrm>
+          <a:prstGeom prst="rect">
+            <a:avLst/>
+          </a:prstGeom>
+          <a:noFill/>
+          <a:ln>
+            <a:noFill/>
+          </a:ln>
+        </p:spPr>
+        <p:style>
+          <a:lnRef idx="2">
+            <a:schemeClr val="accent1">
+              <a:shade val="50000"/>
+            </a:schemeClr>
+          </a:lnRef>
+          <a:fillRef idx="1">
+            <a:schemeClr val="accent1"/>
+          </a:fillRef>
+          <a:effectRef idx="0">
+            <a:schemeClr val="accent1"/>
+          </a:effectRef>
+          <a:fontRef idx="minor">
+            <a:schemeClr val="lt1"/>
+          </a:fontRef>
+        </p:style>
+        <p:txBody>
+          <a:bodyPr rtlCol="0" anchor="ctr"/>
+          <a:lstStyle/>
+          <a:p>
+            <a:pPr algn="ctr"/>
+            <a:r>
+              <a:rPr lang="en-US" b="1" dirty="0" smtClean="0">
+                <a:solidFill>
+                  <a:schemeClr val="tx1"/>
+                </a:solidFill>
+              </a:rPr>
+              <a:t>Various properties </a:t>
+            </a:r>
+            <a:r>
+              <a:rPr lang="en-US" b="1" smtClean="0">
+                <a:solidFill>
+                  <a:schemeClr val="tx1"/>
+                </a:solidFill>
+              </a:rPr>
+              <a:t>with expressions</a:t>
+            </a:r>
+            <a:endParaRPr lang="en-US" b="1" dirty="0">
+              <a:solidFill>
+                <a:schemeClr val="tx1"/>
+              </a:solidFill>
+            </a:endParaRPr>
+          </a:p>
+        </p:txBody>
+      </p:sp>
+    </p:spTree>
+    <p:extLst>
+      <p:ext uri="{BB962C8B-B14F-4D97-AF65-F5344CB8AC3E}">
+        <p14:creationId xmlns:p14="http://schemas.microsoft.com/office/powerpoint/2010/main" val="4136435964"/>
       </p:ext>
     </p:extLst>
   </p:cSld>

</xml_diff>

<commit_message>
Document 4-eyes & rendez vous
and also some textual updates to the rest of the page
</commit_message>
<xml_diff>
--- a/custom-picture-sources/various pictures.pptx
+++ b/custom-picture-sources/various pictures.pptx
@@ -5,7 +5,7 @@
     <p:sldMasterId id="2147483648" r:id="rId1"/>
   </p:sldMasterIdLst>
   <p:notesMasterIdLst>
-    <p:notesMasterId r:id="rId17"/>
+    <p:notesMasterId r:id="rId25"/>
   </p:notesMasterIdLst>
   <p:sldIdLst>
     <p:sldId id="256" r:id="rId2"/>
@@ -13,16 +13,24 @@
     <p:sldId id="258" r:id="rId4"/>
     <p:sldId id="260" r:id="rId5"/>
     <p:sldId id="261" r:id="rId6"/>
-    <p:sldId id="259" r:id="rId7"/>
-    <p:sldId id="263" r:id="rId8"/>
-    <p:sldId id="262" r:id="rId9"/>
-    <p:sldId id="264" r:id="rId10"/>
-    <p:sldId id="265" r:id="rId11"/>
-    <p:sldId id="266" r:id="rId12"/>
-    <p:sldId id="267" r:id="rId13"/>
-    <p:sldId id="268" r:id="rId14"/>
-    <p:sldId id="269" r:id="rId15"/>
-    <p:sldId id="270" r:id="rId16"/>
+    <p:sldId id="271" r:id="rId7"/>
+    <p:sldId id="259" r:id="rId8"/>
+    <p:sldId id="274" r:id="rId9"/>
+    <p:sldId id="278" r:id="rId10"/>
+    <p:sldId id="272" r:id="rId11"/>
+    <p:sldId id="275" r:id="rId12"/>
+    <p:sldId id="276" r:id="rId13"/>
+    <p:sldId id="277" r:id="rId14"/>
+    <p:sldId id="273" r:id="rId15"/>
+    <p:sldId id="263" r:id="rId16"/>
+    <p:sldId id="262" r:id="rId17"/>
+    <p:sldId id="264" r:id="rId18"/>
+    <p:sldId id="265" r:id="rId19"/>
+    <p:sldId id="266" r:id="rId20"/>
+    <p:sldId id="267" r:id="rId21"/>
+    <p:sldId id="268" r:id="rId22"/>
+    <p:sldId id="269" r:id="rId23"/>
+    <p:sldId id="270" r:id="rId24"/>
   </p:sldIdLst>
   <p:sldSz cx="12192000" cy="6858000"/>
   <p:notesSz cx="6858000" cy="9144000"/>
@@ -211,7 +219,7 @@
           <a:p>
             <a:fld id="{8AF5FB7F-563E-4AC8-B4DA-B6C429390E53}" type="datetimeFigureOut">
               <a:rPr lang="en-US" smtClean="0"/>
-              <a:t>4/2/2021</a:t>
+              <a:t>8/12/2023</a:t>
             </a:fld>
             <a:endParaRPr lang="en-US"/>
           </a:p>
@@ -694,7 +702,7 @@
           <a:p>
             <a:fld id="{B84B12B9-0A16-483D-BFD5-41DF0EA1BEC4}" type="datetimeFigureOut">
               <a:rPr lang="en-US" smtClean="0"/>
-              <a:t>4/2/2021</a:t>
+              <a:t>8/12/2023</a:t>
             </a:fld>
             <a:endParaRPr lang="en-US"/>
           </a:p>
@@ -864,7 +872,7 @@
           <a:p>
             <a:fld id="{B84B12B9-0A16-483D-BFD5-41DF0EA1BEC4}" type="datetimeFigureOut">
               <a:rPr lang="en-US" smtClean="0"/>
-              <a:t>4/2/2021</a:t>
+              <a:t>8/12/2023</a:t>
             </a:fld>
             <a:endParaRPr lang="en-US"/>
           </a:p>
@@ -1044,7 +1052,7 @@
           <a:p>
             <a:fld id="{B84B12B9-0A16-483D-BFD5-41DF0EA1BEC4}" type="datetimeFigureOut">
               <a:rPr lang="en-US" smtClean="0"/>
-              <a:t>4/2/2021</a:t>
+              <a:t>8/12/2023</a:t>
             </a:fld>
             <a:endParaRPr lang="en-US"/>
           </a:p>
@@ -1214,7 +1222,7 @@
           <a:p>
             <a:fld id="{B84B12B9-0A16-483D-BFD5-41DF0EA1BEC4}" type="datetimeFigureOut">
               <a:rPr lang="en-US" smtClean="0"/>
-              <a:t>4/2/2021</a:t>
+              <a:t>8/12/2023</a:t>
             </a:fld>
             <a:endParaRPr lang="en-US"/>
           </a:p>
@@ -1460,7 +1468,7 @@
           <a:p>
             <a:fld id="{B84B12B9-0A16-483D-BFD5-41DF0EA1BEC4}" type="datetimeFigureOut">
               <a:rPr lang="en-US" smtClean="0"/>
-              <a:t>4/2/2021</a:t>
+              <a:t>8/12/2023</a:t>
             </a:fld>
             <a:endParaRPr lang="en-US"/>
           </a:p>
@@ -1692,7 +1700,7 @@
           <a:p>
             <a:fld id="{B84B12B9-0A16-483D-BFD5-41DF0EA1BEC4}" type="datetimeFigureOut">
               <a:rPr lang="en-US" smtClean="0"/>
-              <a:t>4/2/2021</a:t>
+              <a:t>8/12/2023</a:t>
             </a:fld>
             <a:endParaRPr lang="en-US"/>
           </a:p>
@@ -2059,7 +2067,7 @@
           <a:p>
             <a:fld id="{B84B12B9-0A16-483D-BFD5-41DF0EA1BEC4}" type="datetimeFigureOut">
               <a:rPr lang="en-US" smtClean="0"/>
-              <a:t>4/2/2021</a:t>
+              <a:t>8/12/2023</a:t>
             </a:fld>
             <a:endParaRPr lang="en-US"/>
           </a:p>
@@ -2177,7 +2185,7 @@
           <a:p>
             <a:fld id="{B84B12B9-0A16-483D-BFD5-41DF0EA1BEC4}" type="datetimeFigureOut">
               <a:rPr lang="en-US" smtClean="0"/>
-              <a:t>4/2/2021</a:t>
+              <a:t>8/12/2023</a:t>
             </a:fld>
             <a:endParaRPr lang="en-US"/>
           </a:p>
@@ -2272,7 +2280,7 @@
           <a:p>
             <a:fld id="{B84B12B9-0A16-483D-BFD5-41DF0EA1BEC4}" type="datetimeFigureOut">
               <a:rPr lang="en-US" smtClean="0"/>
-              <a:t>4/2/2021</a:t>
+              <a:t>8/12/2023</a:t>
             </a:fld>
             <a:endParaRPr lang="en-US"/>
           </a:p>
@@ -2549,7 +2557,7 @@
           <a:p>
             <a:fld id="{B84B12B9-0A16-483D-BFD5-41DF0EA1BEC4}" type="datetimeFigureOut">
               <a:rPr lang="en-US" smtClean="0"/>
-              <a:t>4/2/2021</a:t>
+              <a:t>8/12/2023</a:t>
             </a:fld>
             <a:endParaRPr lang="en-US"/>
           </a:p>
@@ -2802,7 +2810,7 @@
           <a:p>
             <a:fld id="{B84B12B9-0A16-483D-BFD5-41DF0EA1BEC4}" type="datetimeFigureOut">
               <a:rPr lang="en-US" smtClean="0"/>
-              <a:t>4/2/2021</a:t>
+              <a:t>8/12/2023</a:t>
             </a:fld>
             <a:endParaRPr lang="en-US"/>
           </a:p>
@@ -3015,7 +3023,7 @@
           <a:p>
             <a:fld id="{B84B12B9-0A16-483D-BFD5-41DF0EA1BEC4}" type="datetimeFigureOut">
               <a:rPr lang="en-US" smtClean="0"/>
-              <a:t>4/2/2021</a:t>
+              <a:t>8/12/2023</a:t>
             </a:fld>
             <a:endParaRPr lang="en-US"/>
           </a:p>
@@ -3505,92 +3513,75 @@
             <p:ph type="title"/>
           </p:nvPr>
         </p:nvSpPr>
-        <p:spPr/>
+        <p:spPr>
+          <a:xfrm>
+            <a:off x="838199" y="365125"/>
+            <a:ext cx="10994679" cy="1325563"/>
+          </a:xfrm>
+        </p:spPr>
         <p:txBody>
           <a:bodyPr/>
           <a:lstStyle/>
           <a:p>
+            <a:r>
+              <a:rPr lang="en-US" dirty="0" smtClean="0"/>
+              <a:t>Modified </a:t>
+            </a:r>
+            <a:r>
+              <a:rPr lang="en-US" dirty="0" err="1" smtClean="0"/>
+              <a:t>Helloworld</a:t>
+            </a:r>
+            <a:r>
+              <a:rPr lang="en-US" dirty="0"/>
+              <a:t>  </a:t>
+            </a:r>
+            <a:r>
+              <a:rPr lang="en-US" dirty="0" smtClean="0"/>
+              <a:t>- Four Eyes &amp; </a:t>
+            </a:r>
+            <a:r>
+              <a:rPr lang="en-US" dirty="0" err="1" smtClean="0"/>
+              <a:t>Rendez</a:t>
+            </a:r>
+            <a:r>
+              <a:rPr lang="en-US" dirty="0" smtClean="0"/>
+              <a:t> </a:t>
+            </a:r>
+            <a:r>
+              <a:rPr lang="en-US" dirty="0" err="1" smtClean="0"/>
+              <a:t>Vous</a:t>
+            </a:r>
             <a:endParaRPr lang="en-US" dirty="0"/>
           </a:p>
         </p:txBody>
       </p:sp>
       <p:pic>
         <p:nvPicPr>
-          <p:cNvPr id="4" name="Picture 3"/>
+          <p:cNvPr id="7" name="Picture 6"/>
           <p:cNvPicPr>
             <a:picLocks noChangeAspect="1"/>
           </p:cNvPicPr>
           <p:nvPr/>
         </p:nvPicPr>
-        <p:blipFill>
+        <p:blipFill rotWithShape="1">
           <a:blip r:embed="rId2"/>
-          <a:stretch>
-            <a:fillRect/>
-          </a:stretch>
+          <a:srcRect r="16935"/>
+          <a:stretch/>
         </p:blipFill>
         <p:spPr>
           <a:xfrm>
-            <a:off x="985917" y="1376376"/>
-            <a:ext cx="9685488" cy="4365084"/>
+            <a:off x="1883430" y="1448553"/>
+            <a:ext cx="7179089" cy="4047933"/>
           </a:xfrm>
           <a:prstGeom prst="rect">
             <a:avLst/>
           </a:prstGeom>
         </p:spPr>
       </p:pic>
-      <p:sp>
-        <p:nvSpPr>
-          <p:cNvPr id="5" name="Rectangle 4"/>
-          <p:cNvSpPr/>
-          <p:nvPr/>
-        </p:nvSpPr>
-        <p:spPr>
-          <a:xfrm>
-            <a:off x="2580556" y="2874377"/>
-            <a:ext cx="280137" cy="282601"/>
-          </a:xfrm>
-          <a:prstGeom prst="rect">
-            <a:avLst/>
-          </a:prstGeom>
-          <a:noFill/>
-          <a:ln w="57150">
-            <a:solidFill>
-              <a:srgbClr val="FF0000"/>
-            </a:solidFill>
-          </a:ln>
-        </p:spPr>
-        <p:style>
-          <a:lnRef idx="2">
-            <a:schemeClr val="accent1">
-              <a:shade val="50000"/>
-            </a:schemeClr>
-          </a:lnRef>
-          <a:fillRef idx="1">
-            <a:schemeClr val="accent1"/>
-          </a:fillRef>
-          <a:effectRef idx="0">
-            <a:schemeClr val="accent1"/>
-          </a:effectRef>
-          <a:fontRef idx="minor">
-            <a:schemeClr val="lt1"/>
-          </a:fontRef>
-        </p:style>
-        <p:txBody>
-          <a:bodyPr rtlCol="0" anchor="ctr"/>
-          <a:lstStyle/>
-          <a:p>
-            <a:endParaRPr lang="en-US" dirty="0">
-              <a:solidFill>
-                <a:schemeClr val="tx1"/>
-              </a:solidFill>
-            </a:endParaRPr>
-          </a:p>
-        </p:txBody>
-      </p:sp>
     </p:spTree>
     <p:extLst>
       <p:ext uri="{BB962C8B-B14F-4D97-AF65-F5344CB8AC3E}">
-        <p14:creationId xmlns:p14="http://schemas.microsoft.com/office/powerpoint/2010/main" val="572802433"/>
+        <p14:creationId xmlns:p14="http://schemas.microsoft.com/office/powerpoint/2010/main" val="1074904480"/>
       </p:ext>
     </p:extLst>
   </p:cSld>
@@ -3634,18 +3625,27 @@
             <p:ph type="title"/>
           </p:nvPr>
         </p:nvSpPr>
-        <p:spPr/>
+        <p:spPr>
+          <a:xfrm>
+            <a:off x="838199" y="365125"/>
+            <a:ext cx="10994679" cy="1325563"/>
+          </a:xfrm>
+        </p:spPr>
         <p:txBody>
           <a:bodyPr/>
           <a:lstStyle/>
           <a:p>
+            <a:r>
+              <a:rPr lang="en-US" dirty="0" smtClean="0"/>
+              <a:t>four-eyes.png</a:t>
+            </a:r>
             <a:endParaRPr lang="en-US" dirty="0"/>
           </a:p>
         </p:txBody>
       </p:sp>
       <p:pic>
         <p:nvPicPr>
-          <p:cNvPr id="4" name="Picture 3"/>
+          <p:cNvPr id="3" name="Picture 2"/>
           <p:cNvPicPr>
             <a:picLocks noChangeAspect="1"/>
           </p:cNvPicPr>
@@ -3659,524 +3659,8 @@
         </p:blipFill>
         <p:spPr>
           <a:xfrm>
-            <a:off x="1052421" y="1690688"/>
-            <a:ext cx="8554644" cy="704948"/>
-          </a:xfrm>
-          <a:prstGeom prst="rect">
-            <a:avLst/>
-          </a:prstGeom>
-        </p:spPr>
-      </p:pic>
-      <p:sp>
-        <p:nvSpPr>
-          <p:cNvPr id="5" name="Oval 4"/>
-          <p:cNvSpPr/>
-          <p:nvPr/>
-        </p:nvSpPr>
-        <p:spPr>
-          <a:xfrm>
-            <a:off x="1006446" y="1604916"/>
-            <a:ext cx="2353261" cy="1064786"/>
-          </a:xfrm>
-          <a:prstGeom prst="ellipse">
-            <a:avLst/>
-          </a:prstGeom>
-          <a:noFill/>
-          <a:ln w="57150">
-            <a:solidFill>
-              <a:schemeClr val="accent1"/>
-            </a:solidFill>
-          </a:ln>
-        </p:spPr>
-        <p:style>
-          <a:lnRef idx="2">
-            <a:schemeClr val="accent1">
-              <a:shade val="50000"/>
-            </a:schemeClr>
-          </a:lnRef>
-          <a:fillRef idx="1">
-            <a:schemeClr val="accent1"/>
-          </a:fillRef>
-          <a:effectRef idx="0">
-            <a:schemeClr val="accent1"/>
-          </a:effectRef>
-          <a:fontRef idx="minor">
-            <a:schemeClr val="lt1"/>
-          </a:fontRef>
-        </p:style>
-        <p:txBody>
-          <a:bodyPr rtlCol="0" anchor="ctr"/>
-          <a:lstStyle/>
-          <a:p>
-            <a:pPr algn="ctr"/>
-            <a:endParaRPr lang="en-US"/>
-          </a:p>
-        </p:txBody>
-      </p:sp>
-      <p:sp>
-        <p:nvSpPr>
-          <p:cNvPr id="6" name="Oval 5"/>
-          <p:cNvSpPr/>
-          <p:nvPr/>
-        </p:nvSpPr>
-        <p:spPr>
-          <a:xfrm>
-            <a:off x="7315200" y="1604916"/>
-            <a:ext cx="2291865" cy="1064786"/>
-          </a:xfrm>
-          <a:prstGeom prst="ellipse">
-            <a:avLst/>
-          </a:prstGeom>
-          <a:noFill/>
-          <a:ln w="57150">
-            <a:solidFill>
-              <a:schemeClr val="accent1"/>
-            </a:solidFill>
-          </a:ln>
-        </p:spPr>
-        <p:style>
-          <a:lnRef idx="2">
-            <a:schemeClr val="accent1">
-              <a:shade val="50000"/>
-            </a:schemeClr>
-          </a:lnRef>
-          <a:fillRef idx="1">
-            <a:schemeClr val="accent1"/>
-          </a:fillRef>
-          <a:effectRef idx="0">
-            <a:schemeClr val="accent1"/>
-          </a:effectRef>
-          <a:fontRef idx="minor">
-            <a:schemeClr val="lt1"/>
-          </a:fontRef>
-        </p:style>
-        <p:txBody>
-          <a:bodyPr rtlCol="0" anchor="ctr"/>
-          <a:lstStyle/>
-          <a:p>
-            <a:pPr algn="ctr"/>
-            <a:endParaRPr lang="en-US"/>
-          </a:p>
-        </p:txBody>
-      </p:sp>
-      <p:cxnSp>
-        <p:nvCxnSpPr>
-          <p:cNvPr id="8" name="Straight Arrow Connector 7"/>
-          <p:cNvCxnSpPr/>
-          <p:nvPr/>
-        </p:nvCxnSpPr>
-        <p:spPr>
-          <a:xfrm>
-            <a:off x="3432832" y="2137309"/>
-            <a:ext cx="3810851" cy="0"/>
-          </a:xfrm>
-          <a:prstGeom prst="straightConnector1">
-            <a:avLst/>
-          </a:prstGeom>
-          <a:ln w="76200">
-            <a:tailEnd type="triangle"/>
-          </a:ln>
-        </p:spPr>
-        <p:style>
-          <a:lnRef idx="1">
-            <a:schemeClr val="accent1"/>
-          </a:lnRef>
-          <a:fillRef idx="0">
-            <a:schemeClr val="accent1"/>
-          </a:fillRef>
-          <a:effectRef idx="0">
-            <a:schemeClr val="accent1"/>
-          </a:effectRef>
-          <a:fontRef idx="minor">
-            <a:schemeClr val="tx1"/>
-          </a:fontRef>
-        </p:style>
-      </p:cxnSp>
-      <p:pic>
-        <p:nvPicPr>
-          <p:cNvPr id="19" name="Picture 18"/>
-          <p:cNvPicPr>
-            <a:picLocks noChangeAspect="1"/>
-          </p:cNvPicPr>
-          <p:nvPr/>
-        </p:nvPicPr>
-        <p:blipFill rotWithShape="1">
-          <a:blip r:embed="rId3"/>
-          <a:srcRect t="21901"/>
-          <a:stretch/>
-        </p:blipFill>
-        <p:spPr>
-          <a:xfrm>
-            <a:off x="6173264" y="2814737"/>
-            <a:ext cx="5509930" cy="2361055"/>
-          </a:xfrm>
-          <a:prstGeom prst="rect">
-            <a:avLst/>
-          </a:prstGeom>
-        </p:spPr>
-      </p:pic>
-      <p:pic>
-        <p:nvPicPr>
-          <p:cNvPr id="22" name="Picture 21"/>
-          <p:cNvPicPr>
-            <a:picLocks noChangeAspect="1"/>
-          </p:cNvPicPr>
-          <p:nvPr/>
-        </p:nvPicPr>
-        <p:blipFill rotWithShape="1">
-          <a:blip r:embed="rId4"/>
-          <a:srcRect l="12707" b="42295"/>
-          <a:stretch/>
-        </p:blipFill>
-        <p:spPr>
-          <a:xfrm>
-            <a:off x="704955" y="2878016"/>
-            <a:ext cx="4332545" cy="2138413"/>
-          </a:xfrm>
-          <a:prstGeom prst="rect">
-            <a:avLst/>
-          </a:prstGeom>
-        </p:spPr>
-      </p:pic>
-      <p:sp>
-        <p:nvSpPr>
-          <p:cNvPr id="23" name="Rectangle 22"/>
-          <p:cNvSpPr/>
-          <p:nvPr/>
-        </p:nvSpPr>
-        <p:spPr>
-          <a:xfrm>
-            <a:off x="1409156" y="3550836"/>
-            <a:ext cx="1547839" cy="419399"/>
-          </a:xfrm>
-          <a:prstGeom prst="rect">
-            <a:avLst/>
-          </a:prstGeom>
-          <a:noFill/>
-          <a:ln w="57150">
-            <a:solidFill>
-              <a:schemeClr val="accent1"/>
-            </a:solidFill>
-          </a:ln>
-        </p:spPr>
-        <p:style>
-          <a:lnRef idx="2">
-            <a:schemeClr val="accent1">
-              <a:shade val="50000"/>
-            </a:schemeClr>
-          </a:lnRef>
-          <a:fillRef idx="1">
-            <a:schemeClr val="accent1"/>
-          </a:fillRef>
-          <a:effectRef idx="0">
-            <a:schemeClr val="accent1"/>
-          </a:effectRef>
-          <a:fontRef idx="minor">
-            <a:schemeClr val="lt1"/>
-          </a:fontRef>
-        </p:style>
-        <p:txBody>
-          <a:bodyPr rtlCol="0" anchor="ctr"/>
-          <a:lstStyle/>
-          <a:p>
-            <a:pPr algn="ctr"/>
-            <a:endParaRPr lang="en-US"/>
-          </a:p>
-        </p:txBody>
-      </p:sp>
-      <p:cxnSp>
-        <p:nvCxnSpPr>
-          <p:cNvPr id="25" name="Straight Connector 24"/>
-          <p:cNvCxnSpPr>
-            <a:stCxn id="5" idx="4"/>
-            <a:endCxn id="23" idx="0"/>
-          </p:cNvCxnSpPr>
-          <p:nvPr/>
-        </p:nvCxnSpPr>
-        <p:spPr>
-          <a:xfrm flipH="1">
-            <a:off x="2183076" y="2669702"/>
-            <a:ext cx="1" cy="881134"/>
-          </a:xfrm>
-          <a:prstGeom prst="line">
-            <a:avLst/>
-          </a:prstGeom>
-          <a:ln w="76200"/>
-        </p:spPr>
-        <p:style>
-          <a:lnRef idx="1">
-            <a:schemeClr val="accent1"/>
-          </a:lnRef>
-          <a:fillRef idx="0">
-            <a:schemeClr val="accent1"/>
-          </a:fillRef>
-          <a:effectRef idx="0">
-            <a:schemeClr val="accent1"/>
-          </a:effectRef>
-          <a:fontRef idx="minor">
-            <a:schemeClr val="tx1"/>
-          </a:fontRef>
-        </p:style>
-      </p:cxnSp>
-      <p:sp>
-        <p:nvSpPr>
-          <p:cNvPr id="27" name="Rectangle 26"/>
-          <p:cNvSpPr/>
-          <p:nvPr/>
-        </p:nvSpPr>
-        <p:spPr>
-          <a:xfrm>
-            <a:off x="7691612" y="3550836"/>
-            <a:ext cx="1547839" cy="419399"/>
-          </a:xfrm>
-          <a:prstGeom prst="rect">
-            <a:avLst/>
-          </a:prstGeom>
-          <a:noFill/>
-          <a:ln w="57150">
-            <a:solidFill>
-              <a:schemeClr val="accent1"/>
-            </a:solidFill>
-          </a:ln>
-        </p:spPr>
-        <p:style>
-          <a:lnRef idx="2">
-            <a:schemeClr val="accent1">
-              <a:shade val="50000"/>
-            </a:schemeClr>
-          </a:lnRef>
-          <a:fillRef idx="1">
-            <a:schemeClr val="accent1"/>
-          </a:fillRef>
-          <a:effectRef idx="0">
-            <a:schemeClr val="accent1"/>
-          </a:effectRef>
-          <a:fontRef idx="minor">
-            <a:schemeClr val="lt1"/>
-          </a:fontRef>
-        </p:style>
-        <p:txBody>
-          <a:bodyPr rtlCol="0" anchor="ctr"/>
-          <a:lstStyle/>
-          <a:p>
-            <a:pPr algn="ctr"/>
-            <a:endParaRPr lang="en-US"/>
-          </a:p>
-        </p:txBody>
-      </p:sp>
-      <p:cxnSp>
-        <p:nvCxnSpPr>
-          <p:cNvPr id="28" name="Straight Connector 27"/>
-          <p:cNvCxnSpPr>
-            <a:stCxn id="6" idx="4"/>
-            <a:endCxn id="27" idx="0"/>
-          </p:cNvCxnSpPr>
-          <p:nvPr/>
-        </p:nvCxnSpPr>
-        <p:spPr>
-          <a:xfrm>
-            <a:off x="8461133" y="2669702"/>
-            <a:ext cx="4399" cy="881134"/>
-          </a:xfrm>
-          <a:prstGeom prst="line">
-            <a:avLst/>
-          </a:prstGeom>
-          <a:ln w="76200"/>
-        </p:spPr>
-        <p:style>
-          <a:lnRef idx="1">
-            <a:schemeClr val="accent1"/>
-          </a:lnRef>
-          <a:fillRef idx="0">
-            <a:schemeClr val="accent1"/>
-          </a:fillRef>
-          <a:effectRef idx="0">
-            <a:schemeClr val="accent1"/>
-          </a:effectRef>
-          <a:fontRef idx="minor">
-            <a:schemeClr val="tx1"/>
-          </a:fontRef>
-        </p:style>
-      </p:cxnSp>
-      <p:sp>
-        <p:nvSpPr>
-          <p:cNvPr id="32" name="Rectangle 31"/>
-          <p:cNvSpPr/>
-          <p:nvPr/>
-        </p:nvSpPr>
-        <p:spPr>
-          <a:xfrm>
-            <a:off x="6649407" y="4506490"/>
-            <a:ext cx="3623449" cy="814337"/>
-          </a:xfrm>
-          <a:prstGeom prst="rect">
-            <a:avLst/>
-          </a:prstGeom>
-          <a:solidFill>
-            <a:schemeClr val="bg1">
-              <a:lumMod val="95000"/>
-            </a:schemeClr>
-          </a:solidFill>
-          <a:ln w="57150">
-            <a:solidFill>
-              <a:schemeClr val="accent1"/>
-            </a:solidFill>
-          </a:ln>
-        </p:spPr>
-        <p:style>
-          <a:lnRef idx="2">
-            <a:schemeClr val="accent1">
-              <a:shade val="50000"/>
-            </a:schemeClr>
-          </a:lnRef>
-          <a:fillRef idx="1">
-            <a:schemeClr val="accent1"/>
-          </a:fillRef>
-          <a:effectRef idx="0">
-            <a:schemeClr val="accent1"/>
-          </a:effectRef>
-          <a:fontRef idx="minor">
-            <a:schemeClr val="lt1"/>
-          </a:fontRef>
-        </p:style>
-        <p:txBody>
-          <a:bodyPr rtlCol="0" anchor="ctr"/>
-          <a:lstStyle/>
-          <a:p>
-            <a:pPr algn="ctr"/>
-            <a:r>
-              <a:rPr lang="en-US" dirty="0">
-                <a:solidFill>
-                  <a:srgbClr val="0070C0"/>
-                </a:solidFill>
-              </a:rPr>
-              <a:t>The reusable </a:t>
-            </a:r>
-            <a:r>
-              <a:rPr lang="en-US" dirty="0" err="1">
-                <a:solidFill>
-                  <a:srgbClr val="0070C0"/>
-                </a:solidFill>
-              </a:rPr>
-              <a:t>HumanTask</a:t>
-            </a:r>
-            <a:r>
-              <a:rPr lang="en-US" dirty="0">
-                <a:solidFill>
-                  <a:srgbClr val="0070C0"/>
-                </a:solidFill>
-              </a:rPr>
-              <a:t> </a:t>
-            </a:r>
-            <a:br>
-              <a:rPr lang="en-US" dirty="0">
-                <a:solidFill>
-                  <a:srgbClr val="0070C0"/>
-                </a:solidFill>
-              </a:rPr>
-            </a:br>
-            <a:r>
-              <a:rPr lang="en-US" dirty="0">
-                <a:solidFill>
-                  <a:srgbClr val="0070C0"/>
-                </a:solidFill>
-              </a:rPr>
-              <a:t>from the Repository</a:t>
-            </a:r>
-          </a:p>
-        </p:txBody>
-      </p:sp>
-      <p:sp>
-        <p:nvSpPr>
-          <p:cNvPr id="34" name="Rectangle 33"/>
-          <p:cNvSpPr/>
-          <p:nvPr/>
-        </p:nvSpPr>
-        <p:spPr>
-          <a:xfrm>
-            <a:off x="1006446" y="4544352"/>
-            <a:ext cx="3339083" cy="814337"/>
-          </a:xfrm>
-          <a:prstGeom prst="rect">
-            <a:avLst/>
-          </a:prstGeom>
-          <a:solidFill>
-            <a:schemeClr val="bg1">
-              <a:lumMod val="95000"/>
-            </a:schemeClr>
-          </a:solidFill>
-          <a:ln w="57150">
-            <a:solidFill>
-              <a:schemeClr val="accent1"/>
-            </a:solidFill>
-          </a:ln>
-        </p:spPr>
-        <p:style>
-          <a:lnRef idx="2">
-            <a:schemeClr val="accent1">
-              <a:shade val="50000"/>
-            </a:schemeClr>
-          </a:lnRef>
-          <a:fillRef idx="1">
-            <a:schemeClr val="accent1"/>
-          </a:fillRef>
-          <a:effectRef idx="0">
-            <a:schemeClr val="accent1"/>
-          </a:effectRef>
-          <a:fontRef idx="minor">
-            <a:schemeClr val="lt1"/>
-          </a:fontRef>
-        </p:style>
-        <p:txBody>
-          <a:bodyPr rtlCol="0" anchor="ctr"/>
-          <a:lstStyle/>
-          <a:p>
-            <a:pPr algn="ctr"/>
-            <a:r>
-              <a:rPr lang="en-US" dirty="0" smtClean="0">
-                <a:solidFill>
-                  <a:srgbClr val="0070C0"/>
-                </a:solidFill>
-              </a:rPr>
-              <a:t>The Case File Item</a:t>
-            </a:r>
-          </a:p>
-          <a:p>
-            <a:pPr algn="ctr"/>
-            <a:r>
-              <a:rPr lang="en-US" dirty="0" smtClean="0">
-                <a:solidFill>
-                  <a:srgbClr val="0070C0"/>
-                </a:solidFill>
-              </a:rPr>
-              <a:t>inside HelloWorld</a:t>
-            </a:r>
-            <a:endParaRPr lang="en-US" dirty="0">
-              <a:solidFill>
-                <a:srgbClr val="0070C0"/>
-              </a:solidFill>
-            </a:endParaRPr>
-          </a:p>
-        </p:txBody>
-      </p:sp>
-      <p:pic>
-        <p:nvPicPr>
-          <p:cNvPr id="3" name="Picture 2"/>
-          <p:cNvPicPr>
-            <a:picLocks noChangeAspect="1"/>
-          </p:cNvPicPr>
-          <p:nvPr/>
-        </p:nvPicPr>
-        <p:blipFill>
-          <a:blip r:embed="rId5"/>
-          <a:stretch>
-            <a:fillRect/>
-          </a:stretch>
-        </p:blipFill>
-        <p:spPr>
-          <a:xfrm>
-            <a:off x="1280440" y="1480865"/>
-            <a:ext cx="9631119" cy="3896269"/>
+            <a:off x="2109456" y="1552761"/>
+            <a:ext cx="7207769" cy="4644336"/>
           </a:xfrm>
           <a:prstGeom prst="rect">
             <a:avLst/>
@@ -4186,7 +3670,7 @@
     </p:spTree>
     <p:extLst>
       <p:ext uri="{BB962C8B-B14F-4D97-AF65-F5344CB8AC3E}">
-        <p14:creationId xmlns:p14="http://schemas.microsoft.com/office/powerpoint/2010/main" val="2404676016"/>
+        <p14:creationId xmlns:p14="http://schemas.microsoft.com/office/powerpoint/2010/main" val="3509635897"/>
       </p:ext>
     </p:extLst>
   </p:cSld>
@@ -4230,18 +3714,27 @@
             <p:ph type="title"/>
           </p:nvPr>
         </p:nvSpPr>
-        <p:spPr/>
+        <p:spPr>
+          <a:xfrm>
+            <a:off x="838199" y="365125"/>
+            <a:ext cx="10994679" cy="1325563"/>
+          </a:xfrm>
+        </p:spPr>
         <p:txBody>
           <a:bodyPr/>
           <a:lstStyle/>
           <a:p>
+            <a:r>
+              <a:rPr lang="en-US" dirty="0" smtClean="0"/>
+              <a:t>rendez-vous.png</a:t>
+            </a:r>
             <a:endParaRPr lang="en-US" dirty="0"/>
           </a:p>
         </p:txBody>
       </p:sp>
       <p:pic>
         <p:nvPicPr>
-          <p:cNvPr id="3" name="Picture 2"/>
+          <p:cNvPr id="4" name="Picture 3"/>
           <p:cNvPicPr>
             <a:picLocks noChangeAspect="1"/>
           </p:cNvPicPr>
@@ -4255,67 +3748,18 @@
         </p:blipFill>
         <p:spPr>
           <a:xfrm>
-            <a:off x="1280440" y="1480865"/>
-            <a:ext cx="9631119" cy="3896269"/>
+            <a:off x="2109456" y="1552761"/>
+            <a:ext cx="7873056" cy="4549275"/>
           </a:xfrm>
           <a:prstGeom prst="rect">
             <a:avLst/>
           </a:prstGeom>
         </p:spPr>
       </p:pic>
-      <p:sp>
-        <p:nvSpPr>
-          <p:cNvPr id="4" name="Rectangle 3"/>
-          <p:cNvSpPr/>
-          <p:nvPr/>
-        </p:nvSpPr>
-        <p:spPr>
-          <a:xfrm>
-            <a:off x="3745301" y="2381123"/>
-            <a:ext cx="955574" cy="503226"/>
-          </a:xfrm>
-          <a:prstGeom prst="rect">
-            <a:avLst/>
-          </a:prstGeom>
-          <a:noFill/>
-          <a:ln w="57150">
-            <a:solidFill>
-              <a:srgbClr val="FF0000"/>
-            </a:solidFill>
-          </a:ln>
-        </p:spPr>
-        <p:style>
-          <a:lnRef idx="2">
-            <a:schemeClr val="accent1">
-              <a:shade val="50000"/>
-            </a:schemeClr>
-          </a:lnRef>
-          <a:fillRef idx="1">
-            <a:schemeClr val="accent1"/>
-          </a:fillRef>
-          <a:effectRef idx="0">
-            <a:schemeClr val="accent1"/>
-          </a:effectRef>
-          <a:fontRef idx="minor">
-            <a:schemeClr val="lt1"/>
-          </a:fontRef>
-        </p:style>
-        <p:txBody>
-          <a:bodyPr rtlCol="0" anchor="ctr"/>
-          <a:lstStyle/>
-          <a:p>
-            <a:endParaRPr lang="en-US" dirty="0">
-              <a:solidFill>
-                <a:schemeClr val="tx1"/>
-              </a:solidFill>
-            </a:endParaRPr>
-          </a:p>
-        </p:txBody>
-      </p:sp>
     </p:spTree>
     <p:extLst>
       <p:ext uri="{BB962C8B-B14F-4D97-AF65-F5344CB8AC3E}">
-        <p14:creationId xmlns:p14="http://schemas.microsoft.com/office/powerpoint/2010/main" val="2689687881"/>
+        <p14:creationId xmlns:p14="http://schemas.microsoft.com/office/powerpoint/2010/main" val="384094490"/>
       </p:ext>
     </p:extLst>
   </p:cSld>
@@ -4359,18 +3803,20 @@
             <p:ph type="title"/>
           </p:nvPr>
         </p:nvSpPr>
-        <p:spPr/>
+        <p:spPr>
+          <a:xfrm>
+            <a:off x="838199" y="365125"/>
+            <a:ext cx="10994679" cy="1325563"/>
+          </a:xfrm>
+        </p:spPr>
         <p:txBody>
           <a:bodyPr/>
           <a:lstStyle/>
           <a:p>
             <a:r>
               <a:rPr lang="en-US" dirty="0" smtClean="0"/>
-              <a:t/>
-            </a:r>
-            <a:br>
-              <a:rPr lang="en-US" dirty="0" smtClean="0"/>
-            </a:br>
+              <a:t>combined-four-eyes-rendez-vous.png</a:t>
+            </a:r>
             <a:endParaRPr lang="en-US" dirty="0"/>
           </a:p>
         </p:txBody>
@@ -4391,64 +3837,18 @@
         </p:blipFill>
         <p:spPr>
           <a:xfrm>
-            <a:off x="2804653" y="2033391"/>
-            <a:ext cx="6582694" cy="2876951"/>
+            <a:off x="2109456" y="1552761"/>
+            <a:ext cx="9077608" cy="4473711"/>
           </a:xfrm>
           <a:prstGeom prst="rect">
             <a:avLst/>
           </a:prstGeom>
         </p:spPr>
       </p:pic>
-      <p:sp>
-        <p:nvSpPr>
-          <p:cNvPr id="4" name="Rectangle 3"/>
-          <p:cNvSpPr/>
-          <p:nvPr/>
-        </p:nvSpPr>
-        <p:spPr>
-          <a:xfrm>
-            <a:off x="2804653" y="1990524"/>
-            <a:ext cx="6682247" cy="2876951"/>
-          </a:xfrm>
-          <a:prstGeom prst="rect">
-            <a:avLst/>
-          </a:prstGeom>
-          <a:noFill/>
-          <a:ln>
-            <a:solidFill>
-              <a:schemeClr val="accent1"/>
-            </a:solidFill>
-          </a:ln>
-        </p:spPr>
-        <p:style>
-          <a:lnRef idx="2">
-            <a:schemeClr val="accent1">
-              <a:shade val="50000"/>
-            </a:schemeClr>
-          </a:lnRef>
-          <a:fillRef idx="1">
-            <a:schemeClr val="accent1"/>
-          </a:fillRef>
-          <a:effectRef idx="0">
-            <a:schemeClr val="accent1"/>
-          </a:effectRef>
-          <a:fontRef idx="minor">
-            <a:schemeClr val="lt1"/>
-          </a:fontRef>
-        </p:style>
-        <p:txBody>
-          <a:bodyPr rtlCol="0" anchor="ctr"/>
-          <a:lstStyle/>
-          <a:p>
-            <a:pPr algn="ctr"/>
-            <a:endParaRPr lang="en-US"/>
-          </a:p>
-        </p:txBody>
-      </p:sp>
     </p:spTree>
     <p:extLst>
       <p:ext uri="{BB962C8B-B14F-4D97-AF65-F5344CB8AC3E}">
-        <p14:creationId xmlns:p14="http://schemas.microsoft.com/office/powerpoint/2010/main" val="2806717025"/>
+        <p14:creationId xmlns:p14="http://schemas.microsoft.com/office/powerpoint/2010/main" val="2617451086"/>
       </p:ext>
     </p:extLst>
   </p:cSld>
@@ -4482,30 +3882,6 @@
           <a:chExt cx="0" cy="0"/>
         </a:xfrm>
       </p:grpSpPr>
-      <p:pic>
-        <p:nvPicPr>
-          <p:cNvPr id="3" name="Picture 2"/>
-          <p:cNvPicPr>
-            <a:picLocks noChangeAspect="1"/>
-          </p:cNvPicPr>
-          <p:nvPr/>
-        </p:nvPicPr>
-        <p:blipFill>
-          <a:blip r:embed="rId2"/>
-          <a:stretch>
-            <a:fillRect/>
-          </a:stretch>
-        </p:blipFill>
-        <p:spPr>
-          <a:xfrm>
-            <a:off x="2641299" y="1690688"/>
-            <a:ext cx="5607352" cy="4760604"/>
-          </a:xfrm>
-          <a:prstGeom prst="rect">
-            <a:avLst/>
-          </a:prstGeom>
-        </p:spPr>
-      </p:pic>
       <p:sp>
         <p:nvSpPr>
           <p:cNvPr id="2" name="Title 1"/>
@@ -4513,7 +3889,7 @@
             <a:spLocks noGrp="1"/>
           </p:cNvSpPr>
           <p:nvPr>
-            <p:ph type="title"/>
+            <p:ph type="ctrTitle"/>
           </p:nvPr>
         </p:nvSpPr>
         <p:spPr/>
@@ -4521,101 +3897,29 @@
           <a:bodyPr/>
           <a:lstStyle/>
           <a:p>
+            <a:r>
+              <a:rPr lang="en-US" dirty="0" smtClean="0"/>
+              <a:t>Mappings</a:t>
+            </a:r>
             <a:endParaRPr lang="en-US" dirty="0"/>
           </a:p>
         </p:txBody>
       </p:sp>
       <p:sp>
         <p:nvSpPr>
-          <p:cNvPr id="5" name="Rectangle 4"/>
-          <p:cNvSpPr/>
-          <p:nvPr/>
-        </p:nvSpPr>
-        <p:spPr>
-          <a:xfrm>
-            <a:off x="5243901" y="1873123"/>
-            <a:ext cx="236148" cy="260477"/>
-          </a:xfrm>
-          <a:prstGeom prst="rect">
-            <a:avLst/>
-          </a:prstGeom>
-          <a:noFill/>
-          <a:ln w="9525">
-            <a:solidFill>
-              <a:srgbClr val="FF0000"/>
-            </a:solidFill>
-          </a:ln>
-        </p:spPr>
-        <p:style>
-          <a:lnRef idx="2">
-            <a:schemeClr val="accent1">
-              <a:shade val="50000"/>
-            </a:schemeClr>
-          </a:lnRef>
-          <a:fillRef idx="1">
-            <a:schemeClr val="accent1"/>
-          </a:fillRef>
-          <a:effectRef idx="0">
-            <a:schemeClr val="accent1"/>
-          </a:effectRef>
-          <a:fontRef idx="minor">
-            <a:schemeClr val="lt1"/>
-          </a:fontRef>
-        </p:style>
-        <p:txBody>
-          <a:bodyPr rtlCol="0" anchor="ctr"/>
-          <a:lstStyle/>
-          <a:p>
-            <a:endParaRPr lang="en-US" dirty="0">
-              <a:solidFill>
-                <a:schemeClr val="tx1"/>
-              </a:solidFill>
-            </a:endParaRPr>
-          </a:p>
-        </p:txBody>
-      </p:sp>
-      <p:sp>
-        <p:nvSpPr>
-          <p:cNvPr id="10" name="Oval 9"/>
-          <p:cNvSpPr/>
-          <p:nvPr/>
-        </p:nvSpPr>
-        <p:spPr>
-          <a:xfrm>
-            <a:off x="3622525" y="5478996"/>
-            <a:ext cx="1898650" cy="667804"/>
-          </a:xfrm>
-          <a:prstGeom prst="ellipse">
-            <a:avLst/>
-          </a:prstGeom>
-          <a:noFill/>
-          <a:ln w="57150">
-            <a:solidFill>
-              <a:srgbClr val="FF0000"/>
-            </a:solidFill>
-          </a:ln>
-        </p:spPr>
-        <p:style>
-          <a:lnRef idx="2">
-            <a:schemeClr val="accent1">
-              <a:shade val="50000"/>
-            </a:schemeClr>
-          </a:lnRef>
-          <a:fillRef idx="1">
-            <a:schemeClr val="accent1"/>
-          </a:fillRef>
-          <a:effectRef idx="0">
-            <a:schemeClr val="accent1"/>
-          </a:effectRef>
-          <a:fontRef idx="minor">
-            <a:schemeClr val="lt1"/>
-          </a:fontRef>
-        </p:style>
-        <p:txBody>
-          <a:bodyPr rtlCol="0" anchor="ctr"/>
-          <a:lstStyle/>
-          <a:p>
-            <a:pPr algn="ctr"/>
+          <p:cNvPr id="3" name="Subtitle 2"/>
+          <p:cNvSpPr>
+            <a:spLocks noGrp="1"/>
+          </p:cNvSpPr>
+          <p:nvPr>
+            <p:ph type="subTitle" idx="1"/>
+          </p:nvPr>
+        </p:nvSpPr>
+        <p:spPr/>
+        <p:txBody>
+          <a:bodyPr/>
+          <a:lstStyle/>
+          <a:p>
             <a:endParaRPr lang="en-US"/>
           </a:p>
         </p:txBody>
@@ -4623,7 +3927,7 @@
     </p:spTree>
     <p:extLst>
       <p:ext uri="{BB962C8B-B14F-4D97-AF65-F5344CB8AC3E}">
-        <p14:creationId xmlns:p14="http://schemas.microsoft.com/office/powerpoint/2010/main" val="48976695"/>
+        <p14:creationId xmlns:p14="http://schemas.microsoft.com/office/powerpoint/2010/main" val="1281675694"/>
       </p:ext>
     </p:extLst>
   </p:cSld>
@@ -4672,13 +3976,13 @@
           <a:bodyPr/>
           <a:lstStyle/>
           <a:p>
-            <a:endParaRPr lang="en-US"/>
+            <a:endParaRPr lang="en-US" dirty="0"/>
           </a:p>
         </p:txBody>
       </p:sp>
       <p:pic>
         <p:nvPicPr>
-          <p:cNvPr id="3" name="Picture 2"/>
+          <p:cNvPr id="6" name="Picture 5"/>
           <p:cNvPicPr>
             <a:picLocks noChangeAspect="1"/>
           </p:cNvPicPr>
@@ -4692,152 +3996,35 @@
         </p:blipFill>
         <p:spPr>
           <a:xfrm>
-            <a:off x="462170" y="67784"/>
-            <a:ext cx="4163006" cy="4324954"/>
+            <a:off x="2475995" y="458304"/>
+            <a:ext cx="7240010" cy="5944430"/>
           </a:xfrm>
           <a:prstGeom prst="rect">
             <a:avLst/>
           </a:prstGeom>
-          <a:ln>
-            <a:solidFill>
-              <a:schemeClr val="accent1"/>
-            </a:solidFill>
-          </a:ln>
         </p:spPr>
       </p:pic>
-      <p:pic>
-        <p:nvPicPr>
-          <p:cNvPr id="5" name="Picture 4"/>
-          <p:cNvPicPr>
-            <a:picLocks noChangeAspect="1"/>
-          </p:cNvPicPr>
+      <p:sp>
+        <p:nvSpPr>
+          <p:cNvPr id="9" name="Rectangle 8"/>
+          <p:cNvSpPr/>
           <p:nvPr/>
-        </p:nvPicPr>
-        <p:blipFill>
-          <a:blip r:embed="rId3"/>
-          <a:stretch>
-            <a:fillRect/>
-          </a:stretch>
-        </p:blipFill>
-        <p:spPr>
-          <a:xfrm>
-            <a:off x="462170" y="4510205"/>
-            <a:ext cx="5725324" cy="1914792"/>
+        </p:nvSpPr>
+        <p:spPr>
+          <a:xfrm>
+            <a:off x="9201016" y="4927942"/>
+            <a:ext cx="2152784" cy="1147601"/>
           </a:xfrm>
           <a:prstGeom prst="rect">
             <a:avLst/>
           </a:prstGeom>
-          <a:ln>
+          <a:solidFill>
+            <a:schemeClr val="bg1"/>
+          </a:solidFill>
+          <a:ln w="57150">
             <a:solidFill>
-              <a:schemeClr val="accent1"/>
+              <a:srgbClr val="FF0000"/>
             </a:solidFill>
-          </a:ln>
-        </p:spPr>
-      </p:pic>
-      <p:pic>
-        <p:nvPicPr>
-          <p:cNvPr id="6" name="Picture 5"/>
-          <p:cNvPicPr>
-            <a:picLocks noChangeAspect="1"/>
-          </p:cNvPicPr>
-          <p:nvPr/>
-        </p:nvPicPr>
-        <p:blipFill>
-          <a:blip r:embed="rId4"/>
-          <a:stretch>
-            <a:fillRect/>
-          </a:stretch>
-        </p:blipFill>
-        <p:spPr>
-          <a:xfrm>
-            <a:off x="4688722" y="67784"/>
-            <a:ext cx="4277322" cy="2715004"/>
-          </a:xfrm>
-          <a:prstGeom prst="rect">
-            <a:avLst/>
-          </a:prstGeom>
-          <a:ln>
-            <a:solidFill>
-              <a:schemeClr val="accent1"/>
-            </a:solidFill>
-          </a:ln>
-        </p:spPr>
-      </p:pic>
-      <p:pic>
-        <p:nvPicPr>
-          <p:cNvPr id="10" name="Picture 9"/>
-          <p:cNvPicPr>
-            <a:picLocks noChangeAspect="1"/>
-          </p:cNvPicPr>
-          <p:nvPr/>
-        </p:nvPicPr>
-        <p:blipFill>
-          <a:blip r:embed="rId5"/>
-          <a:stretch>
-            <a:fillRect/>
-          </a:stretch>
-        </p:blipFill>
-        <p:spPr>
-          <a:xfrm>
-            <a:off x="6354077" y="4157731"/>
-            <a:ext cx="4096322" cy="2267266"/>
-          </a:xfrm>
-          <a:prstGeom prst="rect">
-            <a:avLst/>
-          </a:prstGeom>
-          <a:ln>
-            <a:solidFill>
-              <a:schemeClr val="accent1"/>
-            </a:solidFill>
-          </a:ln>
-        </p:spPr>
-      </p:pic>
-      <p:pic>
-        <p:nvPicPr>
-          <p:cNvPr id="23" name="Picture 22"/>
-          <p:cNvPicPr>
-            <a:picLocks noChangeAspect="1"/>
-          </p:cNvPicPr>
-          <p:nvPr/>
-        </p:nvPicPr>
-        <p:blipFill>
-          <a:blip r:embed="rId6"/>
-          <a:stretch>
-            <a:fillRect/>
-          </a:stretch>
-        </p:blipFill>
-        <p:spPr>
-          <a:xfrm>
-            <a:off x="9107186" y="940292"/>
-            <a:ext cx="2686425" cy="2819794"/>
-          </a:xfrm>
-          <a:prstGeom prst="rect">
-            <a:avLst/>
-          </a:prstGeom>
-          <a:ln>
-            <a:solidFill>
-              <a:schemeClr val="accent1"/>
-            </a:solidFill>
-          </a:ln>
-        </p:spPr>
-      </p:pic>
-      <p:sp>
-        <p:nvSpPr>
-          <p:cNvPr id="24" name="Rectangle 23"/>
-          <p:cNvSpPr/>
-          <p:nvPr/>
-        </p:nvSpPr>
-        <p:spPr>
-          <a:xfrm>
-            <a:off x="7920111" y="6424997"/>
-            <a:ext cx="3873500" cy="392383"/>
-          </a:xfrm>
-          <a:prstGeom prst="rect">
-            <a:avLst/>
-          </a:prstGeom>
-          <a:noFill/>
-          <a:ln>
-            <a:noFill/>
           </a:ln>
         </p:spPr>
         <p:style>
@@ -4860,35 +4047,1064 @@
           <a:bodyPr rtlCol="0" anchor="ctr"/>
           <a:lstStyle/>
           <a:p>
-            <a:pPr algn="ctr"/>
-            <a:r>
-              <a:rPr lang="en-US" b="1" dirty="0" smtClean="0">
+            <a:r>
+              <a:rPr lang="en-US" dirty="0" smtClean="0">
                 <a:solidFill>
                   <a:schemeClr val="tx1"/>
                 </a:solidFill>
               </a:rPr>
-              <a:t>Various properties </a:t>
-            </a:r>
-            <a:r>
-              <a:rPr lang="en-US" b="1" smtClean="0">
+              <a:t>R – Required</a:t>
+            </a:r>
+            <a:br>
+              <a:rPr lang="en-US" dirty="0" smtClean="0">
                 <a:solidFill>
                   <a:schemeClr val="tx1"/>
                 </a:solidFill>
               </a:rPr>
-              <a:t>with expressions</a:t>
-            </a:r>
-            <a:endParaRPr lang="en-US" b="1" dirty="0">
+            </a:br>
+            <a:endParaRPr lang="en-US" sz="1400" dirty="0" smtClean="0">
               <a:solidFill>
                 <a:schemeClr val="tx1"/>
               </a:solidFill>
             </a:endParaRPr>
           </a:p>
+          <a:p>
+            <a:r>
+              <a:rPr lang="en-US" sz="1400" dirty="0" smtClean="0">
+                <a:solidFill>
+                  <a:schemeClr val="tx1"/>
+                </a:solidFill>
+              </a:rPr>
+              <a:t>Mandatory output</a:t>
+            </a:r>
+          </a:p>
+          <a:p>
+            <a:endParaRPr lang="en-US" dirty="0">
+              <a:solidFill>
+                <a:schemeClr val="tx1"/>
+              </a:solidFill>
+            </a:endParaRPr>
+          </a:p>
         </p:txBody>
       </p:sp>
     </p:spTree>
     <p:extLst>
       <p:ext uri="{BB962C8B-B14F-4D97-AF65-F5344CB8AC3E}">
-        <p14:creationId xmlns:p14="http://schemas.microsoft.com/office/powerpoint/2010/main" val="4136435964"/>
+        <p14:creationId xmlns:p14="http://schemas.microsoft.com/office/powerpoint/2010/main" val="2261436592"/>
+      </p:ext>
+    </p:extLst>
+  </p:cSld>
+  <p:clrMapOvr>
+    <a:masterClrMapping/>
+  </p:clrMapOvr>
+  <p:timing>
+    <p:tnLst>
+      <p:par>
+        <p:cTn id="1" dur="indefinite" restart="never" nodeType="tmRoot"/>
+      </p:par>
+    </p:tnLst>
+  </p:timing>
+</p:sld>
+</file>
+
+<file path=ppt/slides/slide16.xml><?xml version="1.0" encoding="utf-8"?>
+<p:sld xmlns:a="http://schemas.openxmlformats.org/drawingml/2006/main" xmlns:r="http://schemas.openxmlformats.org/officeDocument/2006/relationships" xmlns:p="http://schemas.openxmlformats.org/presentationml/2006/main">
+  <p:cSld>
+    <p:spTree>
+      <p:nvGrpSpPr>
+        <p:cNvPr id="1" name=""/>
+        <p:cNvGrpSpPr/>
+        <p:nvPr/>
+      </p:nvGrpSpPr>
+      <p:grpSpPr>
+        <a:xfrm>
+          <a:off x="0" y="0"/>
+          <a:ext cx="0" cy="0"/>
+          <a:chOff x="0" y="0"/>
+          <a:chExt cx="0" cy="0"/>
+        </a:xfrm>
+      </p:grpSpPr>
+      <p:sp>
+        <p:nvSpPr>
+          <p:cNvPr id="2" name="Title 1"/>
+          <p:cNvSpPr>
+            <a:spLocks noGrp="1"/>
+          </p:cNvSpPr>
+          <p:nvPr>
+            <p:ph type="title"/>
+          </p:nvPr>
+        </p:nvSpPr>
+        <p:spPr/>
+        <p:txBody>
+          <a:bodyPr/>
+          <a:lstStyle/>
+          <a:p>
+            <a:endParaRPr lang="en-US" dirty="0"/>
+          </a:p>
+        </p:txBody>
+      </p:sp>
+      <p:pic>
+        <p:nvPicPr>
+          <p:cNvPr id="5" name="Picture 4"/>
+          <p:cNvPicPr>
+            <a:picLocks noChangeAspect="1"/>
+          </p:cNvPicPr>
+          <p:nvPr/>
+        </p:nvPicPr>
+        <p:blipFill>
+          <a:blip r:embed="rId2"/>
+          <a:stretch>
+            <a:fillRect/>
+          </a:stretch>
+        </p:blipFill>
+        <p:spPr>
+          <a:xfrm>
+            <a:off x="3581049" y="1776182"/>
+            <a:ext cx="5029902" cy="3305636"/>
+          </a:xfrm>
+          <a:prstGeom prst="rect">
+            <a:avLst/>
+          </a:prstGeom>
+        </p:spPr>
+      </p:pic>
+      <p:sp>
+        <p:nvSpPr>
+          <p:cNvPr id="7" name="Oval 6"/>
+          <p:cNvSpPr/>
+          <p:nvPr/>
+        </p:nvSpPr>
+        <p:spPr>
+          <a:xfrm>
+            <a:off x="6096000" y="3961346"/>
+            <a:ext cx="2759565" cy="1064786"/>
+          </a:xfrm>
+          <a:prstGeom prst="ellipse">
+            <a:avLst/>
+          </a:prstGeom>
+          <a:noFill/>
+          <a:ln w="57150">
+            <a:solidFill>
+              <a:srgbClr val="FF0000"/>
+            </a:solidFill>
+          </a:ln>
+        </p:spPr>
+        <p:style>
+          <a:lnRef idx="2">
+            <a:schemeClr val="accent1">
+              <a:shade val="50000"/>
+            </a:schemeClr>
+          </a:lnRef>
+          <a:fillRef idx="1">
+            <a:schemeClr val="accent1"/>
+          </a:fillRef>
+          <a:effectRef idx="0">
+            <a:schemeClr val="accent1"/>
+          </a:effectRef>
+          <a:fontRef idx="minor">
+            <a:schemeClr val="lt1"/>
+          </a:fontRef>
+        </p:style>
+        <p:txBody>
+          <a:bodyPr rtlCol="0" anchor="ctr"/>
+          <a:lstStyle/>
+          <a:p>
+            <a:pPr algn="ctr"/>
+            <a:endParaRPr lang="en-US"/>
+          </a:p>
+        </p:txBody>
+      </p:sp>
+    </p:spTree>
+    <p:extLst>
+      <p:ext uri="{BB962C8B-B14F-4D97-AF65-F5344CB8AC3E}">
+        <p14:creationId xmlns:p14="http://schemas.microsoft.com/office/powerpoint/2010/main" val="2806846218"/>
+      </p:ext>
+    </p:extLst>
+  </p:cSld>
+  <p:clrMapOvr>
+    <a:masterClrMapping/>
+  </p:clrMapOvr>
+  <p:timing>
+    <p:tnLst>
+      <p:par>
+        <p:cTn id="1" dur="indefinite" restart="never" nodeType="tmRoot"/>
+      </p:par>
+    </p:tnLst>
+  </p:timing>
+</p:sld>
+</file>
+
+<file path=ppt/slides/slide17.xml><?xml version="1.0" encoding="utf-8"?>
+<p:sld xmlns:a="http://schemas.openxmlformats.org/drawingml/2006/main" xmlns:r="http://schemas.openxmlformats.org/officeDocument/2006/relationships" xmlns:p="http://schemas.openxmlformats.org/presentationml/2006/main">
+  <p:cSld>
+    <p:spTree>
+      <p:nvGrpSpPr>
+        <p:cNvPr id="1" name=""/>
+        <p:cNvGrpSpPr/>
+        <p:nvPr/>
+      </p:nvGrpSpPr>
+      <p:grpSpPr>
+        <a:xfrm>
+          <a:off x="0" y="0"/>
+          <a:ext cx="0" cy="0"/>
+          <a:chOff x="0" y="0"/>
+          <a:chExt cx="0" cy="0"/>
+        </a:xfrm>
+      </p:grpSpPr>
+      <p:sp>
+        <p:nvSpPr>
+          <p:cNvPr id="2" name="Title 1"/>
+          <p:cNvSpPr>
+            <a:spLocks noGrp="1"/>
+          </p:cNvSpPr>
+          <p:nvPr>
+            <p:ph type="title"/>
+          </p:nvPr>
+        </p:nvSpPr>
+        <p:spPr/>
+        <p:txBody>
+          <a:bodyPr/>
+          <a:lstStyle/>
+          <a:p>
+            <a:endParaRPr lang="en-US" dirty="0"/>
+          </a:p>
+        </p:txBody>
+      </p:sp>
+      <p:pic>
+        <p:nvPicPr>
+          <p:cNvPr id="6" name="Picture 5"/>
+          <p:cNvPicPr>
+            <a:picLocks noChangeAspect="1"/>
+          </p:cNvPicPr>
+          <p:nvPr/>
+        </p:nvPicPr>
+        <p:blipFill>
+          <a:blip r:embed="rId2"/>
+          <a:stretch>
+            <a:fillRect/>
+          </a:stretch>
+        </p:blipFill>
+        <p:spPr>
+          <a:xfrm>
+            <a:off x="2475995" y="458304"/>
+            <a:ext cx="7240010" cy="5944430"/>
+          </a:xfrm>
+          <a:prstGeom prst="rect">
+            <a:avLst/>
+          </a:prstGeom>
+        </p:spPr>
+      </p:pic>
+      <p:sp>
+        <p:nvSpPr>
+          <p:cNvPr id="9" name="Rectangle 8"/>
+          <p:cNvSpPr/>
+          <p:nvPr/>
+        </p:nvSpPr>
+        <p:spPr>
+          <a:xfrm>
+            <a:off x="9201016" y="4927942"/>
+            <a:ext cx="2152784" cy="1147601"/>
+          </a:xfrm>
+          <a:prstGeom prst="rect">
+            <a:avLst/>
+          </a:prstGeom>
+          <a:solidFill>
+            <a:schemeClr val="bg1"/>
+          </a:solidFill>
+          <a:ln w="57150">
+            <a:solidFill>
+              <a:srgbClr val="FF0000"/>
+            </a:solidFill>
+          </a:ln>
+        </p:spPr>
+        <p:style>
+          <a:lnRef idx="2">
+            <a:schemeClr val="accent1">
+              <a:shade val="50000"/>
+            </a:schemeClr>
+          </a:lnRef>
+          <a:fillRef idx="1">
+            <a:schemeClr val="accent1"/>
+          </a:fillRef>
+          <a:effectRef idx="0">
+            <a:schemeClr val="accent1"/>
+          </a:effectRef>
+          <a:fontRef idx="minor">
+            <a:schemeClr val="lt1"/>
+          </a:fontRef>
+        </p:style>
+        <p:txBody>
+          <a:bodyPr rtlCol="0" anchor="ctr"/>
+          <a:lstStyle/>
+          <a:p>
+            <a:r>
+              <a:rPr lang="en-US" dirty="0" smtClean="0">
+                <a:solidFill>
+                  <a:schemeClr val="tx1"/>
+                </a:solidFill>
+              </a:rPr>
+              <a:t>R – Required</a:t>
+            </a:r>
+            <a:br>
+              <a:rPr lang="en-US" dirty="0" smtClean="0">
+                <a:solidFill>
+                  <a:schemeClr val="tx1"/>
+                </a:solidFill>
+              </a:rPr>
+            </a:br>
+            <a:endParaRPr lang="en-US" sz="1400" dirty="0" smtClean="0">
+              <a:solidFill>
+                <a:schemeClr val="tx1"/>
+              </a:solidFill>
+            </a:endParaRPr>
+          </a:p>
+          <a:p>
+            <a:r>
+              <a:rPr lang="en-US" sz="1400" dirty="0" smtClean="0">
+                <a:solidFill>
+                  <a:schemeClr val="tx1"/>
+                </a:solidFill>
+              </a:rPr>
+              <a:t>Mandatory output</a:t>
+            </a:r>
+          </a:p>
+          <a:p>
+            <a:endParaRPr lang="en-US" dirty="0">
+              <a:solidFill>
+                <a:schemeClr val="tx1"/>
+              </a:solidFill>
+            </a:endParaRPr>
+          </a:p>
+        </p:txBody>
+      </p:sp>
+    </p:spTree>
+    <p:extLst>
+      <p:ext uri="{BB962C8B-B14F-4D97-AF65-F5344CB8AC3E}">
+        <p14:creationId xmlns:p14="http://schemas.microsoft.com/office/powerpoint/2010/main" val="2447276958"/>
+      </p:ext>
+    </p:extLst>
+  </p:cSld>
+  <p:clrMapOvr>
+    <a:masterClrMapping/>
+  </p:clrMapOvr>
+  <p:timing>
+    <p:tnLst>
+      <p:par>
+        <p:cTn id="1" dur="indefinite" restart="never" nodeType="tmRoot"/>
+      </p:par>
+    </p:tnLst>
+  </p:timing>
+</p:sld>
+</file>
+
+<file path=ppt/slides/slide18.xml><?xml version="1.0" encoding="utf-8"?>
+<p:sld xmlns:a="http://schemas.openxmlformats.org/drawingml/2006/main" xmlns:r="http://schemas.openxmlformats.org/officeDocument/2006/relationships" xmlns:p="http://schemas.openxmlformats.org/presentationml/2006/main">
+  <p:cSld>
+    <p:spTree>
+      <p:nvGrpSpPr>
+        <p:cNvPr id="1" name=""/>
+        <p:cNvGrpSpPr/>
+        <p:nvPr/>
+      </p:nvGrpSpPr>
+      <p:grpSpPr>
+        <a:xfrm>
+          <a:off x="0" y="0"/>
+          <a:ext cx="0" cy="0"/>
+          <a:chOff x="0" y="0"/>
+          <a:chExt cx="0" cy="0"/>
+        </a:xfrm>
+      </p:grpSpPr>
+      <p:sp>
+        <p:nvSpPr>
+          <p:cNvPr id="2" name="Title 1"/>
+          <p:cNvSpPr>
+            <a:spLocks noGrp="1"/>
+          </p:cNvSpPr>
+          <p:nvPr>
+            <p:ph type="title"/>
+          </p:nvPr>
+        </p:nvSpPr>
+        <p:spPr/>
+        <p:txBody>
+          <a:bodyPr/>
+          <a:lstStyle/>
+          <a:p>
+            <a:endParaRPr lang="en-US" dirty="0"/>
+          </a:p>
+        </p:txBody>
+      </p:sp>
+      <p:pic>
+        <p:nvPicPr>
+          <p:cNvPr id="4" name="Picture 3"/>
+          <p:cNvPicPr>
+            <a:picLocks noChangeAspect="1"/>
+          </p:cNvPicPr>
+          <p:nvPr/>
+        </p:nvPicPr>
+        <p:blipFill>
+          <a:blip r:embed="rId2"/>
+          <a:stretch>
+            <a:fillRect/>
+          </a:stretch>
+        </p:blipFill>
+        <p:spPr>
+          <a:xfrm>
+            <a:off x="985917" y="1376376"/>
+            <a:ext cx="9685488" cy="4365084"/>
+          </a:xfrm>
+          <a:prstGeom prst="rect">
+            <a:avLst/>
+          </a:prstGeom>
+        </p:spPr>
+      </p:pic>
+      <p:sp>
+        <p:nvSpPr>
+          <p:cNvPr id="5" name="Rectangle 4"/>
+          <p:cNvSpPr/>
+          <p:nvPr/>
+        </p:nvSpPr>
+        <p:spPr>
+          <a:xfrm>
+            <a:off x="2580556" y="2874377"/>
+            <a:ext cx="280137" cy="282601"/>
+          </a:xfrm>
+          <a:prstGeom prst="rect">
+            <a:avLst/>
+          </a:prstGeom>
+          <a:noFill/>
+          <a:ln w="57150">
+            <a:solidFill>
+              <a:srgbClr val="FF0000"/>
+            </a:solidFill>
+          </a:ln>
+        </p:spPr>
+        <p:style>
+          <a:lnRef idx="2">
+            <a:schemeClr val="accent1">
+              <a:shade val="50000"/>
+            </a:schemeClr>
+          </a:lnRef>
+          <a:fillRef idx="1">
+            <a:schemeClr val="accent1"/>
+          </a:fillRef>
+          <a:effectRef idx="0">
+            <a:schemeClr val="accent1"/>
+          </a:effectRef>
+          <a:fontRef idx="minor">
+            <a:schemeClr val="lt1"/>
+          </a:fontRef>
+        </p:style>
+        <p:txBody>
+          <a:bodyPr rtlCol="0" anchor="ctr"/>
+          <a:lstStyle/>
+          <a:p>
+            <a:endParaRPr lang="en-US" dirty="0">
+              <a:solidFill>
+                <a:schemeClr val="tx1"/>
+              </a:solidFill>
+            </a:endParaRPr>
+          </a:p>
+        </p:txBody>
+      </p:sp>
+    </p:spTree>
+    <p:extLst>
+      <p:ext uri="{BB962C8B-B14F-4D97-AF65-F5344CB8AC3E}">
+        <p14:creationId xmlns:p14="http://schemas.microsoft.com/office/powerpoint/2010/main" val="572802433"/>
+      </p:ext>
+    </p:extLst>
+  </p:cSld>
+  <p:clrMapOvr>
+    <a:masterClrMapping/>
+  </p:clrMapOvr>
+  <p:timing>
+    <p:tnLst>
+      <p:par>
+        <p:cTn id="1" dur="indefinite" restart="never" nodeType="tmRoot"/>
+      </p:par>
+    </p:tnLst>
+  </p:timing>
+</p:sld>
+</file>
+
+<file path=ppt/slides/slide19.xml><?xml version="1.0" encoding="utf-8"?>
+<p:sld xmlns:a="http://schemas.openxmlformats.org/drawingml/2006/main" xmlns:r="http://schemas.openxmlformats.org/officeDocument/2006/relationships" xmlns:p="http://schemas.openxmlformats.org/presentationml/2006/main">
+  <p:cSld>
+    <p:spTree>
+      <p:nvGrpSpPr>
+        <p:cNvPr id="1" name=""/>
+        <p:cNvGrpSpPr/>
+        <p:nvPr/>
+      </p:nvGrpSpPr>
+      <p:grpSpPr>
+        <a:xfrm>
+          <a:off x="0" y="0"/>
+          <a:ext cx="0" cy="0"/>
+          <a:chOff x="0" y="0"/>
+          <a:chExt cx="0" cy="0"/>
+        </a:xfrm>
+      </p:grpSpPr>
+      <p:sp>
+        <p:nvSpPr>
+          <p:cNvPr id="2" name="Title 1"/>
+          <p:cNvSpPr>
+            <a:spLocks noGrp="1"/>
+          </p:cNvSpPr>
+          <p:nvPr>
+            <p:ph type="title"/>
+          </p:nvPr>
+        </p:nvSpPr>
+        <p:spPr/>
+        <p:txBody>
+          <a:bodyPr/>
+          <a:lstStyle/>
+          <a:p>
+            <a:endParaRPr lang="en-US" dirty="0"/>
+          </a:p>
+        </p:txBody>
+      </p:sp>
+      <p:pic>
+        <p:nvPicPr>
+          <p:cNvPr id="4" name="Picture 3"/>
+          <p:cNvPicPr>
+            <a:picLocks noChangeAspect="1"/>
+          </p:cNvPicPr>
+          <p:nvPr/>
+        </p:nvPicPr>
+        <p:blipFill>
+          <a:blip r:embed="rId2"/>
+          <a:stretch>
+            <a:fillRect/>
+          </a:stretch>
+        </p:blipFill>
+        <p:spPr>
+          <a:xfrm>
+            <a:off x="1052421" y="1690688"/>
+            <a:ext cx="8554644" cy="704948"/>
+          </a:xfrm>
+          <a:prstGeom prst="rect">
+            <a:avLst/>
+          </a:prstGeom>
+        </p:spPr>
+      </p:pic>
+      <p:sp>
+        <p:nvSpPr>
+          <p:cNvPr id="5" name="Oval 4"/>
+          <p:cNvSpPr/>
+          <p:nvPr/>
+        </p:nvSpPr>
+        <p:spPr>
+          <a:xfrm>
+            <a:off x="1006446" y="1604916"/>
+            <a:ext cx="2353261" cy="1064786"/>
+          </a:xfrm>
+          <a:prstGeom prst="ellipse">
+            <a:avLst/>
+          </a:prstGeom>
+          <a:noFill/>
+          <a:ln w="57150">
+            <a:solidFill>
+              <a:schemeClr val="accent1"/>
+            </a:solidFill>
+          </a:ln>
+        </p:spPr>
+        <p:style>
+          <a:lnRef idx="2">
+            <a:schemeClr val="accent1">
+              <a:shade val="50000"/>
+            </a:schemeClr>
+          </a:lnRef>
+          <a:fillRef idx="1">
+            <a:schemeClr val="accent1"/>
+          </a:fillRef>
+          <a:effectRef idx="0">
+            <a:schemeClr val="accent1"/>
+          </a:effectRef>
+          <a:fontRef idx="minor">
+            <a:schemeClr val="lt1"/>
+          </a:fontRef>
+        </p:style>
+        <p:txBody>
+          <a:bodyPr rtlCol="0" anchor="ctr"/>
+          <a:lstStyle/>
+          <a:p>
+            <a:pPr algn="ctr"/>
+            <a:endParaRPr lang="en-US"/>
+          </a:p>
+        </p:txBody>
+      </p:sp>
+      <p:sp>
+        <p:nvSpPr>
+          <p:cNvPr id="6" name="Oval 5"/>
+          <p:cNvSpPr/>
+          <p:nvPr/>
+        </p:nvSpPr>
+        <p:spPr>
+          <a:xfrm>
+            <a:off x="7315200" y="1604916"/>
+            <a:ext cx="2291865" cy="1064786"/>
+          </a:xfrm>
+          <a:prstGeom prst="ellipse">
+            <a:avLst/>
+          </a:prstGeom>
+          <a:noFill/>
+          <a:ln w="57150">
+            <a:solidFill>
+              <a:schemeClr val="accent1"/>
+            </a:solidFill>
+          </a:ln>
+        </p:spPr>
+        <p:style>
+          <a:lnRef idx="2">
+            <a:schemeClr val="accent1">
+              <a:shade val="50000"/>
+            </a:schemeClr>
+          </a:lnRef>
+          <a:fillRef idx="1">
+            <a:schemeClr val="accent1"/>
+          </a:fillRef>
+          <a:effectRef idx="0">
+            <a:schemeClr val="accent1"/>
+          </a:effectRef>
+          <a:fontRef idx="minor">
+            <a:schemeClr val="lt1"/>
+          </a:fontRef>
+        </p:style>
+        <p:txBody>
+          <a:bodyPr rtlCol="0" anchor="ctr"/>
+          <a:lstStyle/>
+          <a:p>
+            <a:pPr algn="ctr"/>
+            <a:endParaRPr lang="en-US"/>
+          </a:p>
+        </p:txBody>
+      </p:sp>
+      <p:cxnSp>
+        <p:nvCxnSpPr>
+          <p:cNvPr id="8" name="Straight Arrow Connector 7"/>
+          <p:cNvCxnSpPr/>
+          <p:nvPr/>
+        </p:nvCxnSpPr>
+        <p:spPr>
+          <a:xfrm>
+            <a:off x="3432832" y="2137309"/>
+            <a:ext cx="3810851" cy="0"/>
+          </a:xfrm>
+          <a:prstGeom prst="straightConnector1">
+            <a:avLst/>
+          </a:prstGeom>
+          <a:ln w="76200">
+            <a:tailEnd type="triangle"/>
+          </a:ln>
+        </p:spPr>
+        <p:style>
+          <a:lnRef idx="1">
+            <a:schemeClr val="accent1"/>
+          </a:lnRef>
+          <a:fillRef idx="0">
+            <a:schemeClr val="accent1"/>
+          </a:fillRef>
+          <a:effectRef idx="0">
+            <a:schemeClr val="accent1"/>
+          </a:effectRef>
+          <a:fontRef idx="minor">
+            <a:schemeClr val="tx1"/>
+          </a:fontRef>
+        </p:style>
+      </p:cxnSp>
+      <p:pic>
+        <p:nvPicPr>
+          <p:cNvPr id="19" name="Picture 18"/>
+          <p:cNvPicPr>
+            <a:picLocks noChangeAspect="1"/>
+          </p:cNvPicPr>
+          <p:nvPr/>
+        </p:nvPicPr>
+        <p:blipFill rotWithShape="1">
+          <a:blip r:embed="rId3"/>
+          <a:srcRect t="21901"/>
+          <a:stretch/>
+        </p:blipFill>
+        <p:spPr>
+          <a:xfrm>
+            <a:off x="6173264" y="2814737"/>
+            <a:ext cx="5509930" cy="2361055"/>
+          </a:xfrm>
+          <a:prstGeom prst="rect">
+            <a:avLst/>
+          </a:prstGeom>
+        </p:spPr>
+      </p:pic>
+      <p:pic>
+        <p:nvPicPr>
+          <p:cNvPr id="22" name="Picture 21"/>
+          <p:cNvPicPr>
+            <a:picLocks noChangeAspect="1"/>
+          </p:cNvPicPr>
+          <p:nvPr/>
+        </p:nvPicPr>
+        <p:blipFill rotWithShape="1">
+          <a:blip r:embed="rId4"/>
+          <a:srcRect l="12707" b="42295"/>
+          <a:stretch/>
+        </p:blipFill>
+        <p:spPr>
+          <a:xfrm>
+            <a:off x="704955" y="2878016"/>
+            <a:ext cx="4332545" cy="2138413"/>
+          </a:xfrm>
+          <a:prstGeom prst="rect">
+            <a:avLst/>
+          </a:prstGeom>
+        </p:spPr>
+      </p:pic>
+      <p:sp>
+        <p:nvSpPr>
+          <p:cNvPr id="23" name="Rectangle 22"/>
+          <p:cNvSpPr/>
+          <p:nvPr/>
+        </p:nvSpPr>
+        <p:spPr>
+          <a:xfrm>
+            <a:off x="1409156" y="3550836"/>
+            <a:ext cx="1547839" cy="419399"/>
+          </a:xfrm>
+          <a:prstGeom prst="rect">
+            <a:avLst/>
+          </a:prstGeom>
+          <a:noFill/>
+          <a:ln w="57150">
+            <a:solidFill>
+              <a:schemeClr val="accent1"/>
+            </a:solidFill>
+          </a:ln>
+        </p:spPr>
+        <p:style>
+          <a:lnRef idx="2">
+            <a:schemeClr val="accent1">
+              <a:shade val="50000"/>
+            </a:schemeClr>
+          </a:lnRef>
+          <a:fillRef idx="1">
+            <a:schemeClr val="accent1"/>
+          </a:fillRef>
+          <a:effectRef idx="0">
+            <a:schemeClr val="accent1"/>
+          </a:effectRef>
+          <a:fontRef idx="minor">
+            <a:schemeClr val="lt1"/>
+          </a:fontRef>
+        </p:style>
+        <p:txBody>
+          <a:bodyPr rtlCol="0" anchor="ctr"/>
+          <a:lstStyle/>
+          <a:p>
+            <a:pPr algn="ctr"/>
+            <a:endParaRPr lang="en-US"/>
+          </a:p>
+        </p:txBody>
+      </p:sp>
+      <p:cxnSp>
+        <p:nvCxnSpPr>
+          <p:cNvPr id="25" name="Straight Connector 24"/>
+          <p:cNvCxnSpPr>
+            <a:stCxn id="5" idx="4"/>
+            <a:endCxn id="23" idx="0"/>
+          </p:cNvCxnSpPr>
+          <p:nvPr/>
+        </p:nvCxnSpPr>
+        <p:spPr>
+          <a:xfrm flipH="1">
+            <a:off x="2183076" y="2669702"/>
+            <a:ext cx="1" cy="881134"/>
+          </a:xfrm>
+          <a:prstGeom prst="line">
+            <a:avLst/>
+          </a:prstGeom>
+          <a:ln w="76200"/>
+        </p:spPr>
+        <p:style>
+          <a:lnRef idx="1">
+            <a:schemeClr val="accent1"/>
+          </a:lnRef>
+          <a:fillRef idx="0">
+            <a:schemeClr val="accent1"/>
+          </a:fillRef>
+          <a:effectRef idx="0">
+            <a:schemeClr val="accent1"/>
+          </a:effectRef>
+          <a:fontRef idx="minor">
+            <a:schemeClr val="tx1"/>
+          </a:fontRef>
+        </p:style>
+      </p:cxnSp>
+      <p:sp>
+        <p:nvSpPr>
+          <p:cNvPr id="27" name="Rectangle 26"/>
+          <p:cNvSpPr/>
+          <p:nvPr/>
+        </p:nvSpPr>
+        <p:spPr>
+          <a:xfrm>
+            <a:off x="7691612" y="3550836"/>
+            <a:ext cx="1547839" cy="419399"/>
+          </a:xfrm>
+          <a:prstGeom prst="rect">
+            <a:avLst/>
+          </a:prstGeom>
+          <a:noFill/>
+          <a:ln w="57150">
+            <a:solidFill>
+              <a:schemeClr val="accent1"/>
+            </a:solidFill>
+          </a:ln>
+        </p:spPr>
+        <p:style>
+          <a:lnRef idx="2">
+            <a:schemeClr val="accent1">
+              <a:shade val="50000"/>
+            </a:schemeClr>
+          </a:lnRef>
+          <a:fillRef idx="1">
+            <a:schemeClr val="accent1"/>
+          </a:fillRef>
+          <a:effectRef idx="0">
+            <a:schemeClr val="accent1"/>
+          </a:effectRef>
+          <a:fontRef idx="minor">
+            <a:schemeClr val="lt1"/>
+          </a:fontRef>
+        </p:style>
+        <p:txBody>
+          <a:bodyPr rtlCol="0" anchor="ctr"/>
+          <a:lstStyle/>
+          <a:p>
+            <a:pPr algn="ctr"/>
+            <a:endParaRPr lang="en-US"/>
+          </a:p>
+        </p:txBody>
+      </p:sp>
+      <p:cxnSp>
+        <p:nvCxnSpPr>
+          <p:cNvPr id="28" name="Straight Connector 27"/>
+          <p:cNvCxnSpPr>
+            <a:stCxn id="6" idx="4"/>
+            <a:endCxn id="27" idx="0"/>
+          </p:cNvCxnSpPr>
+          <p:nvPr/>
+        </p:nvCxnSpPr>
+        <p:spPr>
+          <a:xfrm>
+            <a:off x="8461133" y="2669702"/>
+            <a:ext cx="4399" cy="881134"/>
+          </a:xfrm>
+          <a:prstGeom prst="line">
+            <a:avLst/>
+          </a:prstGeom>
+          <a:ln w="76200"/>
+        </p:spPr>
+        <p:style>
+          <a:lnRef idx="1">
+            <a:schemeClr val="accent1"/>
+          </a:lnRef>
+          <a:fillRef idx="0">
+            <a:schemeClr val="accent1"/>
+          </a:fillRef>
+          <a:effectRef idx="0">
+            <a:schemeClr val="accent1"/>
+          </a:effectRef>
+          <a:fontRef idx="minor">
+            <a:schemeClr val="tx1"/>
+          </a:fontRef>
+        </p:style>
+      </p:cxnSp>
+      <p:sp>
+        <p:nvSpPr>
+          <p:cNvPr id="32" name="Rectangle 31"/>
+          <p:cNvSpPr/>
+          <p:nvPr/>
+        </p:nvSpPr>
+        <p:spPr>
+          <a:xfrm>
+            <a:off x="6649407" y="4506490"/>
+            <a:ext cx="3623449" cy="814337"/>
+          </a:xfrm>
+          <a:prstGeom prst="rect">
+            <a:avLst/>
+          </a:prstGeom>
+          <a:solidFill>
+            <a:schemeClr val="bg1">
+              <a:lumMod val="95000"/>
+            </a:schemeClr>
+          </a:solidFill>
+          <a:ln w="57150">
+            <a:solidFill>
+              <a:schemeClr val="accent1"/>
+            </a:solidFill>
+          </a:ln>
+        </p:spPr>
+        <p:style>
+          <a:lnRef idx="2">
+            <a:schemeClr val="accent1">
+              <a:shade val="50000"/>
+            </a:schemeClr>
+          </a:lnRef>
+          <a:fillRef idx="1">
+            <a:schemeClr val="accent1"/>
+          </a:fillRef>
+          <a:effectRef idx="0">
+            <a:schemeClr val="accent1"/>
+          </a:effectRef>
+          <a:fontRef idx="minor">
+            <a:schemeClr val="lt1"/>
+          </a:fontRef>
+        </p:style>
+        <p:txBody>
+          <a:bodyPr rtlCol="0" anchor="ctr"/>
+          <a:lstStyle/>
+          <a:p>
+            <a:pPr algn="ctr"/>
+            <a:r>
+              <a:rPr lang="en-US" dirty="0">
+                <a:solidFill>
+                  <a:srgbClr val="0070C0"/>
+                </a:solidFill>
+              </a:rPr>
+              <a:t>The reusable </a:t>
+            </a:r>
+            <a:r>
+              <a:rPr lang="en-US" dirty="0" err="1">
+                <a:solidFill>
+                  <a:srgbClr val="0070C0"/>
+                </a:solidFill>
+              </a:rPr>
+              <a:t>HumanTask</a:t>
+            </a:r>
+            <a:r>
+              <a:rPr lang="en-US" dirty="0">
+                <a:solidFill>
+                  <a:srgbClr val="0070C0"/>
+                </a:solidFill>
+              </a:rPr>
+              <a:t> </a:t>
+            </a:r>
+            <a:br>
+              <a:rPr lang="en-US" dirty="0">
+                <a:solidFill>
+                  <a:srgbClr val="0070C0"/>
+                </a:solidFill>
+              </a:rPr>
+            </a:br>
+            <a:r>
+              <a:rPr lang="en-US" dirty="0">
+                <a:solidFill>
+                  <a:srgbClr val="0070C0"/>
+                </a:solidFill>
+              </a:rPr>
+              <a:t>from the Repository</a:t>
+            </a:r>
+          </a:p>
+        </p:txBody>
+      </p:sp>
+      <p:sp>
+        <p:nvSpPr>
+          <p:cNvPr id="34" name="Rectangle 33"/>
+          <p:cNvSpPr/>
+          <p:nvPr/>
+        </p:nvSpPr>
+        <p:spPr>
+          <a:xfrm>
+            <a:off x="1006446" y="4544352"/>
+            <a:ext cx="3339083" cy="814337"/>
+          </a:xfrm>
+          <a:prstGeom prst="rect">
+            <a:avLst/>
+          </a:prstGeom>
+          <a:solidFill>
+            <a:schemeClr val="bg1">
+              <a:lumMod val="95000"/>
+            </a:schemeClr>
+          </a:solidFill>
+          <a:ln w="57150">
+            <a:solidFill>
+              <a:schemeClr val="accent1"/>
+            </a:solidFill>
+          </a:ln>
+        </p:spPr>
+        <p:style>
+          <a:lnRef idx="2">
+            <a:schemeClr val="accent1">
+              <a:shade val="50000"/>
+            </a:schemeClr>
+          </a:lnRef>
+          <a:fillRef idx="1">
+            <a:schemeClr val="accent1"/>
+          </a:fillRef>
+          <a:effectRef idx="0">
+            <a:schemeClr val="accent1"/>
+          </a:effectRef>
+          <a:fontRef idx="minor">
+            <a:schemeClr val="lt1"/>
+          </a:fontRef>
+        </p:style>
+        <p:txBody>
+          <a:bodyPr rtlCol="0" anchor="ctr"/>
+          <a:lstStyle/>
+          <a:p>
+            <a:pPr algn="ctr"/>
+            <a:r>
+              <a:rPr lang="en-US" dirty="0" smtClean="0">
+                <a:solidFill>
+                  <a:srgbClr val="0070C0"/>
+                </a:solidFill>
+              </a:rPr>
+              <a:t>The Case File Item</a:t>
+            </a:r>
+          </a:p>
+          <a:p>
+            <a:pPr algn="ctr"/>
+            <a:r>
+              <a:rPr lang="en-US" dirty="0" smtClean="0">
+                <a:solidFill>
+                  <a:srgbClr val="0070C0"/>
+                </a:solidFill>
+              </a:rPr>
+              <a:t>inside HelloWorld</a:t>
+            </a:r>
+            <a:endParaRPr lang="en-US" dirty="0">
+              <a:solidFill>
+                <a:srgbClr val="0070C0"/>
+              </a:solidFill>
+            </a:endParaRPr>
+          </a:p>
+        </p:txBody>
+      </p:sp>
+      <p:pic>
+        <p:nvPicPr>
+          <p:cNvPr id="3" name="Picture 2"/>
+          <p:cNvPicPr>
+            <a:picLocks noChangeAspect="1"/>
+          </p:cNvPicPr>
+          <p:nvPr/>
+        </p:nvPicPr>
+        <p:blipFill>
+          <a:blip r:embed="rId5"/>
+          <a:stretch>
+            <a:fillRect/>
+          </a:stretch>
+        </p:blipFill>
+        <p:spPr>
+          <a:xfrm>
+            <a:off x="1280440" y="1480865"/>
+            <a:ext cx="9631119" cy="3896269"/>
+          </a:xfrm>
+          <a:prstGeom prst="rect">
+            <a:avLst/>
+          </a:prstGeom>
+        </p:spPr>
+      </p:pic>
+    </p:spTree>
+    <p:extLst>
+      <p:ext uri="{BB962C8B-B14F-4D97-AF65-F5344CB8AC3E}">
+        <p14:creationId xmlns:p14="http://schemas.microsoft.com/office/powerpoint/2010/main" val="2404676016"/>
       </p:ext>
     </p:extLst>
   </p:cSld>
@@ -5504,6 +5720,708 @@
 </p:sld>
 </file>
 
+<file path=ppt/slides/slide20.xml><?xml version="1.0" encoding="utf-8"?>
+<p:sld xmlns:a="http://schemas.openxmlformats.org/drawingml/2006/main" xmlns:r="http://schemas.openxmlformats.org/officeDocument/2006/relationships" xmlns:p="http://schemas.openxmlformats.org/presentationml/2006/main">
+  <p:cSld>
+    <p:spTree>
+      <p:nvGrpSpPr>
+        <p:cNvPr id="1" name=""/>
+        <p:cNvGrpSpPr/>
+        <p:nvPr/>
+      </p:nvGrpSpPr>
+      <p:grpSpPr>
+        <a:xfrm>
+          <a:off x="0" y="0"/>
+          <a:ext cx="0" cy="0"/>
+          <a:chOff x="0" y="0"/>
+          <a:chExt cx="0" cy="0"/>
+        </a:xfrm>
+      </p:grpSpPr>
+      <p:sp>
+        <p:nvSpPr>
+          <p:cNvPr id="2" name="Title 1"/>
+          <p:cNvSpPr>
+            <a:spLocks noGrp="1"/>
+          </p:cNvSpPr>
+          <p:nvPr>
+            <p:ph type="title"/>
+          </p:nvPr>
+        </p:nvSpPr>
+        <p:spPr/>
+        <p:txBody>
+          <a:bodyPr/>
+          <a:lstStyle/>
+          <a:p>
+            <a:endParaRPr lang="en-US" dirty="0"/>
+          </a:p>
+        </p:txBody>
+      </p:sp>
+      <p:pic>
+        <p:nvPicPr>
+          <p:cNvPr id="3" name="Picture 2"/>
+          <p:cNvPicPr>
+            <a:picLocks noChangeAspect="1"/>
+          </p:cNvPicPr>
+          <p:nvPr/>
+        </p:nvPicPr>
+        <p:blipFill>
+          <a:blip r:embed="rId2"/>
+          <a:stretch>
+            <a:fillRect/>
+          </a:stretch>
+        </p:blipFill>
+        <p:spPr>
+          <a:xfrm>
+            <a:off x="1280440" y="1480865"/>
+            <a:ext cx="9631119" cy="3896269"/>
+          </a:xfrm>
+          <a:prstGeom prst="rect">
+            <a:avLst/>
+          </a:prstGeom>
+        </p:spPr>
+      </p:pic>
+      <p:sp>
+        <p:nvSpPr>
+          <p:cNvPr id="4" name="Rectangle 3"/>
+          <p:cNvSpPr/>
+          <p:nvPr/>
+        </p:nvSpPr>
+        <p:spPr>
+          <a:xfrm>
+            <a:off x="3745301" y="2381123"/>
+            <a:ext cx="955574" cy="503226"/>
+          </a:xfrm>
+          <a:prstGeom prst="rect">
+            <a:avLst/>
+          </a:prstGeom>
+          <a:noFill/>
+          <a:ln w="57150">
+            <a:solidFill>
+              <a:srgbClr val="FF0000"/>
+            </a:solidFill>
+          </a:ln>
+        </p:spPr>
+        <p:style>
+          <a:lnRef idx="2">
+            <a:schemeClr val="accent1">
+              <a:shade val="50000"/>
+            </a:schemeClr>
+          </a:lnRef>
+          <a:fillRef idx="1">
+            <a:schemeClr val="accent1"/>
+          </a:fillRef>
+          <a:effectRef idx="0">
+            <a:schemeClr val="accent1"/>
+          </a:effectRef>
+          <a:fontRef idx="minor">
+            <a:schemeClr val="lt1"/>
+          </a:fontRef>
+        </p:style>
+        <p:txBody>
+          <a:bodyPr rtlCol="0" anchor="ctr"/>
+          <a:lstStyle/>
+          <a:p>
+            <a:endParaRPr lang="en-US" dirty="0">
+              <a:solidFill>
+                <a:schemeClr val="tx1"/>
+              </a:solidFill>
+            </a:endParaRPr>
+          </a:p>
+        </p:txBody>
+      </p:sp>
+    </p:spTree>
+    <p:extLst>
+      <p:ext uri="{BB962C8B-B14F-4D97-AF65-F5344CB8AC3E}">
+        <p14:creationId xmlns:p14="http://schemas.microsoft.com/office/powerpoint/2010/main" val="2689687881"/>
+      </p:ext>
+    </p:extLst>
+  </p:cSld>
+  <p:clrMapOvr>
+    <a:masterClrMapping/>
+  </p:clrMapOvr>
+  <p:timing>
+    <p:tnLst>
+      <p:par>
+        <p:cTn id="1" dur="indefinite" restart="never" nodeType="tmRoot"/>
+      </p:par>
+    </p:tnLst>
+  </p:timing>
+</p:sld>
+</file>
+
+<file path=ppt/slides/slide21.xml><?xml version="1.0" encoding="utf-8"?>
+<p:sld xmlns:a="http://schemas.openxmlformats.org/drawingml/2006/main" xmlns:r="http://schemas.openxmlformats.org/officeDocument/2006/relationships" xmlns:p="http://schemas.openxmlformats.org/presentationml/2006/main">
+  <p:cSld>
+    <p:spTree>
+      <p:nvGrpSpPr>
+        <p:cNvPr id="1" name=""/>
+        <p:cNvGrpSpPr/>
+        <p:nvPr/>
+      </p:nvGrpSpPr>
+      <p:grpSpPr>
+        <a:xfrm>
+          <a:off x="0" y="0"/>
+          <a:ext cx="0" cy="0"/>
+          <a:chOff x="0" y="0"/>
+          <a:chExt cx="0" cy="0"/>
+        </a:xfrm>
+      </p:grpSpPr>
+      <p:sp>
+        <p:nvSpPr>
+          <p:cNvPr id="2" name="Title 1"/>
+          <p:cNvSpPr>
+            <a:spLocks noGrp="1"/>
+          </p:cNvSpPr>
+          <p:nvPr>
+            <p:ph type="title"/>
+          </p:nvPr>
+        </p:nvSpPr>
+        <p:spPr/>
+        <p:txBody>
+          <a:bodyPr/>
+          <a:lstStyle/>
+          <a:p>
+            <a:r>
+              <a:rPr lang="en-US" dirty="0" smtClean="0"/>
+              <a:t/>
+            </a:r>
+            <a:br>
+              <a:rPr lang="en-US" dirty="0" smtClean="0"/>
+            </a:br>
+            <a:endParaRPr lang="en-US" dirty="0"/>
+          </a:p>
+        </p:txBody>
+      </p:sp>
+      <p:pic>
+        <p:nvPicPr>
+          <p:cNvPr id="3" name="Picture 2"/>
+          <p:cNvPicPr>
+            <a:picLocks noChangeAspect="1"/>
+          </p:cNvPicPr>
+          <p:nvPr/>
+        </p:nvPicPr>
+        <p:blipFill>
+          <a:blip r:embed="rId2"/>
+          <a:stretch>
+            <a:fillRect/>
+          </a:stretch>
+        </p:blipFill>
+        <p:spPr>
+          <a:xfrm>
+            <a:off x="2804653" y="2033391"/>
+            <a:ext cx="6582694" cy="2876951"/>
+          </a:xfrm>
+          <a:prstGeom prst="rect">
+            <a:avLst/>
+          </a:prstGeom>
+        </p:spPr>
+      </p:pic>
+      <p:sp>
+        <p:nvSpPr>
+          <p:cNvPr id="4" name="Rectangle 3"/>
+          <p:cNvSpPr/>
+          <p:nvPr/>
+        </p:nvSpPr>
+        <p:spPr>
+          <a:xfrm>
+            <a:off x="2804653" y="1990524"/>
+            <a:ext cx="6682247" cy="2876951"/>
+          </a:xfrm>
+          <a:prstGeom prst="rect">
+            <a:avLst/>
+          </a:prstGeom>
+          <a:noFill/>
+          <a:ln>
+            <a:solidFill>
+              <a:schemeClr val="accent1"/>
+            </a:solidFill>
+          </a:ln>
+        </p:spPr>
+        <p:style>
+          <a:lnRef idx="2">
+            <a:schemeClr val="accent1">
+              <a:shade val="50000"/>
+            </a:schemeClr>
+          </a:lnRef>
+          <a:fillRef idx="1">
+            <a:schemeClr val="accent1"/>
+          </a:fillRef>
+          <a:effectRef idx="0">
+            <a:schemeClr val="accent1"/>
+          </a:effectRef>
+          <a:fontRef idx="minor">
+            <a:schemeClr val="lt1"/>
+          </a:fontRef>
+        </p:style>
+        <p:txBody>
+          <a:bodyPr rtlCol="0" anchor="ctr"/>
+          <a:lstStyle/>
+          <a:p>
+            <a:pPr algn="ctr"/>
+            <a:endParaRPr lang="en-US"/>
+          </a:p>
+        </p:txBody>
+      </p:sp>
+    </p:spTree>
+    <p:extLst>
+      <p:ext uri="{BB962C8B-B14F-4D97-AF65-F5344CB8AC3E}">
+        <p14:creationId xmlns:p14="http://schemas.microsoft.com/office/powerpoint/2010/main" val="2806717025"/>
+      </p:ext>
+    </p:extLst>
+  </p:cSld>
+  <p:clrMapOvr>
+    <a:masterClrMapping/>
+  </p:clrMapOvr>
+  <p:timing>
+    <p:tnLst>
+      <p:par>
+        <p:cTn id="1" dur="indefinite" restart="never" nodeType="tmRoot"/>
+      </p:par>
+    </p:tnLst>
+  </p:timing>
+</p:sld>
+</file>
+
+<file path=ppt/slides/slide22.xml><?xml version="1.0" encoding="utf-8"?>
+<p:sld xmlns:a="http://schemas.openxmlformats.org/drawingml/2006/main" xmlns:r="http://schemas.openxmlformats.org/officeDocument/2006/relationships" xmlns:p="http://schemas.openxmlformats.org/presentationml/2006/main">
+  <p:cSld>
+    <p:spTree>
+      <p:nvGrpSpPr>
+        <p:cNvPr id="1" name=""/>
+        <p:cNvGrpSpPr/>
+        <p:nvPr/>
+      </p:nvGrpSpPr>
+      <p:grpSpPr>
+        <a:xfrm>
+          <a:off x="0" y="0"/>
+          <a:ext cx="0" cy="0"/>
+          <a:chOff x="0" y="0"/>
+          <a:chExt cx="0" cy="0"/>
+        </a:xfrm>
+      </p:grpSpPr>
+      <p:pic>
+        <p:nvPicPr>
+          <p:cNvPr id="3" name="Picture 2"/>
+          <p:cNvPicPr>
+            <a:picLocks noChangeAspect="1"/>
+          </p:cNvPicPr>
+          <p:nvPr/>
+        </p:nvPicPr>
+        <p:blipFill>
+          <a:blip r:embed="rId2"/>
+          <a:stretch>
+            <a:fillRect/>
+          </a:stretch>
+        </p:blipFill>
+        <p:spPr>
+          <a:xfrm>
+            <a:off x="2641299" y="1690688"/>
+            <a:ext cx="5607352" cy="4760604"/>
+          </a:xfrm>
+          <a:prstGeom prst="rect">
+            <a:avLst/>
+          </a:prstGeom>
+        </p:spPr>
+      </p:pic>
+      <p:sp>
+        <p:nvSpPr>
+          <p:cNvPr id="2" name="Title 1"/>
+          <p:cNvSpPr>
+            <a:spLocks noGrp="1"/>
+          </p:cNvSpPr>
+          <p:nvPr>
+            <p:ph type="title"/>
+          </p:nvPr>
+        </p:nvSpPr>
+        <p:spPr/>
+        <p:txBody>
+          <a:bodyPr/>
+          <a:lstStyle/>
+          <a:p>
+            <a:endParaRPr lang="en-US" dirty="0"/>
+          </a:p>
+        </p:txBody>
+      </p:sp>
+      <p:sp>
+        <p:nvSpPr>
+          <p:cNvPr id="5" name="Rectangle 4"/>
+          <p:cNvSpPr/>
+          <p:nvPr/>
+        </p:nvSpPr>
+        <p:spPr>
+          <a:xfrm>
+            <a:off x="5243901" y="1873123"/>
+            <a:ext cx="236148" cy="260477"/>
+          </a:xfrm>
+          <a:prstGeom prst="rect">
+            <a:avLst/>
+          </a:prstGeom>
+          <a:noFill/>
+          <a:ln w="9525">
+            <a:solidFill>
+              <a:srgbClr val="FF0000"/>
+            </a:solidFill>
+          </a:ln>
+        </p:spPr>
+        <p:style>
+          <a:lnRef idx="2">
+            <a:schemeClr val="accent1">
+              <a:shade val="50000"/>
+            </a:schemeClr>
+          </a:lnRef>
+          <a:fillRef idx="1">
+            <a:schemeClr val="accent1"/>
+          </a:fillRef>
+          <a:effectRef idx="0">
+            <a:schemeClr val="accent1"/>
+          </a:effectRef>
+          <a:fontRef idx="minor">
+            <a:schemeClr val="lt1"/>
+          </a:fontRef>
+        </p:style>
+        <p:txBody>
+          <a:bodyPr rtlCol="0" anchor="ctr"/>
+          <a:lstStyle/>
+          <a:p>
+            <a:endParaRPr lang="en-US" dirty="0">
+              <a:solidFill>
+                <a:schemeClr val="tx1"/>
+              </a:solidFill>
+            </a:endParaRPr>
+          </a:p>
+        </p:txBody>
+      </p:sp>
+      <p:sp>
+        <p:nvSpPr>
+          <p:cNvPr id="10" name="Oval 9"/>
+          <p:cNvSpPr/>
+          <p:nvPr/>
+        </p:nvSpPr>
+        <p:spPr>
+          <a:xfrm>
+            <a:off x="3622525" y="5478996"/>
+            <a:ext cx="1898650" cy="667804"/>
+          </a:xfrm>
+          <a:prstGeom prst="ellipse">
+            <a:avLst/>
+          </a:prstGeom>
+          <a:noFill/>
+          <a:ln w="57150">
+            <a:solidFill>
+              <a:srgbClr val="FF0000"/>
+            </a:solidFill>
+          </a:ln>
+        </p:spPr>
+        <p:style>
+          <a:lnRef idx="2">
+            <a:schemeClr val="accent1">
+              <a:shade val="50000"/>
+            </a:schemeClr>
+          </a:lnRef>
+          <a:fillRef idx="1">
+            <a:schemeClr val="accent1"/>
+          </a:fillRef>
+          <a:effectRef idx="0">
+            <a:schemeClr val="accent1"/>
+          </a:effectRef>
+          <a:fontRef idx="minor">
+            <a:schemeClr val="lt1"/>
+          </a:fontRef>
+        </p:style>
+        <p:txBody>
+          <a:bodyPr rtlCol="0" anchor="ctr"/>
+          <a:lstStyle/>
+          <a:p>
+            <a:pPr algn="ctr"/>
+            <a:endParaRPr lang="en-US"/>
+          </a:p>
+        </p:txBody>
+      </p:sp>
+    </p:spTree>
+    <p:extLst>
+      <p:ext uri="{BB962C8B-B14F-4D97-AF65-F5344CB8AC3E}">
+        <p14:creationId xmlns:p14="http://schemas.microsoft.com/office/powerpoint/2010/main" val="48976695"/>
+      </p:ext>
+    </p:extLst>
+  </p:cSld>
+  <p:clrMapOvr>
+    <a:masterClrMapping/>
+  </p:clrMapOvr>
+  <p:timing>
+    <p:tnLst>
+      <p:par>
+        <p:cTn id="1" dur="indefinite" restart="never" nodeType="tmRoot"/>
+      </p:par>
+    </p:tnLst>
+  </p:timing>
+</p:sld>
+</file>
+
+<file path=ppt/slides/slide23.xml><?xml version="1.0" encoding="utf-8"?>
+<p:sld xmlns:a="http://schemas.openxmlformats.org/drawingml/2006/main" xmlns:r="http://schemas.openxmlformats.org/officeDocument/2006/relationships" xmlns:p="http://schemas.openxmlformats.org/presentationml/2006/main">
+  <p:cSld>
+    <p:spTree>
+      <p:nvGrpSpPr>
+        <p:cNvPr id="1" name=""/>
+        <p:cNvGrpSpPr/>
+        <p:nvPr/>
+      </p:nvGrpSpPr>
+      <p:grpSpPr>
+        <a:xfrm>
+          <a:off x="0" y="0"/>
+          <a:ext cx="0" cy="0"/>
+          <a:chOff x="0" y="0"/>
+          <a:chExt cx="0" cy="0"/>
+        </a:xfrm>
+      </p:grpSpPr>
+      <p:sp>
+        <p:nvSpPr>
+          <p:cNvPr id="2" name="Title 1"/>
+          <p:cNvSpPr>
+            <a:spLocks noGrp="1"/>
+          </p:cNvSpPr>
+          <p:nvPr>
+            <p:ph type="title"/>
+          </p:nvPr>
+        </p:nvSpPr>
+        <p:spPr/>
+        <p:txBody>
+          <a:bodyPr/>
+          <a:lstStyle/>
+          <a:p>
+            <a:endParaRPr lang="en-US"/>
+          </a:p>
+        </p:txBody>
+      </p:sp>
+      <p:pic>
+        <p:nvPicPr>
+          <p:cNvPr id="3" name="Picture 2"/>
+          <p:cNvPicPr>
+            <a:picLocks noChangeAspect="1"/>
+          </p:cNvPicPr>
+          <p:nvPr/>
+        </p:nvPicPr>
+        <p:blipFill>
+          <a:blip r:embed="rId2"/>
+          <a:stretch>
+            <a:fillRect/>
+          </a:stretch>
+        </p:blipFill>
+        <p:spPr>
+          <a:xfrm>
+            <a:off x="462170" y="67784"/>
+            <a:ext cx="4163006" cy="4324954"/>
+          </a:xfrm>
+          <a:prstGeom prst="rect">
+            <a:avLst/>
+          </a:prstGeom>
+          <a:ln>
+            <a:solidFill>
+              <a:schemeClr val="accent1"/>
+            </a:solidFill>
+          </a:ln>
+        </p:spPr>
+      </p:pic>
+      <p:pic>
+        <p:nvPicPr>
+          <p:cNvPr id="5" name="Picture 4"/>
+          <p:cNvPicPr>
+            <a:picLocks noChangeAspect="1"/>
+          </p:cNvPicPr>
+          <p:nvPr/>
+        </p:nvPicPr>
+        <p:blipFill>
+          <a:blip r:embed="rId3"/>
+          <a:stretch>
+            <a:fillRect/>
+          </a:stretch>
+        </p:blipFill>
+        <p:spPr>
+          <a:xfrm>
+            <a:off x="462170" y="4510205"/>
+            <a:ext cx="5725324" cy="1914792"/>
+          </a:xfrm>
+          <a:prstGeom prst="rect">
+            <a:avLst/>
+          </a:prstGeom>
+          <a:ln>
+            <a:solidFill>
+              <a:schemeClr val="accent1"/>
+            </a:solidFill>
+          </a:ln>
+        </p:spPr>
+      </p:pic>
+      <p:pic>
+        <p:nvPicPr>
+          <p:cNvPr id="6" name="Picture 5"/>
+          <p:cNvPicPr>
+            <a:picLocks noChangeAspect="1"/>
+          </p:cNvPicPr>
+          <p:nvPr/>
+        </p:nvPicPr>
+        <p:blipFill>
+          <a:blip r:embed="rId4"/>
+          <a:stretch>
+            <a:fillRect/>
+          </a:stretch>
+        </p:blipFill>
+        <p:spPr>
+          <a:xfrm>
+            <a:off x="4688722" y="67784"/>
+            <a:ext cx="4277322" cy="2715004"/>
+          </a:xfrm>
+          <a:prstGeom prst="rect">
+            <a:avLst/>
+          </a:prstGeom>
+          <a:ln>
+            <a:solidFill>
+              <a:schemeClr val="accent1"/>
+            </a:solidFill>
+          </a:ln>
+        </p:spPr>
+      </p:pic>
+      <p:pic>
+        <p:nvPicPr>
+          <p:cNvPr id="10" name="Picture 9"/>
+          <p:cNvPicPr>
+            <a:picLocks noChangeAspect="1"/>
+          </p:cNvPicPr>
+          <p:nvPr/>
+        </p:nvPicPr>
+        <p:blipFill>
+          <a:blip r:embed="rId5"/>
+          <a:stretch>
+            <a:fillRect/>
+          </a:stretch>
+        </p:blipFill>
+        <p:spPr>
+          <a:xfrm>
+            <a:off x="6354077" y="4157731"/>
+            <a:ext cx="4096322" cy="2267266"/>
+          </a:xfrm>
+          <a:prstGeom prst="rect">
+            <a:avLst/>
+          </a:prstGeom>
+          <a:ln>
+            <a:solidFill>
+              <a:schemeClr val="accent1"/>
+            </a:solidFill>
+          </a:ln>
+        </p:spPr>
+      </p:pic>
+      <p:pic>
+        <p:nvPicPr>
+          <p:cNvPr id="23" name="Picture 22"/>
+          <p:cNvPicPr>
+            <a:picLocks noChangeAspect="1"/>
+          </p:cNvPicPr>
+          <p:nvPr/>
+        </p:nvPicPr>
+        <p:blipFill>
+          <a:blip r:embed="rId6"/>
+          <a:stretch>
+            <a:fillRect/>
+          </a:stretch>
+        </p:blipFill>
+        <p:spPr>
+          <a:xfrm>
+            <a:off x="9107186" y="940292"/>
+            <a:ext cx="2686425" cy="2819794"/>
+          </a:xfrm>
+          <a:prstGeom prst="rect">
+            <a:avLst/>
+          </a:prstGeom>
+          <a:ln>
+            <a:solidFill>
+              <a:schemeClr val="accent1"/>
+            </a:solidFill>
+          </a:ln>
+        </p:spPr>
+      </p:pic>
+      <p:sp>
+        <p:nvSpPr>
+          <p:cNvPr id="24" name="Rectangle 23"/>
+          <p:cNvSpPr/>
+          <p:nvPr/>
+        </p:nvSpPr>
+        <p:spPr>
+          <a:xfrm>
+            <a:off x="7920111" y="6424997"/>
+            <a:ext cx="3873500" cy="392383"/>
+          </a:xfrm>
+          <a:prstGeom prst="rect">
+            <a:avLst/>
+          </a:prstGeom>
+          <a:noFill/>
+          <a:ln>
+            <a:noFill/>
+          </a:ln>
+        </p:spPr>
+        <p:style>
+          <a:lnRef idx="2">
+            <a:schemeClr val="accent1">
+              <a:shade val="50000"/>
+            </a:schemeClr>
+          </a:lnRef>
+          <a:fillRef idx="1">
+            <a:schemeClr val="accent1"/>
+          </a:fillRef>
+          <a:effectRef idx="0">
+            <a:schemeClr val="accent1"/>
+          </a:effectRef>
+          <a:fontRef idx="minor">
+            <a:schemeClr val="lt1"/>
+          </a:fontRef>
+        </p:style>
+        <p:txBody>
+          <a:bodyPr rtlCol="0" anchor="ctr"/>
+          <a:lstStyle/>
+          <a:p>
+            <a:pPr algn="ctr"/>
+            <a:r>
+              <a:rPr lang="en-US" b="1" dirty="0" smtClean="0">
+                <a:solidFill>
+                  <a:schemeClr val="tx1"/>
+                </a:solidFill>
+              </a:rPr>
+              <a:t>Various properties </a:t>
+            </a:r>
+            <a:r>
+              <a:rPr lang="en-US" b="1" smtClean="0">
+                <a:solidFill>
+                  <a:schemeClr val="tx1"/>
+                </a:solidFill>
+              </a:rPr>
+              <a:t>with expressions</a:t>
+            </a:r>
+            <a:endParaRPr lang="en-US" b="1" dirty="0">
+              <a:solidFill>
+                <a:schemeClr val="tx1"/>
+              </a:solidFill>
+            </a:endParaRPr>
+          </a:p>
+        </p:txBody>
+      </p:sp>
+    </p:spTree>
+    <p:extLst>
+      <p:ext uri="{BB962C8B-B14F-4D97-AF65-F5344CB8AC3E}">
+        <p14:creationId xmlns:p14="http://schemas.microsoft.com/office/powerpoint/2010/main" val="4136435964"/>
+      </p:ext>
+    </p:extLst>
+  </p:cSld>
+  <p:clrMapOvr>
+    <a:masterClrMapping/>
+  </p:clrMapOvr>
+  <p:timing>
+    <p:tnLst>
+      <p:par>
+        <p:cTn id="1" dur="indefinite" restart="never" nodeType="tmRoot"/>
+      </p:par>
+    </p:tnLst>
+  </p:timing>
+</p:sld>
+</file>
+
 <file path=ppt/slides/slide3.xml><?xml version="1.0" encoding="utf-8"?>
 <p:sld xmlns:a="http://schemas.openxmlformats.org/drawingml/2006/main" xmlns:r="http://schemas.openxmlformats.org/officeDocument/2006/relationships" xmlns:p="http://schemas.openxmlformats.org/presentationml/2006/main">
   <p:cSld>
@@ -5536,6 +6454,10 @@
           <a:bodyPr/>
           <a:lstStyle/>
           <a:p>
+            <a:r>
+              <a:rPr lang="en-US" dirty="0"/>
+              <a:t>workflow-extensions.png</a:t>
+            </a:r>
             <a:endParaRPr lang="en-US" dirty="0"/>
           </a:p>
         </p:txBody>
@@ -5616,6 +6538,10 @@
           <a:bodyPr/>
           <a:lstStyle/>
           <a:p>
+            <a:r>
+              <a:rPr lang="en-US"/>
+              <a:t>reusable-implementations.png</a:t>
+            </a:r>
             <a:endParaRPr lang="en-US" dirty="0"/>
           </a:p>
         </p:txBody>
@@ -5853,28 +6779,9 @@
           <a:chExt cx="0" cy="0"/>
         </a:xfrm>
       </p:grpSpPr>
-      <p:sp>
-        <p:nvSpPr>
-          <p:cNvPr id="2" name="Title 1"/>
-          <p:cNvSpPr>
-            <a:spLocks noGrp="1"/>
-          </p:cNvSpPr>
-          <p:nvPr>
-            <p:ph type="title"/>
-          </p:nvPr>
-        </p:nvSpPr>
-        <p:spPr/>
-        <p:txBody>
-          <a:bodyPr/>
-          <a:lstStyle/>
-          <a:p>
-            <a:endParaRPr lang="en-US" dirty="0"/>
-          </a:p>
-        </p:txBody>
-      </p:sp>
       <p:pic>
         <p:nvPicPr>
-          <p:cNvPr id="6" name="Picture 5"/>
+          <p:cNvPr id="5" name="Picture 4"/>
           <p:cNvPicPr>
             <a:picLocks noChangeAspect="1"/>
           </p:cNvPicPr>
@@ -5888,8 +6795,8 @@
         </p:blipFill>
         <p:spPr>
           <a:xfrm>
-            <a:off x="3833497" y="642548"/>
-            <a:ext cx="4525006" cy="5572903"/>
+            <a:off x="2664569" y="2044820"/>
+            <a:ext cx="3696216" cy="3934374"/>
           </a:xfrm>
           <a:prstGeom prst="rect">
             <a:avLst/>
@@ -5898,13 +6805,36 @@
       </p:pic>
       <p:sp>
         <p:nvSpPr>
+          <p:cNvPr id="2" name="Title 1"/>
+          <p:cNvSpPr>
+            <a:spLocks noGrp="1"/>
+          </p:cNvSpPr>
+          <p:nvPr>
+            <p:ph type="title"/>
+          </p:nvPr>
+        </p:nvSpPr>
+        <p:spPr/>
+        <p:txBody>
+          <a:bodyPr/>
+          <a:lstStyle/>
+          <a:p>
+            <a:r>
+              <a:rPr lang="en-US" dirty="0" smtClean="0"/>
+              <a:t>workflow-properties.png</a:t>
+            </a:r>
+            <a:endParaRPr lang="en-US" dirty="0"/>
+          </a:p>
+        </p:txBody>
+      </p:sp>
+      <p:sp>
+        <p:nvSpPr>
           <p:cNvPr id="4" name="Oval 3"/>
           <p:cNvSpPr/>
           <p:nvPr/>
         </p:nvSpPr>
         <p:spPr>
           <a:xfrm>
-            <a:off x="4934077" y="1727510"/>
+            <a:off x="3749653" y="3140564"/>
             <a:ext cx="405037" cy="405037"/>
           </a:xfrm>
           <a:prstGeom prst="ellipse">
@@ -5942,10 +6872,34 @@
           </a:p>
         </p:txBody>
       </p:sp>
+      <p:pic>
+        <p:nvPicPr>
+          <p:cNvPr id="3" name="Picture 2"/>
+          <p:cNvPicPr>
+            <a:picLocks noChangeAspect="1"/>
+          </p:cNvPicPr>
+          <p:nvPr/>
+        </p:nvPicPr>
+        <p:blipFill>
+          <a:blip r:embed="rId3"/>
+          <a:stretch>
+            <a:fillRect/>
+          </a:stretch>
+        </p:blipFill>
+        <p:spPr>
+          <a:xfrm>
+            <a:off x="2664569" y="2044820"/>
+            <a:ext cx="5715798" cy="5525271"/>
+          </a:xfrm>
+          <a:prstGeom prst="rect">
+            <a:avLst/>
+          </a:prstGeom>
+        </p:spPr>
+      </p:pic>
     </p:spTree>
     <p:extLst>
       <p:ext uri="{BB962C8B-B14F-4D97-AF65-F5344CB8AC3E}">
-        <p14:creationId xmlns:p14="http://schemas.microsoft.com/office/powerpoint/2010/main" val="2832426787"/>
+        <p14:creationId xmlns:p14="http://schemas.microsoft.com/office/powerpoint/2010/main" val="4081306980"/>
       </p:ext>
     </p:extLst>
   </p:cSld>
@@ -6000,7 +6954,7 @@
       </p:sp>
       <p:pic>
         <p:nvPicPr>
-          <p:cNvPr id="6" name="Picture 5"/>
+          <p:cNvPr id="5" name="Picture 4"/>
           <p:cNvPicPr>
             <a:picLocks noChangeAspect="1"/>
           </p:cNvPicPr>
@@ -6014,101 +6968,18 @@
         </p:blipFill>
         <p:spPr>
           <a:xfrm>
-            <a:off x="2475995" y="458304"/>
-            <a:ext cx="7240010" cy="5944430"/>
+            <a:off x="1683945" y="597278"/>
+            <a:ext cx="7534774" cy="5663194"/>
           </a:xfrm>
           <a:prstGeom prst="rect">
             <a:avLst/>
           </a:prstGeom>
         </p:spPr>
       </p:pic>
-      <p:sp>
-        <p:nvSpPr>
-          <p:cNvPr id="9" name="Rectangle 8"/>
-          <p:cNvSpPr/>
-          <p:nvPr/>
-        </p:nvSpPr>
-        <p:spPr>
-          <a:xfrm>
-            <a:off x="9201016" y="4927942"/>
-            <a:ext cx="2152784" cy="1147601"/>
-          </a:xfrm>
-          <a:prstGeom prst="rect">
-            <a:avLst/>
-          </a:prstGeom>
-          <a:solidFill>
-            <a:schemeClr val="bg1"/>
-          </a:solidFill>
-          <a:ln w="57150">
-            <a:solidFill>
-              <a:srgbClr val="FF0000"/>
-            </a:solidFill>
-          </a:ln>
-        </p:spPr>
-        <p:style>
-          <a:lnRef idx="2">
-            <a:schemeClr val="accent1">
-              <a:shade val="50000"/>
-            </a:schemeClr>
-          </a:lnRef>
-          <a:fillRef idx="1">
-            <a:schemeClr val="accent1"/>
-          </a:fillRef>
-          <a:effectRef idx="0">
-            <a:schemeClr val="accent1"/>
-          </a:effectRef>
-          <a:fontRef idx="minor">
-            <a:schemeClr val="lt1"/>
-          </a:fontRef>
-        </p:style>
-        <p:txBody>
-          <a:bodyPr rtlCol="0" anchor="ctr"/>
-          <a:lstStyle/>
-          <a:p>
-            <a:r>
-              <a:rPr lang="en-US" dirty="0" smtClean="0">
-                <a:solidFill>
-                  <a:schemeClr val="tx1"/>
-                </a:solidFill>
-              </a:rPr>
-              <a:t>R – Required</a:t>
-            </a:r>
-            <a:br>
-              <a:rPr lang="en-US" dirty="0" smtClean="0">
-                <a:solidFill>
-                  <a:schemeClr val="tx1"/>
-                </a:solidFill>
-              </a:rPr>
-            </a:br>
-            <a:endParaRPr lang="en-US" sz="1400" dirty="0" smtClean="0">
-              <a:solidFill>
-                <a:schemeClr val="tx1"/>
-              </a:solidFill>
-            </a:endParaRPr>
-          </a:p>
-          <a:p>
-            <a:r>
-              <a:rPr lang="en-US" sz="1400" dirty="0" smtClean="0">
-                <a:solidFill>
-                  <a:schemeClr val="tx1"/>
-                </a:solidFill>
-              </a:rPr>
-              <a:t>Mandatory output</a:t>
-            </a:r>
-          </a:p>
-          <a:p>
-            <a:endParaRPr lang="en-US" dirty="0">
-              <a:solidFill>
-                <a:schemeClr val="tx1"/>
-              </a:solidFill>
-            </a:endParaRPr>
-          </a:p>
-        </p:txBody>
-      </p:sp>
     </p:spTree>
     <p:extLst>
       <p:ext uri="{BB962C8B-B14F-4D97-AF65-F5344CB8AC3E}">
-        <p14:creationId xmlns:p14="http://schemas.microsoft.com/office/powerpoint/2010/main" val="2261436592"/>
+        <p14:creationId xmlns:p14="http://schemas.microsoft.com/office/powerpoint/2010/main" val="2832426787"/>
       </p:ext>
     </p:extLst>
   </p:cSld>
@@ -6163,7 +7034,7 @@
       </p:sp>
       <p:pic>
         <p:nvPicPr>
-          <p:cNvPr id="5" name="Picture 4"/>
+          <p:cNvPr id="6" name="Picture 5"/>
           <p:cNvPicPr>
             <a:picLocks noChangeAspect="1"/>
           </p:cNvPicPr>
@@ -6177,8 +7048,8 @@
         </p:blipFill>
         <p:spPr>
           <a:xfrm>
-            <a:off x="3581049" y="1776182"/>
-            <a:ext cx="5029902" cy="3305636"/>
+            <a:off x="3833497" y="642548"/>
+            <a:ext cx="4525006" cy="5572903"/>
           </a:xfrm>
           <a:prstGeom prst="rect">
             <a:avLst/>
@@ -6187,14 +7058,14 @@
       </p:pic>
       <p:sp>
         <p:nvSpPr>
-          <p:cNvPr id="7" name="Oval 6"/>
+          <p:cNvPr id="4" name="Oval 3"/>
           <p:cNvSpPr/>
           <p:nvPr/>
         </p:nvSpPr>
         <p:spPr>
           <a:xfrm>
-            <a:off x="6096000" y="3961346"/>
-            <a:ext cx="2759565" cy="1064786"/>
+            <a:off x="4934077" y="1727510"/>
+            <a:ext cx="405037" cy="405037"/>
           </a:xfrm>
           <a:prstGeom prst="ellipse">
             <a:avLst/>
@@ -6234,7 +7105,7 @@
     </p:spTree>
     <p:extLst>
       <p:ext uri="{BB962C8B-B14F-4D97-AF65-F5344CB8AC3E}">
-        <p14:creationId xmlns:p14="http://schemas.microsoft.com/office/powerpoint/2010/main" val="2806846218"/>
+        <p14:creationId xmlns:p14="http://schemas.microsoft.com/office/powerpoint/2010/main" val="1072985853"/>
       </p:ext>
     </p:extLst>
   </p:cSld>
@@ -6289,115 +7160,73 @@
       </p:sp>
       <p:pic>
         <p:nvPicPr>
-          <p:cNvPr id="6" name="Picture 5"/>
+          <p:cNvPr id="1026" name="Picture 2" descr="Image"/>
+          <p:cNvPicPr>
+            <a:picLocks noChangeAspect="1" noChangeArrowheads="1"/>
+          </p:cNvPicPr>
+          <p:nvPr/>
+        </p:nvPicPr>
+        <p:blipFill>
+          <a:blip r:embed="rId2">
+            <a:extLst>
+              <a:ext uri="{28A0092B-C50C-407E-A947-70E740481C1C}">
+                <a14:useLocalDpi xmlns:a14="http://schemas.microsoft.com/office/drawing/2010/main" val="0"/>
+              </a:ext>
+            </a:extLst>
+          </a:blip>
+          <a:srcRect/>
+          <a:stretch>
+            <a:fillRect/>
+          </a:stretch>
+        </p:blipFill>
+        <p:spPr bwMode="auto">
+          <a:xfrm>
+            <a:off x="942975" y="1791501"/>
+            <a:ext cx="11249025" cy="3295651"/>
+          </a:xfrm>
+          <a:prstGeom prst="rect">
+            <a:avLst/>
+          </a:prstGeom>
+          <a:noFill/>
+          <a:extLst>
+            <a:ext uri="{909E8E84-426E-40DD-AFC4-6F175D3DCCD1}">
+              <a14:hiddenFill xmlns:a14="http://schemas.microsoft.com/office/drawing/2010/main">
+                <a:solidFill>
+                  <a:srgbClr val="FFFFFF"/>
+                </a:solidFill>
+              </a14:hiddenFill>
+            </a:ext>
+          </a:extLst>
+        </p:spPr>
+      </p:pic>
+      <p:pic>
+        <p:nvPicPr>
+          <p:cNvPr id="3" name="Picture 2"/>
           <p:cNvPicPr>
             <a:picLocks noChangeAspect="1"/>
           </p:cNvPicPr>
           <p:nvPr/>
         </p:nvPicPr>
         <p:blipFill>
-          <a:blip r:embed="rId2"/>
+          <a:blip r:embed="rId3"/>
           <a:stretch>
             <a:fillRect/>
           </a:stretch>
         </p:blipFill>
         <p:spPr>
           <a:xfrm>
-            <a:off x="2475995" y="458304"/>
-            <a:ext cx="7240010" cy="5944430"/>
+            <a:off x="4768715" y="2315377"/>
+            <a:ext cx="4173825" cy="4419617"/>
           </a:xfrm>
           <a:prstGeom prst="rect">
             <a:avLst/>
           </a:prstGeom>
         </p:spPr>
       </p:pic>
-      <p:sp>
-        <p:nvSpPr>
-          <p:cNvPr id="9" name="Rectangle 8"/>
-          <p:cNvSpPr/>
-          <p:nvPr/>
-        </p:nvSpPr>
-        <p:spPr>
-          <a:xfrm>
-            <a:off x="9201016" y="4927942"/>
-            <a:ext cx="2152784" cy="1147601"/>
-          </a:xfrm>
-          <a:prstGeom prst="rect">
-            <a:avLst/>
-          </a:prstGeom>
-          <a:solidFill>
-            <a:schemeClr val="bg1"/>
-          </a:solidFill>
-          <a:ln w="57150">
-            <a:solidFill>
-              <a:srgbClr val="FF0000"/>
-            </a:solidFill>
-          </a:ln>
-        </p:spPr>
-        <p:style>
-          <a:lnRef idx="2">
-            <a:schemeClr val="accent1">
-              <a:shade val="50000"/>
-            </a:schemeClr>
-          </a:lnRef>
-          <a:fillRef idx="1">
-            <a:schemeClr val="accent1"/>
-          </a:fillRef>
-          <a:effectRef idx="0">
-            <a:schemeClr val="accent1"/>
-          </a:effectRef>
-          <a:fontRef idx="minor">
-            <a:schemeClr val="lt1"/>
-          </a:fontRef>
-        </p:style>
-        <p:txBody>
-          <a:bodyPr rtlCol="0" anchor="ctr"/>
-          <a:lstStyle/>
-          <a:p>
-            <a:r>
-              <a:rPr lang="en-US" dirty="0" smtClean="0">
-                <a:solidFill>
-                  <a:schemeClr val="tx1"/>
-                </a:solidFill>
-              </a:rPr>
-              <a:t>R – Required</a:t>
-            </a:r>
-            <a:br>
-              <a:rPr lang="en-US" dirty="0" smtClean="0">
-                <a:solidFill>
-                  <a:schemeClr val="tx1"/>
-                </a:solidFill>
-              </a:rPr>
-            </a:br>
-            <a:endParaRPr lang="en-US" sz="1400" dirty="0" smtClean="0">
-              <a:solidFill>
-                <a:schemeClr val="tx1"/>
-              </a:solidFill>
-            </a:endParaRPr>
-          </a:p>
-          <a:p>
-            <a:r>
-              <a:rPr lang="en-US" sz="1400" dirty="0" smtClean="0">
-                <a:solidFill>
-                  <a:schemeClr val="tx1"/>
-                </a:solidFill>
-              </a:rPr>
-              <a:t>Mandatory output</a:t>
-            </a:r>
-          </a:p>
-          <a:p>
-            <a:endParaRPr lang="en-US" dirty="0">
-              <a:solidFill>
-                <a:schemeClr val="tx1"/>
-              </a:solidFill>
-            </a:endParaRPr>
-          </a:p>
-        </p:txBody>
-      </p:sp>
     </p:spTree>
     <p:extLst>
       <p:ext uri="{BB962C8B-B14F-4D97-AF65-F5344CB8AC3E}">
-        <p14:creationId xmlns:p14="http://schemas.microsoft.com/office/powerpoint/2010/main" val="2447276958"/>
+        <p14:creationId xmlns:p14="http://schemas.microsoft.com/office/powerpoint/2010/main" val="3768591359"/>
       </p:ext>
     </p:extLst>
   </p:cSld>

</xml_diff>